<commit_message>
final minor edits to module 2 lecture
</commit_message>
<xml_diff>
--- a/GenViz_Module2_Lecture.pptx
+++ b/GenViz_Module2_Lecture.pptx
@@ -142,7 +142,7 @@
   </p:defaultTextStyle>
   <p:extLst>
     <p:ext uri="{EFAFB233-063F-42B5-8137-9DF3F51BA10A}">
-      <p15:sldGuideLst xmlns:p15="http://schemas.microsoft.com/office/powerpoint/2012/main" xmlns="">
+      <p15:sldGuideLst xmlns="" xmlns:p15="http://schemas.microsoft.com/office/powerpoint/2012/main">
         <p15:guide id="1" orient="horz" pos="2160">
           <p15:clr>
             <a:srgbClr val="A4A3A4"/>
@@ -242,7 +242,7 @@
             <a:fld id="{03643E35-CD80-874A-A3D7-254E954BB753}" type="datetimeFigureOut">
               <a:rPr lang="en-US" smtClean="0"/>
               <a:pPr/>
-              <a:t>9/11/17</a:t>
+              <a:t>9/12/17</a:t>
             </a:fld>
             <a:endParaRPr lang="en-US"/>
           </a:p>
@@ -409,7 +409,7 @@
             <a:fld id="{5C416C15-7665-174C-99B8-5B237ACA6582}" type="datetimeFigureOut">
               <a:rPr lang="en-US" smtClean="0"/>
               <a:pPr/>
-              <a:t>9/11/17</a:t>
+              <a:t>9/12/17</a:t>
             </a:fld>
             <a:endParaRPr lang="en-US"/>
           </a:p>
@@ -3303,19 +3303,7 @@
           <a:p>
             <a:r>
               <a:rPr lang="en-US" dirty="0" smtClean="0"/>
-              <a:t>Variables, Data </a:t>
-            </a:r>
-            <a:r>
-              <a:rPr lang="en-US" dirty="0" smtClean="0"/>
-              <a:t>Structure (</a:t>
-            </a:r>
-            <a:r>
-              <a:rPr lang="en-US" dirty="0" smtClean="0"/>
-              <a:t>Object) Types </a:t>
-            </a:r>
-            <a:r>
-              <a:rPr lang="en-US" dirty="0" smtClean="0"/>
-              <a:t>and Data types</a:t>
+              <a:t>Variables, Data Structure (Object) Types and Data types</a:t>
             </a:r>
             <a:endParaRPr lang="en-US" dirty="0"/>
           </a:p>
@@ -3401,11 +3389,7 @@
             </a:r>
             <a:r>
               <a:rPr lang="en-US" dirty="0" smtClean="0"/>
-              <a:t>many other </a:t>
-            </a:r>
-            <a:r>
-              <a:rPr lang="en-US" dirty="0" smtClean="0"/>
-              <a:t>programming languages (e.g., C, java, </a:t>
+              <a:t>many other programming languages (e.g., C, java, </a:t>
             </a:r>
             <a:r>
               <a:rPr lang="en-US" dirty="0" err="1" smtClean="0"/>
@@ -3463,11 +3447,7 @@
             </a:r>
             <a:r>
               <a:rPr lang="en-US" dirty="0" smtClean="0"/>
-              <a:t>R-object </a:t>
-            </a:r>
-            <a:r>
-              <a:rPr lang="en-US" dirty="0" smtClean="0"/>
-              <a:t>type is </a:t>
+              <a:t>R-object type is </a:t>
             </a:r>
             <a:r>
               <a:rPr lang="en-US" dirty="0"/>
@@ -3504,11 +3484,7 @@
           <a:p>
             <a:r>
               <a:rPr lang="en-US" dirty="0" smtClean="0"/>
-              <a:t>Lists </a:t>
-            </a:r>
-            <a:r>
-              <a:rPr lang="en-US" dirty="0" smtClean="0"/>
-              <a:t>are also vectors but are not atomic vectors, meaning that they can include multiple data types and can be recursive (contain lists of lists)</a:t>
+              <a:t>Lists are also vectors but are not atomic vectors, meaning that they can include multiple data types and can be recursive (contain lists of lists)</a:t>
             </a:r>
             <a:endParaRPr lang="en-US" dirty="0"/>
           </a:p>
@@ -4429,7 +4405,6 @@
               <a:rPr lang="en-US" dirty="0" smtClean="0"/>
               <a:t>Subsets of vectors can be extracted by index values</a:t>
             </a:r>
-            <a:endParaRPr lang="en-US" dirty="0" smtClean="0"/>
           </a:p>
           <a:p>
             <a:pPr marL="457200" lvl="1" indent="0">
@@ -5010,11 +4985,7 @@
             </a:r>
             <a:r>
               <a:rPr lang="en-US" dirty="0" smtClean="0"/>
-              <a:t>() is particularly </a:t>
-            </a:r>
-            <a:r>
-              <a:rPr lang="en-US" dirty="0" smtClean="0"/>
-              <a:t>useful for simple delimited data files</a:t>
+              <a:t>() is particularly useful for simple delimited data files</a:t>
             </a:r>
           </a:p>
           <a:p>
@@ -5810,11 +5781,7 @@
           <a:p>
             <a:r>
               <a:rPr lang="en-US" dirty="0" smtClean="0"/>
-              <a:t>By convention in R, “&lt;-” is used to assig</a:t>
-            </a:r>
-            <a:r>
-              <a:rPr lang="en-US" dirty="0" smtClean="0"/>
-              <a:t>n a value to a variable and “=” is used for setting arguments in a function. For R purists, this is the preferred method.</a:t>
+              <a:t>By convention in R, “&lt;-” is used to assign a value to a variable and “=” is used for setting arguments in a function. For R purists, this is the preferred method.</a:t>
             </a:r>
           </a:p>
           <a:p>
@@ -6731,7 +6698,6 @@
               <a:rPr lang="en-US" dirty="0" smtClean="0"/>
               <a:t>ggplot2 consistently one of the top two most popular of all R packages</a:t>
             </a:r>
-            <a:endParaRPr lang="en-US" dirty="0" smtClean="0"/>
           </a:p>
         </p:txBody>
       </p:sp>
@@ -6784,11 +6750,7 @@
           <a:p>
             <a:r>
               <a:rPr lang="en-US" sz="2400" dirty="0" smtClean="0"/>
-              <a:t>Why use </a:t>
-            </a:r>
-            <a:r>
-              <a:rPr lang="en-US" sz="2400" dirty="0" smtClean="0"/>
-              <a:t>ggplot2? – “prettier” graphics in less lines of code</a:t>
+              <a:t>Why use ggplot2? – “prettier” graphics in less lines of code</a:t>
             </a:r>
             <a:endParaRPr lang="en-US" sz="2400" dirty="0"/>
           </a:p>
@@ -7559,11 +7521,7 @@
             </a:r>
             <a:r>
               <a:rPr lang="en-US" sz="2000" dirty="0" smtClean="0"/>
-              <a:t> can be used</a:t>
-            </a:r>
-            <a:r>
-              <a:rPr lang="en-US" sz="2000" dirty="0" smtClean="0"/>
-              <a:t> to create publication ready documents presenting all code (analysis), comments, and results</a:t>
+              <a:t> can be used to create publication ready documents presenting all code (analysis), comments, and results</a:t>
             </a:r>
             <a:endParaRPr lang="en-US" sz="2000" dirty="0"/>
           </a:p>
@@ -9573,11 +9531,7 @@
             </a:r>
             <a:r>
               <a:rPr lang="en-US" dirty="0" smtClean="0"/>
-              <a:t> installation </a:t>
-            </a:r>
-            <a:r>
-              <a:rPr lang="en-US" dirty="0" smtClean="0"/>
-              <a:t>is very simple</a:t>
+              <a:t> installation is very simple</a:t>
             </a:r>
           </a:p>
           <a:p>
@@ -9612,11 +9566,7 @@
             <a:pPr lvl="1"/>
             <a:r>
               <a:rPr lang="en-US" dirty="0" smtClean="0"/>
-              <a:t>Less of an issue these </a:t>
-            </a:r>
-            <a:r>
-              <a:rPr lang="en-US" dirty="0" smtClean="0"/>
-              <a:t>days</a:t>
+              <a:t>Less of an issue these days</a:t>
             </a:r>
           </a:p>
           <a:p>
@@ -10017,15 +9967,7 @@
           <a:p>
             <a:r>
               <a:rPr lang="en-US" dirty="0" smtClean="0"/>
-              <a:t>Getting help: ?, </a:t>
-            </a:r>
-            <a:r>
-              <a:rPr lang="en-US" dirty="0" smtClean="0"/>
-              <a:t>vignette(</a:t>
-            </a:r>
-            <a:r>
-              <a:rPr lang="en-US" dirty="0" smtClean="0"/>
-              <a:t>), and data()</a:t>
+              <a:t>Getting help: ?, vignette(), and data()</a:t>
             </a:r>
             <a:endParaRPr lang="en-US" dirty="0"/>
           </a:p>
@@ -10446,7 +10388,7 @@
   <a:extraClrSchemeLst/>
   <a:extLst>
     <a:ext uri="{05A4C25C-085E-4340-85A3-A5531E510DB2}">
-      <thm15:themeFamily xmlns:thm15="http://schemas.microsoft.com/office/thememl/2012/main" xmlns="" name="MGI_4-3_ratio_v1a" id="{9A0171FA-20F4-F840-B1C8-29D686AB0540}" vid="{60506783-C923-7847-B1CA-7C860CC95497}"/>
+      <thm15:themeFamily xmlns="" xmlns:thm15="http://schemas.microsoft.com/office/thememl/2012/main" name="MGI_4-3_ratio_v1a" id="{9A0171FA-20F4-F840-B1C8-29D686AB0540}" vid="{60506783-C923-7847-B1CA-7C860CC95497}"/>
     </a:ext>
   </a:extLst>
 </a:theme>

</xml_diff>

<commit_message>
minor updates to lecures 2 and 4
</commit_message>
<xml_diff>
--- a/GenViz_Module2_Lecture.pptx
+++ b/GenViz_Module2_Lecture.pptx
@@ -142,7 +142,7 @@
   </p:defaultTextStyle>
   <p:extLst>
     <p:ext uri="{EFAFB233-063F-42B5-8137-9DF3F51BA10A}">
-      <p15:sldGuideLst xmlns="" xmlns:p15="http://schemas.microsoft.com/office/powerpoint/2012/main">
+      <p15:sldGuideLst xmlns:p15="http://schemas.microsoft.com/office/powerpoint/2012/main" xmlns="">
         <p15:guide id="1" orient="horz" pos="2160">
           <p15:clr>
             <a:srgbClr val="A4A3A4"/>
@@ -242,7 +242,7 @@
             <a:fld id="{03643E35-CD80-874A-A3D7-254E954BB753}" type="datetimeFigureOut">
               <a:rPr lang="en-US" smtClean="0"/>
               <a:pPr/>
-              <a:t>9/12/17</a:t>
+              <a:t>9/13/17</a:t>
             </a:fld>
             <a:endParaRPr lang="en-US"/>
           </a:p>
@@ -409,7 +409,7 @@
             <a:fld id="{5C416C15-7665-174C-99B8-5B237ACA6582}" type="datetimeFigureOut">
               <a:rPr lang="en-US" smtClean="0"/>
               <a:pPr/>
-              <a:t>9/12/17</a:t>
+              <a:t>9/13/17</a:t>
             </a:fld>
             <a:endParaRPr lang="en-US"/>
           </a:p>
@@ -3577,14 +3577,14 @@
             <p:ph idx="1"/>
             <p:extLst>
               <p:ext uri="{D42A27DB-BD31-4B8C-83A1-F6EECF244321}">
-                <p14:modId xmlns:p14="http://schemas.microsoft.com/office/powerpoint/2010/main" val="232311003"/>
+                <p14:modId xmlns:p14="http://schemas.microsoft.com/office/powerpoint/2010/main" val="3172606269"/>
               </p:ext>
             </p:extLst>
           </p:nvPr>
         </p:nvGraphicFramePr>
         <p:xfrm>
           <a:off x="379415" y="1269960"/>
-          <a:ext cx="8552861" cy="4145280"/>
+          <a:ext cx="8552861" cy="4785360"/>
         </p:xfrm>
         <a:graphic>
           <a:graphicData uri="http://schemas.openxmlformats.org/drawingml/2006/table">
@@ -3816,7 +3816,11 @@
                       <a:pPr algn="ctr"/>
                       <a:r>
                         <a:rPr lang="en-US" dirty="0" smtClean="0"/>
-                        <a:t>x &lt;- “a”</a:t>
+                        <a:t>x &lt;- </a:t>
+                      </a:r>
+                      <a:r>
+                        <a:rPr lang="en-US" dirty="0" smtClean="0"/>
+                        <a:t>“foo”</a:t>
                       </a:r>
                       <a:endParaRPr lang="en-US" dirty="0"/>
                     </a:p>
@@ -3960,7 +3964,15 @@
                       </a:r>
                       <a:r>
                         <a:rPr lang="en-US" dirty="0" smtClean="0"/>
-                        <a:t>(“a”)</a:t>
+                        <a:t>(</a:t>
+                      </a:r>
+                      <a:r>
+                        <a:rPr lang="en-US" dirty="0" smtClean="0"/>
+                        <a:t>“foo”</a:t>
+                      </a:r>
+                      <a:r>
+                        <a:rPr lang="en-US" dirty="0" smtClean="0"/>
+                        <a:t>)</a:t>
                       </a:r>
                       <a:endParaRPr lang="en-US" dirty="0"/>
                     </a:p>
@@ -4091,6 +4103,91 @@
                     <a:p>
                       <a:pPr algn="ctr"/>
                       <a:r>
+                        <a:rPr lang="en-US" dirty="0" smtClean="0"/>
+                        <a:t>x &lt;- factor(c("</a:t>
+                      </a:r>
+                      <a:r>
+                        <a:rPr lang="en-US" dirty="0" err="1" smtClean="0"/>
+                        <a:t>foo","bar","bar</a:t>
+                      </a:r>
+                      <a:r>
+                        <a:rPr lang="en-US" dirty="0" smtClean="0"/>
+                        <a:t>"))</a:t>
+                      </a:r>
+                      <a:endParaRPr lang="en-US" dirty="0"/>
+                    </a:p>
+                  </a:txBody>
+                  <a:tcPr anchor="ctr"/>
+                </a:tc>
+                <a:tc>
+                  <a:txBody>
+                    <a:bodyPr/>
+                    <a:lstStyle/>
+                    <a:p>
+                      <a:pPr algn="ctr"/>
+                      <a:r>
+                        <a:rPr lang="en-US" dirty="0" smtClean="0"/>
+                        <a:t>factor</a:t>
+                      </a:r>
+                      <a:endParaRPr lang="en-US" dirty="0"/>
+                    </a:p>
+                  </a:txBody>
+                  <a:tcPr anchor="ctr"/>
+                </a:tc>
+                <a:tc>
+                  <a:txBody>
+                    <a:bodyPr/>
+                    <a:lstStyle/>
+                    <a:p>
+                      <a:pPr algn="ctr"/>
+                      <a:r>
+                        <a:rPr lang="en-US" dirty="0" smtClean="0"/>
+                        <a:t>integer</a:t>
+                      </a:r>
+                      <a:endParaRPr lang="en-US" dirty="0"/>
+                    </a:p>
+                  </a:txBody>
+                  <a:tcPr anchor="ctr"/>
+                </a:tc>
+                <a:tc>
+                  <a:txBody>
+                    <a:bodyPr/>
+                    <a:lstStyle/>
+                    <a:p>
+                      <a:pPr algn="ctr"/>
+                      <a:r>
+                        <a:rPr lang="en-US" dirty="0" err="1" smtClean="0"/>
+                        <a:t>is.factor</a:t>
+                      </a:r>
+                      <a:r>
+                        <a:rPr lang="en-US" dirty="0" smtClean="0"/>
+                        <a:t>(x)=TRUE</a:t>
+                      </a:r>
+                      <a:br>
+                        <a:rPr lang="en-US" dirty="0" smtClean="0"/>
+                      </a:br>
+                      <a:r>
+                        <a:rPr lang="en-US" dirty="0" err="1" smtClean="0"/>
+                        <a:t>is.integer</a:t>
+                      </a:r>
+                      <a:r>
+                        <a:rPr lang="en-US" smtClean="0"/>
+                        <a:t>(x)=TRUE</a:t>
+                      </a:r>
+                      <a:endParaRPr lang="en-US" dirty="0"/>
+                    </a:p>
+                  </a:txBody>
+                  <a:tcPr anchor="ctr"/>
+                </a:tc>
+              </a:tr>
+              <a:tr h="370840">
+                <a:tc>
+                  <a:txBody>
+                    <a:bodyPr/>
+                    <a:lstStyle/>
+                    <a:p>
+                      <a:pPr algn="ctr"/>
+                      <a:r>
                         <a:rPr lang="it-IT" dirty="0" smtClean="0"/>
                         <a:t>x &lt;- </a:t>
                       </a:r>
@@ -4193,7 +4290,31 @@
                       </a:r>
                       <a:r>
                         <a:rPr lang="es-ES_tradnl" dirty="0" smtClean="0"/>
-                        <a:t>(x=1:2, y=c(“a”, “b”))</a:t>
+                        <a:t>(x=1:2, y=c(</a:t>
+                      </a:r>
+                      <a:r>
+                        <a:rPr lang="es-ES_tradnl" dirty="0" smtClean="0"/>
+                        <a:t>“</a:t>
+                      </a:r>
+                      <a:r>
+                        <a:rPr lang="es-ES_tradnl" dirty="0" err="1" smtClean="0"/>
+                        <a:t>foo</a:t>
+                      </a:r>
+                      <a:r>
+                        <a:rPr lang="es-ES_tradnl" dirty="0" smtClean="0"/>
+                        <a:t>”</a:t>
+                      </a:r>
+                      <a:r>
+                        <a:rPr lang="es-ES_tradnl" dirty="0" smtClean="0"/>
+                        <a:t>, “</a:t>
+                      </a:r>
+                      <a:r>
+                        <a:rPr lang="es-ES_tradnl" dirty="0" smtClean="0"/>
+                        <a:t>bar”</a:t>
+                      </a:r>
+                      <a:r>
+                        <a:rPr lang="es-ES_tradnl" dirty="0" smtClean="0"/>
+                        <a:t>))</a:t>
                       </a:r>
                       <a:endParaRPr lang="en-US" dirty="0"/>
                     </a:p>
@@ -10388,7 +10509,7 @@
   <a:extraClrSchemeLst/>
   <a:extLst>
     <a:ext uri="{05A4C25C-085E-4340-85A3-A5531E510DB2}">
-      <thm15:themeFamily xmlns="" xmlns:thm15="http://schemas.microsoft.com/office/thememl/2012/main" name="MGI_4-3_ratio_v1a" id="{9A0171FA-20F4-F840-B1C8-29D686AB0540}" vid="{60506783-C923-7847-B1CA-7C860CC95497}"/>
+      <thm15:themeFamily xmlns:thm15="http://schemas.microsoft.com/office/thememl/2012/main" xmlns="" name="MGI_4-3_ratio_v1a" id="{9A0171FA-20F4-F840-B1C8-29D686AB0540}" vid="{60506783-C923-7847-B1CA-7C860CC95497}"/>
     </a:ext>
   </a:extLst>
 </a:theme>

</xml_diff>

<commit_message>
minor updates to lecture 2
</commit_message>
<xml_diff>
--- a/GenViz_Module2_Lecture.pptx
+++ b/GenViz_Module2_Lecture.pptx
@@ -142,7 +142,7 @@
   </p:defaultTextStyle>
   <p:extLst>
     <p:ext uri="{EFAFB233-063F-42B5-8137-9DF3F51BA10A}">
-      <p15:sldGuideLst xmlns:p15="http://schemas.microsoft.com/office/powerpoint/2012/main" xmlns="">
+      <p15:sldGuideLst xmlns:p15="http://schemas.microsoft.com/office/powerpoint/2012/main">
         <p15:guide id="1" orient="horz" pos="2160">
           <p15:clr>
             <a:srgbClr val="A4A3A4"/>
@@ -242,7 +242,7 @@
             <a:fld id="{03643E35-CD80-874A-A3D7-254E954BB753}" type="datetimeFigureOut">
               <a:rPr lang="en-US" smtClean="0"/>
               <a:pPr/>
-              <a:t>9/13/17</a:t>
+              <a:t>4/8/19</a:t>
             </a:fld>
             <a:endParaRPr lang="en-US"/>
           </a:p>
@@ -409,7 +409,7 @@
             <a:fld id="{5C416C15-7665-174C-99B8-5B237ACA6582}" type="datetimeFigureOut">
               <a:rPr lang="en-US" smtClean="0"/>
               <a:pPr/>
-              <a:t>9/13/17</a:t>
+              <a:t>4/8/19</a:t>
             </a:fld>
             <a:endParaRPr lang="en-US"/>
           </a:p>
@@ -475,38 +475,37 @@
           <a:p>
             <a:pPr lvl="0"/>
             <a:r>
-              <a:rPr lang="en-US" smtClean="0"/>
+              <a:rPr lang="en-US"/>
               <a:t>Click to edit Master text styles</a:t>
             </a:r>
           </a:p>
           <a:p>
             <a:pPr lvl="1"/>
             <a:r>
-              <a:rPr lang="en-US" smtClean="0"/>
+              <a:rPr lang="en-US"/>
               <a:t>Second level</a:t>
             </a:r>
           </a:p>
           <a:p>
             <a:pPr lvl="2"/>
             <a:r>
-              <a:rPr lang="en-US" smtClean="0"/>
+              <a:rPr lang="en-US"/>
               <a:t>Third level</a:t>
             </a:r>
           </a:p>
           <a:p>
             <a:pPr lvl="3"/>
             <a:r>
-              <a:rPr lang="en-US" smtClean="0"/>
+              <a:rPr lang="en-US"/>
               <a:t>Fourth level</a:t>
             </a:r>
           </a:p>
           <a:p>
             <a:pPr lvl="4"/>
             <a:r>
-              <a:rPr lang="en-US" smtClean="0"/>
+              <a:rPr lang="en-US"/>
               <a:t>Fifth level</a:t>
             </a:r>
-            <a:endParaRPr lang="en-US"/>
           </a:p>
         </p:txBody>
       </p:sp>
@@ -729,11 +728,11 @@
               <a:buChar char="•"/>
             </a:pPr>
             <a:r>
-              <a:rPr lang="en-US" dirty="0" smtClean="0"/>
+              <a:rPr lang="en-US" dirty="0"/>
               <a:t>Note there</a:t>
             </a:r>
             <a:r>
-              <a:rPr lang="en-US" baseline="0" dirty="0" smtClean="0"/>
+              <a:rPr lang="en-US" baseline="0" dirty="0"/>
               <a:t> are two licenses if effect for this course. </a:t>
             </a:r>
           </a:p>
@@ -743,31 +742,31 @@
               <a:buChar char="•"/>
             </a:pPr>
             <a:r>
-              <a:rPr lang="en-US" baseline="0" dirty="0" smtClean="0"/>
+              <a:rPr lang="en-US" baseline="0" dirty="0"/>
               <a:t>All *content* (lectures, written materials, etc.) are made available under the Creative Commons Attribution-</a:t>
             </a:r>
             <a:r>
-              <a:rPr lang="en-US" baseline="0" dirty="0" err="1" smtClean="0"/>
+              <a:rPr lang="en-US" baseline="0" dirty="0" err="1"/>
               <a:t>ShareAlike</a:t>
             </a:r>
             <a:r>
-              <a:rPr lang="en-US" baseline="0" dirty="0" smtClean="0"/>
+              <a:rPr lang="en-US" baseline="0" dirty="0"/>
               <a:t> 4.0 International (CC BY-SA 4.0). (https://</a:t>
             </a:r>
             <a:r>
-              <a:rPr lang="en-US" baseline="0" dirty="0" err="1" smtClean="0"/>
+              <a:rPr lang="en-US" baseline="0" dirty="0" err="1"/>
               <a:t>creativecommons.org</a:t>
             </a:r>
             <a:r>
-              <a:rPr lang="en-US" baseline="0" dirty="0" smtClean="0"/>
+              <a:rPr lang="en-US" baseline="0" dirty="0"/>
               <a:t>/licenses/by-</a:t>
             </a:r>
             <a:r>
-              <a:rPr lang="en-US" baseline="0" dirty="0" err="1" smtClean="0"/>
+              <a:rPr lang="en-US" baseline="0" dirty="0" err="1"/>
               <a:t>sa</a:t>
             </a:r>
             <a:r>
-              <a:rPr lang="en-US" baseline="0" dirty="0" smtClean="0"/>
+              <a:rPr lang="en-US" baseline="0" dirty="0"/>
               <a:t>/4.0/).</a:t>
             </a:r>
           </a:p>
@@ -777,15 +776,15 @@
               <a:buChar char="•"/>
             </a:pPr>
             <a:r>
-              <a:rPr lang="en-US" baseline="0" dirty="0" smtClean="0"/>
+              <a:rPr lang="en-US" baseline="0" dirty="0"/>
               <a:t>All *code* (R scripts the website code itself) are made available under the MIT License (https://</a:t>
             </a:r>
             <a:r>
-              <a:rPr lang="en-US" baseline="0" dirty="0" err="1" smtClean="0"/>
+              <a:rPr lang="en-US" baseline="0" dirty="0" err="1"/>
               <a:t>opensource.org</a:t>
             </a:r>
             <a:r>
-              <a:rPr lang="en-US" baseline="0" dirty="0" smtClean="0"/>
+              <a:rPr lang="en-US" baseline="0" dirty="0"/>
               <a:t>/licenses/MIT).</a:t>
             </a:r>
             <a:endParaRPr lang="en-US" dirty="0"/>
@@ -893,7 +892,7 @@
           </a:lstStyle>
           <a:p>
             <a:r>
-              <a:rPr lang="en-US" smtClean="0"/>
+              <a:rPr lang="en-US"/>
               <a:t>Click to edit Master title style</a:t>
             </a:r>
             <a:endParaRPr lang="en-US" dirty="0"/>
@@ -1015,7 +1014,7 @@
           </a:lstStyle>
           <a:p>
             <a:r>
-              <a:rPr lang="en-US" smtClean="0"/>
+              <a:rPr lang="en-US"/>
               <a:t>Click to edit Master subtitle style</a:t>
             </a:r>
             <a:endParaRPr lang="en-US" dirty="0"/>
@@ -1050,7 +1049,7 @@
           </a:lstStyle>
           <a:p>
             <a:r>
-              <a:rPr lang="en-US" smtClean="0"/>
+              <a:rPr lang="en-US"/>
               <a:t>Presenter &lt;address@genome.wustl.edu&gt;</a:t>
             </a:r>
             <a:endParaRPr lang="en-US" dirty="0"/>
@@ -1067,13 +1066,6 @@
   <p:clrMapOvr>
     <a:masterClrMapping/>
   </p:clrMapOvr>
-  <p:timing>
-    <p:tnLst>
-      <p:par>
-        <p:cTn xmlns:p14="http://schemas.microsoft.com/office/powerpoint/2010/main" id="1" dur="indefinite" restart="never" nodeType="tmRoot"/>
-      </p:par>
-    </p:tnLst>
-  </p:timing>
 </p:sldLayout>
 </file>
 
@@ -1110,7 +1102,7 @@
           <a:lstStyle/>
           <a:p>
             <a:r>
-              <a:rPr lang="en-US" smtClean="0"/>
+              <a:rPr lang="en-US"/>
               <a:t>Click to edit Master title style</a:t>
             </a:r>
             <a:endParaRPr lang="en-US" dirty="0"/>
@@ -1140,7 +1132,7 @@
           </a:lstStyle>
           <a:p>
             <a:r>
-              <a:rPr lang="en-US" smtClean="0"/>
+              <a:rPr lang="en-US"/>
               <a:t>Presenter &lt;address@genome.wustl.edu&gt;</a:t>
             </a:r>
             <a:endParaRPr lang="en-US" dirty="0"/>
@@ -1174,35 +1166,35 @@
           <a:p>
             <a:pPr lvl="0"/>
             <a:r>
-              <a:rPr lang="en-US" smtClean="0"/>
+              <a:rPr lang="en-US"/>
               <a:t>Click to edit Master text styles</a:t>
             </a:r>
           </a:p>
           <a:p>
             <a:pPr lvl="1"/>
             <a:r>
-              <a:rPr lang="en-US" smtClean="0"/>
+              <a:rPr lang="en-US"/>
               <a:t>Second level</a:t>
             </a:r>
           </a:p>
           <a:p>
             <a:pPr lvl="2"/>
             <a:r>
-              <a:rPr lang="en-US" smtClean="0"/>
+              <a:rPr lang="en-US"/>
               <a:t>Third level</a:t>
             </a:r>
           </a:p>
           <a:p>
             <a:pPr lvl="3"/>
             <a:r>
-              <a:rPr lang="en-US" smtClean="0"/>
+              <a:rPr lang="en-US"/>
               <a:t>Fourth level</a:t>
             </a:r>
           </a:p>
           <a:p>
             <a:pPr lvl="4"/>
             <a:r>
-              <a:rPr lang="en-US" smtClean="0"/>
+              <a:rPr lang="en-US"/>
               <a:t>Fifth level</a:t>
             </a:r>
             <a:endParaRPr lang="en-US" dirty="0"/>
@@ -1277,7 +1269,7 @@
           </a:lstStyle>
           <a:p>
             <a:r>
-              <a:rPr lang="en-US" smtClean="0"/>
+              <a:rPr lang="en-US"/>
               <a:t>Click to edit Master title style</a:t>
             </a:r>
             <a:endParaRPr lang="en-US" dirty="0"/>
@@ -1300,7 +1292,7 @@
           <a:lstStyle/>
           <a:p>
             <a:r>
-              <a:rPr lang="en-US" smtClean="0"/>
+              <a:rPr lang="en-US"/>
               <a:t>Presenter &lt;address@genome.wustl.edu&gt;</a:t>
             </a:r>
             <a:endParaRPr lang="en-US" dirty="0"/>
@@ -1375,10 +1367,9 @@
           </a:lstStyle>
           <a:p>
             <a:r>
-              <a:rPr lang="en-US" dirty="0" smtClean="0"/>
+              <a:rPr lang="en-US" dirty="0"/>
               <a:t>Click to edit Master section title style</a:t>
             </a:r>
-            <a:endParaRPr lang="en-US" dirty="0"/>
           </a:p>
         </p:txBody>
       </p:sp>
@@ -1497,7 +1488,7 @@
           <a:p>
             <a:pPr lvl="0"/>
             <a:r>
-              <a:rPr lang="en-US" dirty="0" smtClean="0"/>
+              <a:rPr lang="en-US" dirty="0"/>
               <a:t>Click to edit Master section subtitle styles</a:t>
             </a:r>
           </a:p>
@@ -1526,7 +1517,7 @@
           </a:lstStyle>
           <a:p>
             <a:r>
-              <a:rPr lang="en-US" smtClean="0"/>
+              <a:rPr lang="en-US"/>
               <a:t>Presenter &lt;address@genome.wustl.edu&gt;</a:t>
             </a:r>
             <a:endParaRPr lang="en-US" dirty="0"/>
@@ -1579,7 +1570,7 @@
           <a:lstStyle/>
           <a:p>
             <a:r>
-              <a:rPr lang="en-US" smtClean="0"/>
+              <a:rPr lang="en-US"/>
               <a:t>Click to edit Master title style</a:t>
             </a:r>
             <a:endParaRPr lang="en-US" dirty="0"/>
@@ -1636,35 +1627,35 @@
           <a:p>
             <a:pPr lvl="0"/>
             <a:r>
-              <a:rPr lang="en-US" smtClean="0"/>
+              <a:rPr lang="en-US"/>
               <a:t>Click to edit Master text styles</a:t>
             </a:r>
           </a:p>
           <a:p>
             <a:pPr lvl="1"/>
             <a:r>
-              <a:rPr lang="en-US" smtClean="0"/>
+              <a:rPr lang="en-US"/>
               <a:t>Second level</a:t>
             </a:r>
           </a:p>
           <a:p>
             <a:pPr lvl="2"/>
             <a:r>
-              <a:rPr lang="en-US" smtClean="0"/>
+              <a:rPr lang="en-US"/>
               <a:t>Third level</a:t>
             </a:r>
           </a:p>
           <a:p>
             <a:pPr lvl="3"/>
             <a:r>
-              <a:rPr lang="en-US" smtClean="0"/>
+              <a:rPr lang="en-US"/>
               <a:t>Fourth level</a:t>
             </a:r>
           </a:p>
           <a:p>
             <a:pPr lvl="4"/>
             <a:r>
-              <a:rPr lang="en-US" smtClean="0"/>
+              <a:rPr lang="en-US"/>
               <a:t>Fifth level</a:t>
             </a:r>
             <a:endParaRPr lang="en-US" dirty="0"/>
@@ -1721,35 +1712,35 @@
           <a:p>
             <a:pPr lvl="0"/>
             <a:r>
-              <a:rPr lang="en-US" smtClean="0"/>
+              <a:rPr lang="en-US"/>
               <a:t>Click to edit Master text styles</a:t>
             </a:r>
           </a:p>
           <a:p>
             <a:pPr lvl="1"/>
             <a:r>
-              <a:rPr lang="en-US" smtClean="0"/>
+              <a:rPr lang="en-US"/>
               <a:t>Second level</a:t>
             </a:r>
           </a:p>
           <a:p>
             <a:pPr lvl="2"/>
             <a:r>
-              <a:rPr lang="en-US" smtClean="0"/>
+              <a:rPr lang="en-US"/>
               <a:t>Third level</a:t>
             </a:r>
           </a:p>
           <a:p>
             <a:pPr lvl="3"/>
             <a:r>
-              <a:rPr lang="en-US" smtClean="0"/>
+              <a:rPr lang="en-US"/>
               <a:t>Fourth level</a:t>
             </a:r>
           </a:p>
           <a:p>
             <a:pPr lvl="4"/>
             <a:r>
-              <a:rPr lang="en-US" smtClean="0"/>
+              <a:rPr lang="en-US"/>
               <a:t>Fifth level</a:t>
             </a:r>
             <a:endParaRPr lang="en-US" dirty="0"/>
@@ -1772,7 +1763,7 @@
           <a:lstStyle/>
           <a:p>
             <a:r>
-              <a:rPr lang="en-US" smtClean="0"/>
+              <a:rPr lang="en-US"/>
               <a:t>Presenter &lt;address@genome.wustl.edu&gt;</a:t>
             </a:r>
             <a:endParaRPr lang="en-US" dirty="0"/>
@@ -1825,10 +1816,9 @@
           <a:lstStyle/>
           <a:p>
             <a:r>
-              <a:rPr lang="en-US" smtClean="0"/>
+              <a:rPr lang="en-US"/>
               <a:t>Click to edit Master title style</a:t>
             </a:r>
-            <a:endParaRPr lang="en-US"/>
           </a:p>
         </p:txBody>
       </p:sp>
@@ -1848,7 +1838,7 @@
           <a:lstStyle/>
           <a:p>
             <a:r>
-              <a:rPr lang="en-US" smtClean="0"/>
+              <a:rPr lang="en-US"/>
               <a:t>Presenter &lt;address@genome.wustl.edu&gt;</a:t>
             </a:r>
             <a:endParaRPr lang="en-US" dirty="0"/>
@@ -1912,7 +1902,7 @@
           <a:lstStyle/>
           <a:p>
             <a:r>
-              <a:rPr lang="en-US" smtClean="0"/>
+              <a:rPr lang="en-US"/>
               <a:t>Presenter &lt;address@genome.wustl.edu&gt;</a:t>
             </a:r>
             <a:endParaRPr lang="en-US" dirty="0"/>
@@ -1987,7 +1977,7 @@
           </a:lstStyle>
           <a:p>
             <a:r>
-              <a:rPr lang="en-US" smtClean="0"/>
+              <a:rPr lang="en-US"/>
               <a:t>Click to edit Master title style</a:t>
             </a:r>
             <a:endParaRPr lang="en-US" dirty="0"/>
@@ -2044,35 +2034,35 @@
           <a:p>
             <a:pPr lvl="0"/>
             <a:r>
-              <a:rPr lang="en-US" smtClean="0"/>
+              <a:rPr lang="en-US"/>
               <a:t>Click to edit Master text styles</a:t>
             </a:r>
           </a:p>
           <a:p>
             <a:pPr lvl="1"/>
             <a:r>
-              <a:rPr lang="en-US" smtClean="0"/>
+              <a:rPr lang="en-US"/>
               <a:t>Second level</a:t>
             </a:r>
           </a:p>
           <a:p>
             <a:pPr lvl="2"/>
             <a:r>
-              <a:rPr lang="en-US" smtClean="0"/>
+              <a:rPr lang="en-US"/>
               <a:t>Third level</a:t>
             </a:r>
           </a:p>
           <a:p>
             <a:pPr lvl="3"/>
             <a:r>
-              <a:rPr lang="en-US" smtClean="0"/>
+              <a:rPr lang="en-US"/>
               <a:t>Fourth level</a:t>
             </a:r>
           </a:p>
           <a:p>
             <a:pPr lvl="4"/>
             <a:r>
-              <a:rPr lang="en-US" smtClean="0"/>
+              <a:rPr lang="en-US"/>
               <a:t>Fifth level</a:t>
             </a:r>
             <a:endParaRPr lang="en-US" dirty="0"/>
@@ -2140,7 +2130,7 @@
           <a:p>
             <a:pPr lvl="0"/>
             <a:r>
-              <a:rPr lang="en-US" smtClean="0"/>
+              <a:rPr lang="en-US"/>
               <a:t>Click to edit Master text styles</a:t>
             </a:r>
           </a:p>
@@ -2162,7 +2152,7 @@
           <a:lstStyle/>
           <a:p>
             <a:r>
-              <a:rPr lang="en-US" smtClean="0"/>
+              <a:rPr lang="en-US"/>
               <a:t>Presenter &lt;address@genome.wustl.edu&gt;</a:t>
             </a:r>
             <a:endParaRPr lang="en-US" dirty="0"/>
@@ -2235,10 +2225,9 @@
           </a:lstStyle>
           <a:p>
             <a:r>
-              <a:rPr lang="en-US" smtClean="0"/>
+              <a:rPr lang="en-US"/>
               <a:t>Click to edit Master title style</a:t>
             </a:r>
-            <a:endParaRPr lang="en-US"/>
           </a:p>
         </p:txBody>
       </p:sp>
@@ -2302,7 +2291,7 @@
           </a:lstStyle>
           <a:p>
             <a:r>
-              <a:rPr lang="en-US" smtClean="0"/>
+              <a:rPr lang="en-US"/>
               <a:t>Drag picture to placeholder or click icon to add</a:t>
             </a:r>
             <a:endParaRPr lang="en-US" dirty="0"/>
@@ -2368,7 +2357,7 @@
           <a:p>
             <a:pPr lvl="0"/>
             <a:r>
-              <a:rPr lang="en-US" smtClean="0"/>
+              <a:rPr lang="en-US"/>
               <a:t>Click to edit Master text styles</a:t>
             </a:r>
           </a:p>
@@ -2390,18 +2379,17 @@
           <a:lstStyle/>
           <a:p>
             <a:r>
-              <a:rPr lang="en-US" dirty="0" smtClean="0"/>
+              <a:rPr lang="en-US" dirty="0"/>
               <a:t>Presenter &lt;</a:t>
             </a:r>
             <a:r>
-              <a:rPr lang="en-US" dirty="0" err="1" smtClean="0"/>
+              <a:rPr lang="en-US" dirty="0" err="1"/>
               <a:t>address@genome.wustl.edu</a:t>
             </a:r>
             <a:r>
-              <a:rPr lang="en-US" dirty="0" smtClean="0"/>
+              <a:rPr lang="en-US" dirty="0"/>
               <a:t>&gt;</a:t>
             </a:r>
-            <a:endParaRPr lang="en-US" dirty="0"/>
           </a:p>
         </p:txBody>
       </p:sp>
@@ -2472,7 +2460,7 @@
           <a:lstStyle/>
           <a:p>
             <a:r>
-              <a:rPr lang="en-US" smtClean="0"/>
+              <a:rPr lang="en-US"/>
               <a:t>Click to edit Master title style</a:t>
             </a:r>
             <a:endParaRPr lang="en-US" dirty="0"/>
@@ -2506,35 +2494,35 @@
           <a:p>
             <a:pPr lvl="0"/>
             <a:r>
-              <a:rPr lang="en-US" smtClean="0"/>
+              <a:rPr lang="en-US"/>
               <a:t>Click to edit Master text styles</a:t>
             </a:r>
           </a:p>
           <a:p>
             <a:pPr lvl="1"/>
             <a:r>
-              <a:rPr lang="en-US" smtClean="0"/>
+              <a:rPr lang="en-US"/>
               <a:t>Second level</a:t>
             </a:r>
           </a:p>
           <a:p>
             <a:pPr lvl="2"/>
             <a:r>
-              <a:rPr lang="en-US" smtClean="0"/>
+              <a:rPr lang="en-US"/>
               <a:t>Third level</a:t>
             </a:r>
           </a:p>
           <a:p>
             <a:pPr lvl="3"/>
             <a:r>
-              <a:rPr lang="en-US" smtClean="0"/>
+              <a:rPr lang="en-US"/>
               <a:t>Fourth level</a:t>
             </a:r>
           </a:p>
           <a:p>
             <a:pPr lvl="4"/>
             <a:r>
-              <a:rPr lang="en-US" smtClean="0"/>
+              <a:rPr lang="en-US"/>
               <a:t>Fifth level</a:t>
             </a:r>
             <a:endParaRPr lang="en-US" dirty="0"/>
@@ -2577,7 +2565,7 @@
           </a:lstStyle>
           <a:p>
             <a:r>
-              <a:rPr lang="en-US" smtClean="0"/>
+              <a:rPr lang="en-US"/>
               <a:t>Presenter &lt;address@genome.wustl.edu&gt;</a:t>
             </a:r>
             <a:endParaRPr lang="en-US" dirty="0"/>
@@ -2970,37 +2958,20 @@
           <a:lstStyle/>
           <a:p>
             <a:r>
-              <a:rPr lang="en-US" dirty="0" err="1" smtClean="0"/>
+              <a:rPr lang="en-US" dirty="0" err="1"/>
               <a:t>GenViz</a:t>
             </a:r>
             <a:r>
-              <a:rPr lang="en-US" dirty="0" smtClean="0"/>
+              <a:rPr lang="en-US" dirty="0"/>
               <a:t> Module 2:</a:t>
             </a:r>
             <a:br>
-              <a:rPr lang="en-US" dirty="0" smtClean="0"/>
+              <a:rPr lang="en-US" dirty="0"/>
             </a:br>
             <a:r>
-              <a:rPr lang="en-US" dirty="0" smtClean="0"/>
-              <a:t>Using R for genomic </a:t>
-            </a:r>
-            <a:r>
-              <a:rPr lang="en-US" dirty="0"/>
-              <a:t>d</a:t>
-            </a:r>
-            <a:r>
-              <a:rPr lang="en-US" dirty="0" smtClean="0"/>
-              <a:t>ata </a:t>
-            </a:r>
-            <a:r>
-              <a:rPr lang="en-US" dirty="0"/>
-              <a:t>v</a:t>
-            </a:r>
-            <a:r>
-              <a:rPr lang="en-US" dirty="0" smtClean="0"/>
-              <a:t>isualization and interpretation</a:t>
-            </a:r>
-            <a:endParaRPr lang="en-US" dirty="0"/>
+              <a:rPr lang="en-US" dirty="0"/>
+              <a:t>Using R for genomic data visualization and interpretation</a:t>
+            </a:r>
           </a:p>
         </p:txBody>
       </p:sp>
@@ -3028,38 +2999,34 @@
           <a:p>
             <a:pPr algn="r"/>
             <a:r>
-              <a:rPr lang="en-US" sz="1800" dirty="0" smtClean="0"/>
+              <a:rPr lang="en-US" sz="1800" dirty="0"/>
               <a:t>Malachi Griffith, Obi Griffith, Zachary Skidmore</a:t>
             </a:r>
           </a:p>
           <a:p>
             <a:pPr algn="r"/>
             <a:r>
-              <a:rPr lang="en-US" sz="1800" dirty="0" smtClean="0"/>
+              <a:rPr lang="en-US" sz="1800" dirty="0"/>
               <a:t>Genomic Data Visualization and Interpretation</a:t>
             </a:r>
           </a:p>
           <a:p>
             <a:pPr algn="r"/>
             <a:r>
-              <a:rPr lang="en-US" sz="1800" dirty="0" smtClean="0"/>
-              <a:t>September 11-15, 2017</a:t>
+              <a:rPr lang="en-US" sz="1800" dirty="0"/>
+              <a:t>April 8-12, 2019</a:t>
             </a:r>
           </a:p>
           <a:p>
             <a:pPr algn="r"/>
             <a:r>
-              <a:rPr lang="en-US" sz="1800" dirty="0" smtClean="0"/>
-              <a:t>Berlin </a:t>
-            </a:r>
-          </a:p>
-          <a:p>
-            <a:pPr algn="r"/>
-            <a:endParaRPr lang="en-US" sz="1800" dirty="0" smtClean="0"/>
-          </a:p>
-          <a:p>
-            <a:pPr algn="r"/>
-            <a:endParaRPr lang="en-US" sz="1800" dirty="0"/>
+              <a:rPr lang="en-US" sz="1800" dirty="0" err="1"/>
+              <a:t>Freie</a:t>
+            </a:r>
+            <a:r>
+              <a:rPr lang="en-US" sz="1800" dirty="0"/>
+              <a:t> Universität Berlin</a:t>
+            </a:r>
           </a:p>
         </p:txBody>
       </p:sp>
@@ -3148,13 +3115,6 @@
   <p:clrMapOvr>
     <a:masterClrMapping/>
   </p:clrMapOvr>
-  <p:timing>
-    <p:tnLst>
-      <p:par>
-        <p:cTn xmlns:p14="http://schemas.microsoft.com/office/powerpoint/2010/main" id="1" dur="indefinite" restart="never" nodeType="tmRoot"/>
-      </p:par>
-    </p:tnLst>
-  </p:timing>
 </p:sld>
 </file>
 
@@ -3198,31 +3158,31 @@
           <a:lstStyle/>
           <a:p>
             <a:r>
-              <a:rPr lang="en-US" sz="2000" dirty="0" err="1" smtClean="0"/>
+              <a:rPr lang="en-US" sz="2000" dirty="0" err="1"/>
               <a:t>Rseek.org</a:t>
             </a:r>
             <a:r>
-              <a:rPr lang="en-US" sz="2000" dirty="0" smtClean="0"/>
+              <a:rPr lang="en-US" sz="2000" dirty="0"/>
               <a:t> to search CRAN, r-bloggers, </a:t>
             </a:r>
             <a:r>
-              <a:rPr lang="en-US" sz="2000" dirty="0" err="1" smtClean="0"/>
+              <a:rPr lang="en-US" sz="2000" dirty="0" err="1"/>
               <a:t>support.rstudio.com</a:t>
             </a:r>
             <a:r>
-              <a:rPr lang="en-US" sz="2000" dirty="0" smtClean="0"/>
+              <a:rPr lang="en-US" sz="2000" dirty="0"/>
               <a:t>, </a:t>
             </a:r>
             <a:r>
-              <a:rPr lang="en-US" sz="2000" dirty="0" err="1" smtClean="0"/>
+              <a:rPr lang="en-US" sz="2000" dirty="0" err="1"/>
               <a:t>rpubs.com</a:t>
             </a:r>
             <a:r>
-              <a:rPr lang="en-US" sz="2000" dirty="0" smtClean="0"/>
+              <a:rPr lang="en-US" sz="2000" dirty="0"/>
               <a:t>, </a:t>
             </a:r>
             <a:r>
-              <a:rPr lang="en-US" sz="2000" dirty="0" err="1" smtClean="0"/>
+              <a:rPr lang="en-US" sz="2000" dirty="0" err="1"/>
               <a:t>etc</a:t>
             </a:r>
             <a:endParaRPr lang="en-US" sz="2000" dirty="0"/>
@@ -3302,10 +3262,9 @@
           <a:lstStyle/>
           <a:p>
             <a:r>
-              <a:rPr lang="en-US" dirty="0" smtClean="0"/>
+              <a:rPr lang="en-US" dirty="0"/>
               <a:t>Variables, Data Structure (Object) Types and Data types</a:t>
             </a:r>
-            <a:endParaRPr lang="en-US" dirty="0"/>
           </a:p>
         </p:txBody>
       </p:sp>
@@ -3327,177 +3286,69 @@
           <a:lstStyle/>
           <a:p>
             <a:r>
-              <a:rPr lang="en-US" dirty="0" smtClean="0"/>
-              <a:t>As with any </a:t>
-            </a:r>
-            <a:r>
-              <a:rPr lang="en-US" dirty="0"/>
-              <a:t>programming language, you need to use </a:t>
-            </a:r>
-            <a:r>
-              <a:rPr lang="en-US" dirty="0" smtClean="0"/>
-              <a:t>variables </a:t>
-            </a:r>
-            <a:r>
-              <a:rPr lang="en-US" dirty="0"/>
-              <a:t>to store </a:t>
-            </a:r>
-            <a:r>
-              <a:rPr lang="en-US" dirty="0" smtClean="0"/>
-              <a:t>information</a:t>
-            </a:r>
-            <a:r>
-              <a:rPr lang="en-US" dirty="0"/>
-              <a:t>. </a:t>
-            </a:r>
-            <a:r>
-              <a:rPr lang="en-US" dirty="0" smtClean="0"/>
-              <a:t>When </a:t>
-            </a:r>
-            <a:r>
-              <a:rPr lang="en-US" dirty="0"/>
-              <a:t>you create a variable you reserve some space in </a:t>
-            </a:r>
-            <a:r>
-              <a:rPr lang="en-US" dirty="0" smtClean="0"/>
-              <a:t>memory and keep a record of its location for later retrieval and use.</a:t>
-            </a:r>
-            <a:endParaRPr lang="en-US" dirty="0"/>
-          </a:p>
-          <a:p>
-            <a:r>
-              <a:rPr lang="en-US" dirty="0" smtClean="0"/>
+              <a:rPr lang="en-US" dirty="0"/>
+              <a:t>As with any programming language, you need to use variables to store information. When you create a variable you reserve some space in memory and keep a record of its location for later retrieval and use.</a:t>
+            </a:r>
+          </a:p>
+          <a:p>
+            <a:r>
+              <a:rPr lang="en-US" dirty="0"/>
               <a:t>The information you wish to store might be characters (e.g., text), integers, </a:t>
             </a:r>
             <a:r>
-              <a:rPr lang="en-US" dirty="0" err="1" smtClean="0"/>
+              <a:rPr lang="en-US" dirty="0" err="1"/>
               <a:t>boolean</a:t>
             </a:r>
             <a:r>
-              <a:rPr lang="en-US" dirty="0" smtClean="0"/>
-              <a:t> (e.g., True/False) </a:t>
-            </a:r>
-            <a:r>
-              <a:rPr lang="en-US" dirty="0"/>
-              <a:t>etc. </a:t>
-            </a:r>
-          </a:p>
-          <a:p>
-            <a:r>
-              <a:rPr lang="en-US" dirty="0"/>
-              <a:t>In contrast to </a:t>
-            </a:r>
-            <a:r>
-              <a:rPr lang="en-US" dirty="0" smtClean="0"/>
-              <a:t>many other programming languages (e.g., C, java, </a:t>
-            </a:r>
-            <a:r>
-              <a:rPr lang="en-US" dirty="0" err="1" smtClean="0"/>
+              <a:rPr lang="en-US" dirty="0"/>
+              <a:t> (e.g., True/False) etc. </a:t>
+            </a:r>
+          </a:p>
+          <a:p>
+            <a:r>
+              <a:rPr lang="en-US" dirty="0"/>
+              <a:t>In contrast to many other programming languages (e.g., C, java, </a:t>
+            </a:r>
+            <a:r>
+              <a:rPr lang="en-US" dirty="0" err="1"/>
               <a:t>etc</a:t>
             </a:r>
             <a:r>
-              <a:rPr lang="en-US" dirty="0" smtClean="0"/>
-              <a:t>), </a:t>
-            </a:r>
-            <a:r>
-              <a:rPr lang="en-US" dirty="0"/>
-              <a:t>in </a:t>
-            </a:r>
-            <a:r>
-              <a:rPr lang="en-US" dirty="0" smtClean="0"/>
-              <a:t>R </a:t>
-            </a:r>
-            <a:r>
-              <a:rPr lang="en-US" dirty="0"/>
-              <a:t>variables are not declared as </a:t>
-            </a:r>
-            <a:r>
-              <a:rPr lang="en-US" dirty="0" smtClean="0"/>
-              <a:t>a specific data </a:t>
-            </a:r>
-            <a:r>
-              <a:rPr lang="en-US" dirty="0"/>
-              <a:t>type. </a:t>
-            </a:r>
-            <a:endParaRPr lang="en-US" dirty="0" smtClean="0"/>
+              <a:rPr lang="en-US" dirty="0"/>
+              <a:t>), in R variables are not declared as a specific data type. </a:t>
+            </a:r>
           </a:p>
           <a:p>
             <a:pPr lvl="1"/>
             <a:r>
-              <a:rPr lang="en-US" dirty="0" smtClean="0"/>
-              <a:t>The </a:t>
-            </a:r>
-            <a:r>
-              <a:rPr lang="en-US" dirty="0"/>
-              <a:t>variables are assigned with R-Objects and the data type of the R-object becomes the data type of the variable</a:t>
-            </a:r>
-            <a:r>
-              <a:rPr lang="en-US" dirty="0" smtClean="0"/>
-              <a:t>.</a:t>
-            </a:r>
-          </a:p>
-          <a:p>
-            <a:r>
-              <a:rPr lang="en-US" dirty="0" smtClean="0"/>
-              <a:t>The </a:t>
-            </a:r>
-            <a:r>
-              <a:rPr lang="en-US" dirty="0"/>
-              <a:t>simplest </a:t>
-            </a:r>
-            <a:r>
-              <a:rPr lang="en-US" dirty="0" smtClean="0"/>
-              <a:t>R-object type is </a:t>
-            </a:r>
-            <a:r>
-              <a:rPr lang="en-US" dirty="0"/>
-              <a:t>the </a:t>
-            </a:r>
-            <a:r>
-              <a:rPr lang="en-US" dirty="0" smtClean="0"/>
-              <a:t>atomic vector</a:t>
+              <a:rPr lang="en-US" dirty="0"/>
+              <a:t>The variables are assigned with R-Objects and the data type of the R-object becomes the data type of the variable.</a:t>
+            </a:r>
+          </a:p>
+          <a:p>
+            <a:r>
+              <a:rPr lang="en-US" dirty="0"/>
+              <a:t>The simplest R-object type is the atomic vector</a:t>
             </a:r>
           </a:p>
           <a:p>
             <a:pPr lvl="1"/>
             <a:r>
-              <a:rPr lang="en-US" dirty="0" smtClean="0"/>
-              <a:t>There </a:t>
-            </a:r>
-            <a:r>
-              <a:rPr lang="en-US" dirty="0"/>
-              <a:t>are six data types </a:t>
-            </a:r>
-            <a:r>
-              <a:rPr lang="en-US" dirty="0" smtClean="0"/>
-              <a:t>for </a:t>
-            </a:r>
-            <a:r>
-              <a:rPr lang="en-US" dirty="0"/>
-              <a:t>atomic vectors, also termed as six classes of </a:t>
-            </a:r>
-            <a:r>
-              <a:rPr lang="en-US" dirty="0" smtClean="0"/>
-              <a:t>vectors: logical, numerical, integer, complex, character, and raw</a:t>
-            </a:r>
-          </a:p>
-          <a:p>
-            <a:r>
-              <a:rPr lang="en-US" dirty="0" smtClean="0"/>
+              <a:rPr lang="en-US" dirty="0"/>
+              <a:t>There are six data types for atomic vectors, also termed as six classes of vectors: logical, numerical, integer, complex, character, and raw</a:t>
+            </a:r>
+          </a:p>
+          <a:p>
+            <a:r>
+              <a:rPr lang="en-US" dirty="0"/>
               <a:t>Lists are also vectors but are not atomic vectors, meaning that they can include multiple data types and can be recursive (contain lists of lists)</a:t>
             </a:r>
-            <a:endParaRPr lang="en-US" dirty="0"/>
-          </a:p>
-          <a:p>
-            <a:r>
-              <a:rPr lang="en-US" dirty="0"/>
-              <a:t>The other R-Objects are built upon atomic </a:t>
-            </a:r>
-            <a:r>
-              <a:rPr lang="en-US" dirty="0" smtClean="0"/>
-              <a:t>vectors and include: factors, matrices, arrays, data frames, </a:t>
-            </a:r>
-            <a:endParaRPr lang="en-US" dirty="0"/>
+          </a:p>
+          <a:p>
+            <a:r>
+              <a:rPr lang="en-US" dirty="0"/>
+              <a:t>The other R-Objects are built upon atomic vectors and include: factors, matrices, arrays, data frames, </a:t>
+            </a:r>
           </a:p>
           <a:p>
             <a:endParaRPr lang="en-US" dirty="0"/>
@@ -3552,18 +3403,17 @@
           <a:lstStyle/>
           <a:p>
             <a:r>
-              <a:rPr lang="en-US" dirty="0" smtClean="0"/>
-              <a:t>Understanding data and object types with class(), </a:t>
-            </a:r>
-            <a:r>
-              <a:rPr lang="en-US" dirty="0" err="1" smtClean="0"/>
+              <a:rPr lang="en-US" dirty="0"/>
+              <a:t>Understanding object and data types with class(), </a:t>
+            </a:r>
+            <a:r>
+              <a:rPr lang="en-US" dirty="0" err="1"/>
               <a:t>typeof</a:t>
             </a:r>
             <a:r>
-              <a:rPr lang="en-US" dirty="0" smtClean="0"/>
+              <a:rPr lang="en-US" dirty="0"/>
               <a:t>() and is.*()</a:t>
             </a:r>
-            <a:endParaRPr lang="en-US" dirty="0"/>
           </a:p>
         </p:txBody>
       </p:sp>
@@ -3593,10 +3443,34 @@
                 <a:tableStyleId>{5C22544A-7EE6-4342-B048-85BDC9FD1C3A}</a:tableStyleId>
               </a:tblPr>
               <a:tblGrid>
-                <a:gridCol w="3074985"/>
-                <a:gridCol w="1757517"/>
-                <a:gridCol w="1173480"/>
-                <a:gridCol w="2546879"/>
+                <a:gridCol w="3074985">
+                  <a:extLst>
+                    <a:ext uri="{9D8B030D-6E8A-4147-A177-3AD203B41FA5}">
+                      <a16:colId xmlns:a16="http://schemas.microsoft.com/office/drawing/2014/main" val="20000"/>
+                    </a:ext>
+                  </a:extLst>
+                </a:gridCol>
+                <a:gridCol w="1757517">
+                  <a:extLst>
+                    <a:ext uri="{9D8B030D-6E8A-4147-A177-3AD203B41FA5}">
+                      <a16:colId xmlns:a16="http://schemas.microsoft.com/office/drawing/2014/main" val="20001"/>
+                    </a:ext>
+                  </a:extLst>
+                </a:gridCol>
+                <a:gridCol w="1173480">
+                  <a:extLst>
+                    <a:ext uri="{9D8B030D-6E8A-4147-A177-3AD203B41FA5}">
+                      <a16:colId xmlns:a16="http://schemas.microsoft.com/office/drawing/2014/main" val="20002"/>
+                    </a:ext>
+                  </a:extLst>
+                </a:gridCol>
+                <a:gridCol w="2546879">
+                  <a:extLst>
+                    <a:ext uri="{9D8B030D-6E8A-4147-A177-3AD203B41FA5}">
+                      <a16:colId xmlns:a16="http://schemas.microsoft.com/office/drawing/2014/main" val="20003"/>
+                    </a:ext>
+                  </a:extLst>
+                </a:gridCol>
               </a:tblGrid>
               <a:tr h="370840">
                 <a:tc>
@@ -3606,10 +3480,9 @@
                     <a:p>
                       <a:pPr algn="ctr"/>
                       <a:r>
-                        <a:rPr lang="en-US" dirty="0" smtClean="0"/>
+                        <a:rPr lang="en-US" dirty="0"/>
                         <a:t>x</a:t>
                       </a:r>
-                      <a:endParaRPr lang="en-US" dirty="0"/>
                     </a:p>
                   </a:txBody>
                   <a:tcPr/>
@@ -3621,10 +3494,9 @@
                     <a:p>
                       <a:pPr algn="ctr"/>
                       <a:r>
-                        <a:rPr lang="en-US" dirty="0" smtClean="0"/>
+                        <a:rPr lang="en-US" dirty="0"/>
                         <a:t>class(x)</a:t>
                       </a:r>
-                      <a:endParaRPr lang="en-US" dirty="0"/>
                     </a:p>
                   </a:txBody>
                   <a:tcPr/>
@@ -3636,14 +3508,13 @@
                     <a:p>
                       <a:pPr algn="ctr"/>
                       <a:r>
-                        <a:rPr lang="en-US" dirty="0" err="1" smtClean="0"/>
+                        <a:rPr lang="en-US" dirty="0" err="1"/>
                         <a:t>typeof</a:t>
                       </a:r>
                       <a:r>
-                        <a:rPr lang="en-US" dirty="0" smtClean="0"/>
+                        <a:rPr lang="en-US" dirty="0"/>
                         <a:t>(x)</a:t>
                       </a:r>
-                      <a:endParaRPr lang="en-US" dirty="0"/>
                     </a:p>
                   </a:txBody>
                   <a:tcPr/>
@@ -3655,14 +3526,18 @@
                     <a:p>
                       <a:pPr algn="ctr"/>
                       <a:r>
-                        <a:rPr lang="en-US" dirty="0" smtClean="0"/>
+                        <a:rPr lang="en-US" dirty="0"/>
                         <a:t>is.*(x)</a:t>
                       </a:r>
-                      <a:endParaRPr lang="en-US" dirty="0"/>
                     </a:p>
                   </a:txBody>
                   <a:tcPr/>
                 </a:tc>
+                <a:extLst>
+                  <a:ext uri="{0D108BD9-81ED-4DB2-BD59-A6C34878D82A}">
+                    <a16:rowId xmlns:a16="http://schemas.microsoft.com/office/drawing/2014/main" val="10000"/>
+                  </a:ext>
+                </a:extLst>
               </a:tr>
               <a:tr h="370840">
                 <a:tc>
@@ -3672,10 +3547,9 @@
                     <a:p>
                       <a:pPr algn="ctr"/>
                       <a:r>
-                        <a:rPr lang="en-US" dirty="0" smtClean="0"/>
+                        <a:rPr lang="en-US" dirty="0"/>
                         <a:t>x &lt;- 1.0</a:t>
                       </a:r>
-                      <a:endParaRPr lang="en-US" dirty="0"/>
                     </a:p>
                   </a:txBody>
                   <a:tcPr anchor="ctr"/>
@@ -3687,10 +3561,9 @@
                     <a:p>
                       <a:pPr algn="ctr"/>
                       <a:r>
-                        <a:rPr lang="en-US" dirty="0" smtClean="0"/>
+                        <a:rPr lang="en-US" dirty="0"/>
                         <a:t>numeric</a:t>
                       </a:r>
-                      <a:endParaRPr lang="en-US" dirty="0"/>
                     </a:p>
                   </a:txBody>
                   <a:tcPr anchor="ctr"/>
@@ -3702,10 +3575,9 @@
                     <a:p>
                       <a:pPr algn="ctr"/>
                       <a:r>
-                        <a:rPr lang="en-US" dirty="0" smtClean="0"/>
+                        <a:rPr lang="en-US" dirty="0"/>
                         <a:t>double</a:t>
                       </a:r>
-                      <a:endParaRPr lang="en-US" dirty="0"/>
                     </a:p>
                   </a:txBody>
                   <a:tcPr anchor="ctr"/>
@@ -3717,29 +3589,33 @@
                     <a:p>
                       <a:pPr algn="ctr"/>
                       <a:r>
-                        <a:rPr lang="en-US" dirty="0" err="1" smtClean="0"/>
+                        <a:rPr lang="en-US" dirty="0" err="1"/>
                         <a:t>is.numeric</a:t>
                       </a:r>
                       <a:r>
-                        <a:rPr lang="en-US" dirty="0" smtClean="0"/>
+                        <a:rPr lang="en-US" dirty="0"/>
                         <a:t>(x)=TRUE</a:t>
                       </a:r>
                       <a:br>
-                        <a:rPr lang="en-US" dirty="0" smtClean="0"/>
+                        <a:rPr lang="en-US" dirty="0"/>
                       </a:br>
                       <a:r>
-                        <a:rPr lang="en-US" dirty="0" err="1" smtClean="0"/>
+                        <a:rPr lang="en-US" dirty="0" err="1"/>
                         <a:t>is.double</a:t>
                       </a:r>
                       <a:r>
-                        <a:rPr lang="en-US" dirty="0" smtClean="0"/>
+                        <a:rPr lang="en-US" dirty="0"/>
                         <a:t>(x)=TRUE</a:t>
                       </a:r>
-                      <a:endParaRPr lang="en-US" dirty="0"/>
                     </a:p>
                   </a:txBody>
                   <a:tcPr anchor="ctr"/>
                 </a:tc>
+                <a:extLst>
+                  <a:ext uri="{0D108BD9-81ED-4DB2-BD59-A6C34878D82A}">
+                    <a16:rowId xmlns:a16="http://schemas.microsoft.com/office/drawing/2014/main" val="10001"/>
+                  </a:ext>
+                </a:extLst>
               </a:tr>
               <a:tr h="370840">
                 <a:tc>
@@ -3749,10 +3625,9 @@
                     <a:p>
                       <a:pPr algn="ctr"/>
                       <a:r>
-                        <a:rPr lang="en-US" dirty="0" smtClean="0"/>
+                        <a:rPr lang="en-US" dirty="0"/>
                         <a:t>x &lt;- 1L</a:t>
                       </a:r>
-                      <a:endParaRPr lang="en-US" dirty="0"/>
                     </a:p>
                   </a:txBody>
                   <a:tcPr anchor="ctr"/>
@@ -3764,10 +3639,9 @@
                     <a:p>
                       <a:pPr algn="ctr"/>
                       <a:r>
-                        <a:rPr lang="en-US" dirty="0" smtClean="0"/>
+                        <a:rPr lang="en-US" dirty="0"/>
                         <a:t>integer</a:t>
                       </a:r>
-                      <a:endParaRPr lang="en-US" dirty="0"/>
                     </a:p>
                   </a:txBody>
                   <a:tcPr anchor="ctr"/>
@@ -3779,10 +3653,9 @@
                     <a:p>
                       <a:pPr algn="ctr"/>
                       <a:r>
-                        <a:rPr lang="en-US" dirty="0" smtClean="0"/>
+                        <a:rPr lang="en-US" dirty="0"/>
                         <a:t>integer</a:t>
                       </a:r>
-                      <a:endParaRPr lang="en-US" dirty="0"/>
                     </a:p>
                   </a:txBody>
                   <a:tcPr anchor="ctr"/>
@@ -3794,18 +3667,22 @@
                     <a:p>
                       <a:pPr algn="ctr"/>
                       <a:r>
-                        <a:rPr lang="en-US" dirty="0" err="1" smtClean="0"/>
+                        <a:rPr lang="en-US" dirty="0" err="1"/>
                         <a:t>is.integer</a:t>
                       </a:r>
                       <a:r>
-                        <a:rPr lang="en-US" dirty="0" smtClean="0"/>
+                        <a:rPr lang="en-US" dirty="0"/>
                         <a:t>(x)=TRUE</a:t>
                       </a:r>
-                      <a:endParaRPr lang="en-US" dirty="0"/>
                     </a:p>
                   </a:txBody>
                   <a:tcPr anchor="ctr"/>
                 </a:tc>
+                <a:extLst>
+                  <a:ext uri="{0D108BD9-81ED-4DB2-BD59-A6C34878D82A}">
+                    <a16:rowId xmlns:a16="http://schemas.microsoft.com/office/drawing/2014/main" val="10002"/>
+                  </a:ext>
+                </a:extLst>
               </a:tr>
               <a:tr h="370840">
                 <a:tc>
@@ -3815,14 +3692,9 @@
                     <a:p>
                       <a:pPr algn="ctr"/>
                       <a:r>
-                        <a:rPr lang="en-US" dirty="0" smtClean="0"/>
-                        <a:t>x &lt;- </a:t>
+                        <a:rPr lang="en-US" dirty="0"/>
+                        <a:t>x &lt;- “foo”</a:t>
                       </a:r>
-                      <a:r>
-                        <a:rPr lang="en-US" dirty="0" smtClean="0"/>
-                        <a:t>“foo”</a:t>
-                      </a:r>
-                      <a:endParaRPr lang="en-US" dirty="0"/>
                     </a:p>
                   </a:txBody>
                   <a:tcPr anchor="ctr"/>
@@ -3834,10 +3706,9 @@
                     <a:p>
                       <a:pPr algn="ctr"/>
                       <a:r>
-                        <a:rPr lang="en-US" dirty="0" smtClean="0"/>
+                        <a:rPr lang="en-US" dirty="0"/>
                         <a:t>character</a:t>
                       </a:r>
-                      <a:endParaRPr lang="en-US" dirty="0"/>
                     </a:p>
                   </a:txBody>
                   <a:tcPr anchor="ctr"/>
@@ -3849,10 +3720,9 @@
                     <a:p>
                       <a:pPr algn="ctr"/>
                       <a:r>
-                        <a:rPr lang="en-US" dirty="0" smtClean="0"/>
+                        <a:rPr lang="en-US" dirty="0"/>
                         <a:t>character</a:t>
                       </a:r>
-                      <a:endParaRPr lang="en-US" dirty="0"/>
                     </a:p>
                   </a:txBody>
                   <a:tcPr anchor="ctr"/>
@@ -3864,18 +3734,22 @@
                     <a:p>
                       <a:pPr algn="ctr"/>
                       <a:r>
-                        <a:rPr lang="en-US" dirty="0" err="1" smtClean="0"/>
+                        <a:rPr lang="en-US" dirty="0" err="1"/>
                         <a:t>is.character</a:t>
                       </a:r>
                       <a:r>
-                        <a:rPr lang="en-US" dirty="0" smtClean="0"/>
+                        <a:rPr lang="en-US" dirty="0"/>
                         <a:t>(x)=TRUE</a:t>
                       </a:r>
-                      <a:endParaRPr lang="en-US" dirty="0"/>
                     </a:p>
                   </a:txBody>
                   <a:tcPr anchor="ctr"/>
                 </a:tc>
+                <a:extLst>
+                  <a:ext uri="{0D108BD9-81ED-4DB2-BD59-A6C34878D82A}">
+                    <a16:rowId xmlns:a16="http://schemas.microsoft.com/office/drawing/2014/main" val="10003"/>
+                  </a:ext>
+                </a:extLst>
               </a:tr>
               <a:tr h="370840">
                 <a:tc>
@@ -3885,10 +3759,9 @@
                     <a:p>
                       <a:pPr algn="ctr"/>
                       <a:r>
-                        <a:rPr lang="en-US" dirty="0" smtClean="0"/>
+                        <a:rPr lang="en-US" dirty="0"/>
                         <a:t>x &lt;- TRUE</a:t>
                       </a:r>
-                      <a:endParaRPr lang="en-US" dirty="0"/>
                     </a:p>
                   </a:txBody>
                   <a:tcPr anchor="ctr"/>
@@ -3900,10 +3773,9 @@
                     <a:p>
                       <a:pPr algn="ctr"/>
                       <a:r>
-                        <a:rPr lang="en-US" dirty="0" smtClean="0"/>
+                        <a:rPr lang="en-US" dirty="0"/>
                         <a:t>logical</a:t>
                       </a:r>
-                      <a:endParaRPr lang="en-US" dirty="0"/>
                     </a:p>
                   </a:txBody>
                   <a:tcPr anchor="ctr"/>
@@ -3915,10 +3787,9 @@
                     <a:p>
                       <a:pPr algn="ctr"/>
                       <a:r>
-                        <a:rPr lang="en-US" dirty="0" smtClean="0"/>
+                        <a:rPr lang="en-US" dirty="0"/>
                         <a:t>logical</a:t>
                       </a:r>
-                      <a:endParaRPr lang="en-US" dirty="0"/>
                     </a:p>
                   </a:txBody>
                   <a:tcPr anchor="ctr"/>
@@ -3930,15 +3801,15 @@
                     <a:p>
                       <a:pPr algn="ctr"/>
                       <a:r>
-                        <a:rPr lang="en-US" dirty="0" err="1" smtClean="0"/>
+                        <a:rPr lang="en-US" dirty="0" err="1"/>
                         <a:t>is.logical</a:t>
                       </a:r>
                       <a:r>
-                        <a:rPr lang="en-US" dirty="0" smtClean="0"/>
+                        <a:rPr lang="en-US" dirty="0"/>
                         <a:t>(x)=</a:t>
                       </a:r>
                       <a:r>
-                        <a:rPr lang="en-US" baseline="0" dirty="0" smtClean="0"/>
+                        <a:rPr lang="en-US" baseline="0" dirty="0"/>
                         <a:t>TRUE</a:t>
                       </a:r>
                       <a:endParaRPr lang="en-US" dirty="0"/>
@@ -3946,6 +3817,11 @@
                   </a:txBody>
                   <a:tcPr anchor="ctr"/>
                 </a:tc>
+                <a:extLst>
+                  <a:ext uri="{0D108BD9-81ED-4DB2-BD59-A6C34878D82A}">
+                    <a16:rowId xmlns:a16="http://schemas.microsoft.com/office/drawing/2014/main" val="10004"/>
+                  </a:ext>
+                </a:extLst>
               </a:tr>
               <a:tr h="370840">
                 <a:tc>
@@ -3955,26 +3831,17 @@
                     <a:p>
                       <a:pPr algn="ctr"/>
                       <a:r>
-                        <a:rPr lang="en-US" dirty="0" smtClean="0"/>
+                        <a:rPr lang="en-US" dirty="0"/>
                         <a:t>x &lt;- </a:t>
                       </a:r>
                       <a:r>
-                        <a:rPr lang="en-US" dirty="0" err="1" smtClean="0"/>
+                        <a:rPr lang="en-US" dirty="0" err="1"/>
                         <a:t>charToRaw</a:t>
                       </a:r>
                       <a:r>
-                        <a:rPr lang="en-US" dirty="0" smtClean="0"/>
-                        <a:t>(</a:t>
+                        <a:rPr lang="en-US" dirty="0"/>
+                        <a:t>(“foo”)</a:t>
                       </a:r>
-                      <a:r>
-                        <a:rPr lang="en-US" dirty="0" smtClean="0"/>
-                        <a:t>“foo”</a:t>
-                      </a:r>
-                      <a:r>
-                        <a:rPr lang="en-US" dirty="0" smtClean="0"/>
-                        <a:t>)</a:t>
-                      </a:r>
-                      <a:endParaRPr lang="en-US" dirty="0"/>
                     </a:p>
                   </a:txBody>
                   <a:tcPr anchor="ctr"/>
@@ -3986,10 +3853,9 @@
                     <a:p>
                       <a:pPr algn="ctr"/>
                       <a:r>
-                        <a:rPr lang="en-US" dirty="0" smtClean="0"/>
+                        <a:rPr lang="en-US" dirty="0"/>
                         <a:t>raw</a:t>
                       </a:r>
-                      <a:endParaRPr lang="en-US" dirty="0"/>
                     </a:p>
                   </a:txBody>
                   <a:tcPr anchor="ctr"/>
@@ -4001,10 +3867,9 @@
                     <a:p>
                       <a:pPr algn="ctr"/>
                       <a:r>
-                        <a:rPr lang="en-US" dirty="0" smtClean="0"/>
+                        <a:rPr lang="en-US" dirty="0"/>
                         <a:t>raw</a:t>
                       </a:r>
-                      <a:endParaRPr lang="en-US" dirty="0"/>
                     </a:p>
                   </a:txBody>
                   <a:tcPr anchor="ctr"/>
@@ -4016,18 +3881,22 @@
                     <a:p>
                       <a:pPr algn="ctr"/>
                       <a:r>
-                        <a:rPr lang="en-US" dirty="0" err="1" smtClean="0"/>
+                        <a:rPr lang="en-US" dirty="0" err="1"/>
                         <a:t>is.raw</a:t>
                       </a:r>
                       <a:r>
-                        <a:rPr lang="en-US" dirty="0" smtClean="0"/>
+                        <a:rPr lang="en-US" dirty="0"/>
                         <a:t>(x)=TRUE</a:t>
                       </a:r>
-                      <a:endParaRPr lang="en-US" dirty="0"/>
                     </a:p>
                   </a:txBody>
                   <a:tcPr anchor="ctr"/>
                 </a:tc>
+                <a:extLst>
+                  <a:ext uri="{0D108BD9-81ED-4DB2-BD59-A6C34878D82A}">
+                    <a16:rowId xmlns:a16="http://schemas.microsoft.com/office/drawing/2014/main" val="10005"/>
+                  </a:ext>
+                </a:extLst>
               </a:tr>
               <a:tr h="370840">
                 <a:tc>
@@ -4037,7 +3906,7 @@
                     <a:p>
                       <a:pPr algn="ctr"/>
                       <a:r>
-                        <a:rPr lang="de-DE" dirty="0" smtClean="0"/>
+                        <a:rPr lang="de-DE" dirty="0"/>
                         <a:t>x &lt;- 4 + 4i</a:t>
                       </a:r>
                       <a:endParaRPr lang="en-US" dirty="0"/>
@@ -4052,10 +3921,9 @@
                     <a:p>
                       <a:pPr algn="ctr"/>
                       <a:r>
-                        <a:rPr lang="en-US" dirty="0" smtClean="0"/>
+                        <a:rPr lang="en-US" dirty="0"/>
                         <a:t>complex</a:t>
                       </a:r>
-                      <a:endParaRPr lang="en-US" dirty="0"/>
                     </a:p>
                   </a:txBody>
                   <a:tcPr anchor="ctr"/>
@@ -4067,10 +3935,9 @@
                     <a:p>
                       <a:pPr algn="ctr"/>
                       <a:r>
-                        <a:rPr lang="en-US" dirty="0" smtClean="0"/>
+                        <a:rPr lang="en-US" dirty="0"/>
                         <a:t>complex</a:t>
                       </a:r>
-                      <a:endParaRPr lang="en-US" dirty="0"/>
                     </a:p>
                   </a:txBody>
                   <a:tcPr anchor="ctr"/>
@@ -4082,18 +3949,22 @@
                     <a:p>
                       <a:pPr algn="ctr"/>
                       <a:r>
-                        <a:rPr lang="en-US" dirty="0" err="1" smtClean="0"/>
+                        <a:rPr lang="en-US" dirty="0" err="1"/>
                         <a:t>is.complex</a:t>
                       </a:r>
                       <a:r>
-                        <a:rPr lang="en-US" dirty="0" smtClean="0"/>
+                        <a:rPr lang="en-US" dirty="0"/>
                         <a:t>(x)=TRUE</a:t>
                       </a:r>
-                      <a:endParaRPr lang="en-US" dirty="0"/>
                     </a:p>
                   </a:txBody>
                   <a:tcPr anchor="ctr"/>
                 </a:tc>
+                <a:extLst>
+                  <a:ext uri="{0D108BD9-81ED-4DB2-BD59-A6C34878D82A}">
+                    <a16:rowId xmlns:a16="http://schemas.microsoft.com/office/drawing/2014/main" val="10006"/>
+                  </a:ext>
+                </a:extLst>
               </a:tr>
               <a:tr h="370840">
                 <a:tc>
@@ -4103,18 +3974,17 @@
                     <a:p>
                       <a:pPr algn="ctr"/>
                       <a:r>
-                        <a:rPr lang="en-US" dirty="0" smtClean="0"/>
+                        <a:rPr lang="en-US" dirty="0"/>
                         <a:t>x &lt;- factor(c("</a:t>
                       </a:r>
                       <a:r>
-                        <a:rPr lang="en-US" dirty="0" err="1" smtClean="0"/>
+                        <a:rPr lang="en-US" dirty="0" err="1"/>
                         <a:t>foo","bar","bar</a:t>
                       </a:r>
                       <a:r>
-                        <a:rPr lang="en-US" dirty="0" smtClean="0"/>
+                        <a:rPr lang="en-US" dirty="0"/>
                         <a:t>"))</a:t>
                       </a:r>
-                      <a:endParaRPr lang="en-US" dirty="0"/>
                     </a:p>
                   </a:txBody>
                   <a:tcPr anchor="ctr"/>
@@ -4126,10 +3996,9 @@
                     <a:p>
                       <a:pPr algn="ctr"/>
                       <a:r>
-                        <a:rPr lang="en-US" dirty="0" smtClean="0"/>
+                        <a:rPr lang="en-US" dirty="0"/>
                         <a:t>factor</a:t>
                       </a:r>
-                      <a:endParaRPr lang="en-US" dirty="0"/>
                     </a:p>
                   </a:txBody>
                   <a:tcPr anchor="ctr"/>
@@ -4141,10 +4010,9 @@
                     <a:p>
                       <a:pPr algn="ctr"/>
                       <a:r>
-                        <a:rPr lang="en-US" dirty="0" smtClean="0"/>
+                        <a:rPr lang="en-US" dirty="0"/>
                         <a:t>integer</a:t>
                       </a:r>
-                      <a:endParaRPr lang="en-US" dirty="0"/>
                     </a:p>
                   </a:txBody>
                   <a:tcPr anchor="ctr"/>
@@ -4156,22 +4024,22 @@
                     <a:p>
                       <a:pPr algn="ctr"/>
                       <a:r>
-                        <a:rPr lang="en-US" dirty="0" err="1" smtClean="0"/>
+                        <a:rPr lang="en-US" dirty="0" err="1"/>
                         <a:t>is.factor</a:t>
                       </a:r>
                       <a:r>
-                        <a:rPr lang="en-US" dirty="0" smtClean="0"/>
+                        <a:rPr lang="en-US" dirty="0"/>
                         <a:t>(x)=TRUE</a:t>
                       </a:r>
                       <a:br>
-                        <a:rPr lang="en-US" dirty="0" smtClean="0"/>
+                        <a:rPr lang="en-US" dirty="0"/>
                       </a:br>
                       <a:r>
-                        <a:rPr lang="en-US" dirty="0" err="1" smtClean="0"/>
+                        <a:rPr lang="en-US" dirty="0" err="1"/>
                         <a:t>is.integer</a:t>
                       </a:r>
                       <a:r>
-                        <a:rPr lang="en-US" smtClean="0"/>
+                        <a:rPr lang="en-US"/>
                         <a:t>(x)=TRUE</a:t>
                       </a:r>
                       <a:endParaRPr lang="en-US" dirty="0"/>
@@ -4179,6 +4047,11 @@
                   </a:txBody>
                   <a:tcPr anchor="ctr"/>
                 </a:tc>
+                <a:extLst>
+                  <a:ext uri="{0D108BD9-81ED-4DB2-BD59-A6C34878D82A}">
+                    <a16:rowId xmlns:a16="http://schemas.microsoft.com/office/drawing/2014/main" val="10007"/>
+                  </a:ext>
+                </a:extLst>
               </a:tr>
               <a:tr h="370840">
                 <a:tc>
@@ -4188,23 +4061,23 @@
                     <a:p>
                       <a:pPr algn="ctr"/>
                       <a:r>
-                        <a:rPr lang="it-IT" dirty="0" smtClean="0"/>
+                        <a:rPr lang="it-IT" dirty="0"/>
                         <a:t>x &lt;- </a:t>
                       </a:r>
                       <a:r>
-                        <a:rPr lang="it-IT" dirty="0" err="1" smtClean="0"/>
+                        <a:rPr lang="it-IT" dirty="0" err="1"/>
                         <a:t>matrix</a:t>
                       </a:r>
                       <a:r>
-                        <a:rPr lang="it-IT" dirty="0" smtClean="0"/>
+                        <a:rPr lang="it-IT" dirty="0"/>
                         <a:t>(1:4, </a:t>
                       </a:r>
                       <a:r>
-                        <a:rPr lang="it-IT" dirty="0" err="1" smtClean="0"/>
+                        <a:rPr lang="it-IT" dirty="0" err="1"/>
                         <a:t>nrow</a:t>
                       </a:r>
                       <a:r>
-                        <a:rPr lang="it-IT" dirty="0" smtClean="0"/>
+                        <a:rPr lang="it-IT" dirty="0"/>
                         <a:t>=2)</a:t>
                       </a:r>
                       <a:endParaRPr lang="en-US" dirty="0"/>
@@ -4219,8 +4092,88 @@
                     <a:p>
                       <a:pPr algn="ctr"/>
                       <a:r>
-                        <a:rPr lang="en-US" dirty="0" smtClean="0"/>
+                        <a:rPr lang="en-US" dirty="0"/>
                         <a:t>matrix</a:t>
+                      </a:r>
+                    </a:p>
+                  </a:txBody>
+                  <a:tcPr anchor="ctr"/>
+                </a:tc>
+                <a:tc>
+                  <a:txBody>
+                    <a:bodyPr/>
+                    <a:lstStyle/>
+                    <a:p>
+                      <a:pPr algn="ctr"/>
+                      <a:r>
+                        <a:rPr lang="en-US" dirty="0"/>
+                        <a:t>integer</a:t>
+                      </a:r>
+                    </a:p>
+                  </a:txBody>
+                  <a:tcPr anchor="ctr"/>
+                </a:tc>
+                <a:tc>
+                  <a:txBody>
+                    <a:bodyPr/>
+                    <a:lstStyle/>
+                    <a:p>
+                      <a:pPr algn="ctr"/>
+                      <a:r>
+                        <a:rPr lang="en-US" dirty="0" err="1"/>
+                        <a:t>is.matrix</a:t>
+                      </a:r>
+                      <a:r>
+                        <a:rPr lang="en-US" dirty="0"/>
+                        <a:t>(x)=TRUE</a:t>
+                      </a:r>
+                    </a:p>
+                    <a:p>
+                      <a:pPr algn="ctr"/>
+                      <a:r>
+                        <a:rPr lang="en-US" dirty="0" err="1"/>
+                        <a:t>Is.integer</a:t>
+                      </a:r>
+                      <a:r>
+                        <a:rPr lang="en-US" dirty="0"/>
+                        <a:t>(x)=TRUE</a:t>
+                      </a:r>
+                    </a:p>
+                  </a:txBody>
+                  <a:tcPr anchor="ctr"/>
+                </a:tc>
+                <a:extLst>
+                  <a:ext uri="{0D108BD9-81ED-4DB2-BD59-A6C34878D82A}">
+                    <a16:rowId xmlns:a16="http://schemas.microsoft.com/office/drawing/2014/main" val="10008"/>
+                  </a:ext>
+                </a:extLst>
+              </a:tr>
+              <a:tr h="370840">
+                <a:tc>
+                  <a:txBody>
+                    <a:bodyPr/>
+                    <a:lstStyle/>
+                    <a:p>
+                      <a:pPr algn="ctr"/>
+                      <a:r>
+                        <a:rPr lang="es-ES_tradnl" dirty="0"/>
+                        <a:t>x &lt;- </a:t>
+                      </a:r>
+                      <a:r>
+                        <a:rPr lang="es-ES_tradnl" dirty="0" err="1"/>
+                        <a:t>data.frame</a:t>
+                      </a:r>
+                      <a:r>
+                        <a:rPr lang="es-ES_tradnl" dirty="0"/>
+                        <a:t>(x=1:2, y=c(“</a:t>
+                      </a:r>
+                      <a:r>
+                        <a:rPr lang="es-ES_tradnl" dirty="0" err="1"/>
+                        <a:t>foo</a:t>
+                      </a:r>
+                      <a:r>
+                        <a:rPr lang="es-ES_tradnl" dirty="0"/>
+                        <a:t>”, “bar”))</a:t>
                       </a:r>
                       <a:endParaRPr lang="en-US" dirty="0"/>
                     </a:p>
@@ -4234,101 +4187,7 @@
                     <a:p>
                       <a:pPr algn="ctr"/>
                       <a:r>
-                        <a:rPr lang="en-US" dirty="0" smtClean="0"/>
-                        <a:t>integer</a:t>
-                      </a:r>
-                      <a:endParaRPr lang="en-US" dirty="0"/>
-                    </a:p>
-                  </a:txBody>
-                  <a:tcPr anchor="ctr"/>
-                </a:tc>
-                <a:tc>
-                  <a:txBody>
-                    <a:bodyPr/>
-                    <a:lstStyle/>
-                    <a:p>
-                      <a:pPr algn="ctr"/>
-                      <a:r>
-                        <a:rPr lang="en-US" dirty="0" err="1" smtClean="0"/>
-                        <a:t>is.matrix</a:t>
-                      </a:r>
-                      <a:r>
-                        <a:rPr lang="en-US" dirty="0" smtClean="0"/>
-                        <a:t>(x)=TRUE</a:t>
-                      </a:r>
-                    </a:p>
-                    <a:p>
-                      <a:pPr algn="ctr"/>
-                      <a:r>
-                        <a:rPr lang="en-US" dirty="0" err="1" smtClean="0"/>
-                        <a:t>Is.integer</a:t>
-                      </a:r>
-                      <a:r>
-                        <a:rPr lang="en-US" dirty="0" smtClean="0"/>
-                        <a:t>(x)=TRUE</a:t>
-                      </a:r>
-                      <a:endParaRPr lang="en-US" dirty="0"/>
-                    </a:p>
-                  </a:txBody>
-                  <a:tcPr anchor="ctr"/>
-                </a:tc>
-              </a:tr>
-              <a:tr h="370840">
-                <a:tc>
-                  <a:txBody>
-                    <a:bodyPr/>
-                    <a:lstStyle/>
-                    <a:p>
-                      <a:pPr algn="ctr"/>
-                      <a:r>
-                        <a:rPr lang="es-ES_tradnl" dirty="0" smtClean="0"/>
-                        <a:t>x &lt;- </a:t>
-                      </a:r>
-                      <a:r>
-                        <a:rPr lang="es-ES_tradnl" dirty="0" err="1" smtClean="0"/>
-                        <a:t>data.frame</a:t>
-                      </a:r>
-                      <a:r>
-                        <a:rPr lang="es-ES_tradnl" dirty="0" smtClean="0"/>
-                        <a:t>(x=1:2, y=c(</a:t>
-                      </a:r>
-                      <a:r>
-                        <a:rPr lang="es-ES_tradnl" dirty="0" smtClean="0"/>
-                        <a:t>“</a:t>
-                      </a:r>
-                      <a:r>
-                        <a:rPr lang="es-ES_tradnl" dirty="0" err="1" smtClean="0"/>
-                        <a:t>foo</a:t>
-                      </a:r>
-                      <a:r>
-                        <a:rPr lang="es-ES_tradnl" dirty="0" smtClean="0"/>
-                        <a:t>”</a:t>
-                      </a:r>
-                      <a:r>
-                        <a:rPr lang="es-ES_tradnl" dirty="0" smtClean="0"/>
-                        <a:t>, “</a:t>
-                      </a:r>
-                      <a:r>
-                        <a:rPr lang="es-ES_tradnl" dirty="0" smtClean="0"/>
-                        <a:t>bar”</a:t>
-                      </a:r>
-                      <a:r>
-                        <a:rPr lang="es-ES_tradnl" dirty="0" smtClean="0"/>
-                        <a:t>))</a:t>
-                      </a:r>
-                      <a:endParaRPr lang="en-US" dirty="0"/>
-                    </a:p>
-                  </a:txBody>
-                  <a:tcPr anchor="ctr"/>
-                </a:tc>
-                <a:tc>
-                  <a:txBody>
-                    <a:bodyPr/>
-                    <a:lstStyle/>
-                    <a:p>
-                      <a:pPr algn="ctr"/>
-                      <a:r>
-                        <a:rPr lang="en-US" dirty="0" err="1" smtClean="0"/>
+                        <a:rPr lang="en-US" dirty="0" err="1"/>
                         <a:t>data.frame</a:t>
                       </a:r>
                       <a:endParaRPr lang="en-US" dirty="0"/>
@@ -4343,10 +4202,9 @@
                     <a:p>
                       <a:pPr algn="ctr"/>
                       <a:r>
-                        <a:rPr lang="en-US" dirty="0" smtClean="0"/>
+                        <a:rPr lang="en-US" dirty="0"/>
                         <a:t>list</a:t>
                       </a:r>
-                      <a:endParaRPr lang="en-US" dirty="0"/>
                     </a:p>
                   </a:txBody>
                   <a:tcPr anchor="ctr"/>
@@ -4358,29 +4216,33 @@
                     <a:p>
                       <a:pPr algn="ctr"/>
                       <a:r>
-                        <a:rPr lang="en-US" dirty="0" err="1" smtClean="0"/>
+                        <a:rPr lang="en-US" dirty="0" err="1"/>
                         <a:t>is.data.frame</a:t>
                       </a:r>
                       <a:r>
-                        <a:rPr lang="en-US" dirty="0" smtClean="0"/>
+                        <a:rPr lang="en-US" dirty="0"/>
                         <a:t>(x)=TRUE</a:t>
                       </a:r>
                     </a:p>
                     <a:p>
                       <a:pPr algn="ctr"/>
                       <a:r>
-                        <a:rPr lang="en-US" dirty="0" err="1" smtClean="0"/>
+                        <a:rPr lang="en-US" dirty="0" err="1"/>
                         <a:t>is.list</a:t>
                       </a:r>
                       <a:r>
-                        <a:rPr lang="en-US" dirty="0" smtClean="0"/>
+                        <a:rPr lang="en-US" dirty="0"/>
                         <a:t>(x)=TRUE</a:t>
                       </a:r>
-                      <a:endParaRPr lang="en-US" dirty="0"/>
                     </a:p>
                   </a:txBody>
                   <a:tcPr anchor="ctr"/>
                 </a:tc>
+                <a:extLst>
+                  <a:ext uri="{0D108BD9-81ED-4DB2-BD59-A6C34878D82A}">
+                    <a16:rowId xmlns:a16="http://schemas.microsoft.com/office/drawing/2014/main" val="10009"/>
+                  </a:ext>
+                </a:extLst>
               </a:tr>
             </a:tbl>
           </a:graphicData>
@@ -4432,10 +4294,9 @@
           <a:lstStyle/>
           <a:p>
             <a:r>
-              <a:rPr lang="en-US" dirty="0" smtClean="0"/>
+              <a:rPr lang="en-US" dirty="0"/>
               <a:t>Vectors</a:t>
             </a:r>
-            <a:endParaRPr lang="en-US" dirty="0"/>
           </a:p>
         </p:txBody>
       </p:sp>
@@ -4457,39 +4318,8 @@
           <a:lstStyle/>
           <a:p>
             <a:r>
-              <a:rPr lang="en-US" dirty="0" smtClean="0"/>
+              <a:rPr lang="en-US" dirty="0"/>
               <a:t>Typically defined with c() or extracted from other objects</a:t>
-            </a:r>
-          </a:p>
-          <a:p>
-            <a:pPr marL="457200" lvl="1" indent="0">
-              <a:buNone/>
-            </a:pPr>
-            <a:endParaRPr lang="en-US" dirty="0" smtClean="0"/>
-          </a:p>
-          <a:p>
-            <a:pPr marL="457200" lvl="1" indent="0">
-              <a:buNone/>
-            </a:pPr>
-            <a:r>
-              <a:rPr lang="en-US" dirty="0" smtClean="0"/>
-              <a:t>&gt; </a:t>
-            </a:r>
-            <a:r>
-              <a:rPr lang="en-US" dirty="0" err="1" smtClean="0"/>
-              <a:t>myVector</a:t>
-            </a:r>
-            <a:r>
-              <a:rPr lang="en-US" dirty="0" smtClean="0"/>
-              <a:t> &lt;- c(“foo”, “bar”, “</a:t>
-            </a:r>
-            <a:r>
-              <a:rPr lang="en-US" dirty="0" err="1" smtClean="0"/>
-              <a:t>baz</a:t>
-            </a:r>
-            <a:r>
-              <a:rPr lang="en-US" dirty="0" smtClean="0"/>
-              <a:t>”)</a:t>
             </a:r>
           </a:p>
           <a:p>
@@ -4503,7 +4333,38 @@
               <a:buNone/>
             </a:pPr>
             <a:r>
-              <a:rPr lang="en-US" dirty="0" smtClean="0"/>
+              <a:rPr lang="en-US" dirty="0"/>
+              <a:t>&gt; </a:t>
+            </a:r>
+            <a:r>
+              <a:rPr lang="en-US" dirty="0" err="1"/>
+              <a:t>myVector</a:t>
+            </a:r>
+            <a:r>
+              <a:rPr lang="en-US" dirty="0"/>
+              <a:t> &lt;- c(“foo”, “bar”, “</a:t>
+            </a:r>
+            <a:r>
+              <a:rPr lang="en-US" dirty="0" err="1"/>
+              <a:t>baz</a:t>
+            </a:r>
+            <a:r>
+              <a:rPr lang="en-US" dirty="0"/>
+              <a:t>”)</a:t>
+            </a:r>
+          </a:p>
+          <a:p>
+            <a:pPr marL="457200" lvl="1" indent="0">
+              <a:buNone/>
+            </a:pPr>
+            <a:endParaRPr lang="en-US" dirty="0"/>
+          </a:p>
+          <a:p>
+            <a:pPr marL="457200" lvl="1" indent="0">
+              <a:buNone/>
+            </a:pPr>
+            <a:r>
+              <a:rPr lang="en-US" dirty="0"/>
               <a:t>&gt; myVector2 &lt;- c(</a:t>
             </a:r>
             <a:r>
@@ -4511,7 +4372,7 @@
               <a:t>2,3,5:10,15,20,25,30</a:t>
             </a:r>
             <a:r>
-              <a:rPr lang="en-US" dirty="0" smtClean="0"/>
+              <a:rPr lang="en-US" dirty="0"/>
               <a:t>)</a:t>
             </a:r>
           </a:p>
@@ -4523,7 +4384,7 @@
           </a:p>
           <a:p>
             <a:r>
-              <a:rPr lang="en-US" dirty="0" smtClean="0"/>
+              <a:rPr lang="en-US" dirty="0"/>
               <a:t>Subsets of vectors can be extracted by index values</a:t>
             </a:r>
           </a:p>
@@ -4531,22 +4392,22 @@
             <a:pPr marL="457200" lvl="1" indent="0">
               <a:buNone/>
             </a:pPr>
-            <a:endParaRPr lang="en-US" dirty="0" smtClean="0"/>
+            <a:endParaRPr lang="en-US" dirty="0"/>
           </a:p>
           <a:p>
             <a:pPr marL="457200" lvl="1" indent="0">
               <a:buNone/>
             </a:pPr>
             <a:r>
-              <a:rPr lang="en-US" dirty="0" smtClean="0"/>
+              <a:rPr lang="en-US" dirty="0"/>
               <a:t>&gt; </a:t>
             </a:r>
             <a:r>
-              <a:rPr lang="en-US" dirty="0" err="1" smtClean="0"/>
+              <a:rPr lang="en-US" dirty="0" err="1"/>
               <a:t>myVector</a:t>
             </a:r>
             <a:r>
-              <a:rPr lang="en-US" dirty="0" smtClean="0"/>
+              <a:rPr lang="en-US" dirty="0"/>
               <a:t>[3]</a:t>
             </a:r>
           </a:p>
@@ -4556,28 +4417,24 @@
             </a:pPr>
             <a:r>
               <a:rPr lang="pt-BR" dirty="0"/>
-              <a:t>[1] </a:t>
-            </a:r>
-            <a:r>
-              <a:rPr lang="pt-BR" dirty="0" smtClean="0"/>
-              <a:t>“</a:t>
-            </a:r>
-            <a:r>
-              <a:rPr lang="pt-BR" dirty="0" err="1" smtClean="0"/>
+              <a:t>[1] “</a:t>
+            </a:r>
+            <a:r>
+              <a:rPr lang="pt-BR" dirty="0" err="1"/>
               <a:t>baz</a:t>
             </a:r>
             <a:r>
-              <a:rPr lang="pt-BR" dirty="0" smtClean="0"/>
+              <a:rPr lang="pt-BR" dirty="0"/>
               <a:t>”</a:t>
             </a:r>
             <a:endParaRPr lang="en-US" dirty="0"/>
           </a:p>
           <a:p>
-            <a:endParaRPr lang="en-US" dirty="0" smtClean="0"/>
-          </a:p>
-          <a:p>
-            <a:r>
-              <a:rPr lang="en-US" dirty="0" smtClean="0"/>
+            <a:endParaRPr lang="en-US" dirty="0"/>
+          </a:p>
+          <a:p>
+            <a:r>
+              <a:rPr lang="en-US" dirty="0"/>
               <a:t>Conditional statements can be applied to vectors</a:t>
             </a:r>
           </a:p>
@@ -4586,16 +4443,8 @@
               <a:buNone/>
             </a:pPr>
             <a:r>
-              <a:rPr lang="fr-FR" dirty="0" smtClean="0"/>
-              <a:t>myVector2 </a:t>
-            </a:r>
-            <a:r>
               <a:rPr lang="fr-FR" dirty="0"/>
-              <a:t>&gt;= </a:t>
-            </a:r>
-            <a:r>
-              <a:rPr lang="fr-FR" dirty="0" smtClean="0"/>
-              <a:t>5</a:t>
+              <a:t>myVector2 &gt;= 5</a:t>
             </a:r>
           </a:p>
           <a:p>
@@ -4606,7 +4455,6 @@
               <a:rPr lang="fr-FR" dirty="0"/>
               <a:t>[1] FALSE FALSE  TRUE  TRUE  TRUE  TRUE  TRUE  TRUE  TRUE  TRUE  TRUE  TRUE</a:t>
             </a:r>
-            <a:endParaRPr lang="fr-FR" dirty="0" smtClean="0"/>
           </a:p>
           <a:p>
             <a:pPr marL="457200" lvl="1" indent="0">
@@ -4662,7 +4510,7 @@
           <a:lstStyle/>
           <a:p>
             <a:r>
-              <a:rPr lang="en-US" dirty="0" err="1" smtClean="0"/>
+              <a:rPr lang="en-US" dirty="0" err="1"/>
               <a:t>Dataframes</a:t>
             </a:r>
             <a:endParaRPr lang="en-US" dirty="0"/>
@@ -4720,26 +4568,25 @@
           <a:lstStyle/>
           <a:p>
             <a:r>
-              <a:rPr lang="en-US" dirty="0" smtClean="0"/>
+              <a:rPr lang="en-US" dirty="0"/>
               <a:t>Demo </a:t>
             </a:r>
             <a:r>
-              <a:rPr lang="en-US" dirty="0" err="1" smtClean="0"/>
+              <a:rPr lang="en-US" dirty="0" err="1"/>
               <a:t>dataframe</a:t>
             </a:r>
             <a:r>
-              <a:rPr lang="en-US" dirty="0" smtClean="0"/>
+              <a:rPr lang="en-US" dirty="0"/>
               <a:t> available in R: “</a:t>
             </a:r>
             <a:r>
-              <a:rPr lang="en-US" dirty="0" err="1" smtClean="0"/>
+              <a:rPr lang="en-US" dirty="0" err="1"/>
               <a:t>mtcars</a:t>
             </a:r>
             <a:r>
-              <a:rPr lang="en-US" dirty="0" smtClean="0"/>
+              <a:rPr lang="en-US" dirty="0"/>
               <a:t>”</a:t>
             </a:r>
-            <a:endParaRPr lang="en-US" dirty="0"/>
           </a:p>
         </p:txBody>
       </p:sp>
@@ -4933,52 +4780,45 @@
           </a:lstStyle>
           <a:p>
             <a:r>
-              <a:rPr lang="en-US" sz="2000" dirty="0" smtClean="0"/>
-              <a:t>Similar vectors, you can extract subsets of </a:t>
-            </a:r>
-            <a:r>
-              <a:rPr lang="en-US" sz="2000" dirty="0" err="1" smtClean="0"/>
+              <a:rPr lang="en-US" sz="2000" dirty="0"/>
+              <a:t>Similar to vectors, you can extract subsets of </a:t>
+            </a:r>
+            <a:r>
+              <a:rPr lang="en-US" sz="2000" dirty="0" err="1"/>
               <a:t>dataframes</a:t>
             </a:r>
             <a:r>
-              <a:rPr lang="en-US" sz="2000" dirty="0" smtClean="0"/>
-              <a:t> using [] but now with two dimensions: data[ROW,COL]</a:t>
-            </a:r>
-          </a:p>
-          <a:p>
-            <a:endParaRPr lang="en-US" sz="2000" dirty="0" smtClean="0"/>
-          </a:p>
-          <a:p>
-            <a:r>
-              <a:rPr lang="en-US" sz="2000" dirty="0" smtClean="0"/>
-              <a:t>You can also extract by row and </a:t>
-            </a:r>
-            <a:r>
               <a:rPr lang="en-US" sz="2000" dirty="0"/>
-              <a:t>column name: </a:t>
-            </a:r>
-          </a:p>
-          <a:p>
-            <a:pPr marL="0" indent="0">
-              <a:buNone/>
-            </a:pPr>
-            <a:r>
-              <a:rPr lang="en-US" sz="2000" dirty="0" smtClean="0"/>
-              <a:t>	</a:t>
-            </a:r>
-            <a:r>
-              <a:rPr lang="en-US" sz="2000" dirty="0" err="1" smtClean="0"/>
-              <a:t>mtcars</a:t>
-            </a:r>
-            <a:r>
-              <a:rPr lang="en-US" sz="2000" dirty="0" err="1"/>
-              <a:t>$</a:t>
-            </a:r>
-            <a:r>
-              <a:rPr lang="en-US" sz="2000" dirty="0" err="1" smtClean="0"/>
-              <a:t>mpg</a:t>
-            </a:r>
-            <a:endParaRPr lang="en-US" sz="2000" dirty="0" smtClean="0"/>
+              <a:t> using [] but now with two dimensions: </a:t>
+            </a:r>
+          </a:p>
+          <a:p>
+            <a:pPr lvl="1"/>
+            <a:r>
+              <a:rPr lang="en-US" sz="1600" dirty="0"/>
+              <a:t>e.g., data[ROW,COL]</a:t>
+            </a:r>
+          </a:p>
+          <a:p>
+            <a:endParaRPr lang="en-US" sz="2000" dirty="0"/>
+          </a:p>
+          <a:p>
+            <a:r>
+              <a:rPr lang="en-US" sz="2000" dirty="0"/>
+              <a:t>You can also extract by row and column name:</a:t>
+            </a:r>
+          </a:p>
+          <a:p>
+            <a:pPr lvl="1"/>
+            <a:r>
+              <a:rPr lang="en-US" sz="1600" dirty="0"/>
+              <a:t>e.g., </a:t>
+            </a:r>
+            <a:r>
+              <a:rPr lang="en-US" sz="1600" dirty="0" err="1"/>
+              <a:t>mtcars$mpg</a:t>
+            </a:r>
+            <a:endParaRPr lang="en-US" sz="1600" dirty="0"/>
           </a:p>
           <a:p>
             <a:pPr marL="0" indent="0">
@@ -5040,10 +4880,9 @@
           <a:lstStyle/>
           <a:p>
             <a:r>
-              <a:rPr lang="en-US" dirty="0" smtClean="0"/>
+              <a:rPr lang="en-US" dirty="0"/>
               <a:t>Importing and Exporting Data</a:t>
             </a:r>
-            <a:endParaRPr lang="en-US" dirty="0"/>
           </a:p>
         </p:txBody>
       </p:sp>
@@ -5063,90 +4902,89 @@
           <a:lstStyle/>
           <a:p>
             <a:r>
-              <a:rPr lang="en-US" dirty="0" smtClean="0"/>
+              <a:rPr lang="en-US" dirty="0"/>
               <a:t>R functions exist to import most common file formats</a:t>
             </a:r>
           </a:p>
           <a:p>
             <a:pPr lvl="1"/>
             <a:r>
-              <a:rPr lang="en-US" dirty="0" err="1" smtClean="0"/>
+              <a:rPr lang="en-US" dirty="0" err="1"/>
               <a:t>tsv</a:t>
             </a:r>
             <a:r>
-              <a:rPr lang="en-US" dirty="0" smtClean="0"/>
+              <a:rPr lang="en-US" dirty="0"/>
               <a:t>, </a:t>
             </a:r>
             <a:r>
-              <a:rPr lang="en-US" dirty="0" err="1" smtClean="0"/>
+              <a:rPr lang="en-US" dirty="0" err="1"/>
               <a:t>csv</a:t>
             </a:r>
             <a:r>
-              <a:rPr lang="en-US" dirty="0" smtClean="0"/>
+              <a:rPr lang="en-US" dirty="0"/>
               <a:t>, excel, xml, </a:t>
             </a:r>
             <a:r>
-              <a:rPr lang="en-US" dirty="0" err="1" smtClean="0"/>
+              <a:rPr lang="en-US" dirty="0" err="1"/>
               <a:t>json</a:t>
             </a:r>
             <a:r>
-              <a:rPr lang="en-US" dirty="0" smtClean="0"/>
+              <a:rPr lang="en-US" dirty="0"/>
               <a:t>, </a:t>
             </a:r>
             <a:r>
-              <a:rPr lang="en-US" dirty="0" err="1" smtClean="0"/>
+              <a:rPr lang="en-US" dirty="0" err="1"/>
               <a:t>etc</a:t>
             </a:r>
-            <a:endParaRPr lang="en-US" dirty="0" smtClean="0"/>
-          </a:p>
-          <a:p>
-            <a:r>
-              <a:rPr lang="en-US" dirty="0" err="1" smtClean="0"/>
+            <a:endParaRPr lang="en-US" dirty="0"/>
+          </a:p>
+          <a:p>
+            <a:r>
+              <a:rPr lang="en-US" dirty="0" err="1"/>
               <a:t>read.table</a:t>
             </a:r>
             <a:r>
-              <a:rPr lang="en-US" dirty="0" smtClean="0"/>
+              <a:rPr lang="en-US" dirty="0"/>
               <a:t>() is particularly useful for simple delimited data files</a:t>
             </a:r>
           </a:p>
           <a:p>
-            <a:endParaRPr lang="en-US" dirty="0" smtClean="0"/>
-          </a:p>
-          <a:p>
             <a:endParaRPr lang="en-US" dirty="0"/>
           </a:p>
           <a:p>
-            <a:endParaRPr lang="en-US" dirty="0" smtClean="0"/>
-          </a:p>
-          <a:p>
             <a:endParaRPr lang="en-US" dirty="0"/>
           </a:p>
           <a:p>
-            <a:r>
-              <a:rPr lang="en-US" dirty="0" smtClean="0"/>
+            <a:endParaRPr lang="en-US" dirty="0"/>
+          </a:p>
+          <a:p>
+            <a:endParaRPr lang="en-US" dirty="0"/>
+          </a:p>
+          <a:p>
+            <a:r>
+              <a:rPr lang="en-US" dirty="0"/>
               <a:t>Read from file or web URL</a:t>
             </a:r>
           </a:p>
           <a:p>
             <a:r>
-              <a:rPr lang="en-US" dirty="0" smtClean="0"/>
+              <a:rPr lang="en-US" dirty="0"/>
               <a:t>Tell R how you have encoded missing values</a:t>
             </a:r>
           </a:p>
           <a:p>
             <a:r>
-              <a:rPr lang="en-US" dirty="0" smtClean="0"/>
+              <a:rPr lang="en-US" dirty="0"/>
               <a:t>Use </a:t>
             </a:r>
             <a:r>
-              <a:rPr lang="en-US" dirty="0" err="1" smtClean="0"/>
+              <a:rPr lang="en-US" dirty="0" err="1"/>
               <a:t>as.is</a:t>
             </a:r>
             <a:r>
-              <a:rPr lang="en-US" dirty="0" smtClean="0"/>
+              <a:rPr lang="en-US" dirty="0"/>
               <a:t> to prevent R from converting strings to factors</a:t>
             </a:r>
-            <a:endParaRPr lang="en-US" dirty="0"/>
           </a:p>
         </p:txBody>
       </p:sp>
@@ -5181,15 +5019,7 @@
             </a:r>
             <a:r>
               <a:rPr lang="en-US" sz="2000" dirty="0"/>
-              <a:t>(file</a:t>
-            </a:r>
-            <a:r>
-              <a:rPr lang="en-US" sz="2000" dirty="0" smtClean="0"/>
-              <a:t>=“my file or URL”, </a:t>
-            </a:r>
-            <a:r>
-              <a:rPr lang="en-US" sz="2000" dirty="0"/>
-              <a:t>header=TRUE, </a:t>
+              <a:t>(file=“my file or URL”, header=TRUE, </a:t>
             </a:r>
             <a:r>
               <a:rPr lang="en-US" sz="2000" dirty="0" err="1"/>
@@ -5221,29 +5051,24 @@
             </a:r>
             <a:r>
               <a:rPr lang="en-US" sz="2000" dirty="0"/>
-              <a:t>=c(1:27,29:30</a:t>
-            </a:r>
-            <a:r>
-              <a:rPr lang="en-US" sz="2000" dirty="0" smtClean="0"/>
-              <a:t>), </a:t>
-            </a:r>
-            <a:r>
-              <a:rPr lang="en-US" sz="2000" dirty="0" err="1" smtClean="0"/>
+              <a:t>=c(1:27,29:30), </a:t>
+            </a:r>
+            <a:r>
+              <a:rPr lang="en-US" sz="2000" dirty="0" err="1"/>
               <a:t>row.names</a:t>
             </a:r>
             <a:r>
-              <a:rPr lang="en-US" sz="2000" dirty="0" smtClean="0"/>
+              <a:rPr lang="en-US" sz="2000" dirty="0"/>
               <a:t>=1, </a:t>
             </a:r>
             <a:r>
-              <a:rPr lang="is-IS" sz="2000" dirty="0" smtClean="0"/>
+              <a:rPr lang="is-IS" sz="2000" dirty="0"/>
               <a:t>…</a:t>
             </a:r>
             <a:r>
-              <a:rPr lang="en-US" sz="2000" dirty="0" smtClean="0"/>
+              <a:rPr lang="en-US" sz="2000" dirty="0"/>
               <a:t>)</a:t>
             </a:r>
-            <a:endParaRPr lang="en-US" sz="2000" dirty="0"/>
           </a:p>
         </p:txBody>
       </p:sp>
@@ -5293,10 +5118,9 @@
           <a:lstStyle/>
           <a:p>
             <a:r>
-              <a:rPr lang="en-US" dirty="0" smtClean="0"/>
+              <a:rPr lang="en-US" dirty="0"/>
               <a:t>Apply functions</a:t>
             </a:r>
-            <a:endParaRPr lang="en-US" dirty="0"/>
           </a:p>
         </p:txBody>
       </p:sp>
@@ -5345,58 +5169,8 @@
           <a:lstStyle/>
           <a:p>
             <a:r>
-              <a:rPr lang="it-IT" dirty="0" smtClean="0"/>
+              <a:rPr lang="it-IT" dirty="0"/>
               <a:t># Create a </a:t>
-            </a:r>
-            <a:r>
-              <a:rPr lang="it-IT" dirty="0" err="1" smtClean="0"/>
-              <a:t>matrix</a:t>
-            </a:r>
-            <a:r>
-              <a:rPr lang="it-IT" dirty="0" smtClean="0"/>
-              <a:t> of 8 </a:t>
-            </a:r>
-            <a:r>
-              <a:rPr lang="it-IT" dirty="0" err="1" smtClean="0"/>
-              <a:t>rows</a:t>
-            </a:r>
-            <a:r>
-              <a:rPr lang="it-IT" dirty="0" smtClean="0"/>
-              <a:t> by 5 </a:t>
-            </a:r>
-            <a:r>
-              <a:rPr lang="it-IT" dirty="0" err="1" smtClean="0"/>
-              <a:t>columns</a:t>
-            </a:r>
-            <a:r>
-              <a:rPr lang="it-IT" dirty="0" smtClean="0"/>
-              <a:t> </a:t>
-            </a:r>
-            <a:r>
-              <a:rPr lang="it-IT" dirty="0" err="1" smtClean="0"/>
-              <a:t>as</a:t>
-            </a:r>
-            <a:r>
-              <a:rPr lang="it-IT" dirty="0" smtClean="0"/>
-              <a:t> </a:t>
-            </a:r>
-            <a:r>
-              <a:rPr lang="it-IT" dirty="0" err="1" smtClean="0"/>
-              <a:t>above</a:t>
-            </a:r>
-            <a:r>
-              <a:rPr lang="it-IT" dirty="0" smtClean="0"/>
-              <a:t>:</a:t>
-            </a:r>
-          </a:p>
-          <a:p>
-            <a:r>
-              <a:rPr lang="it-IT" dirty="0" smtClean="0"/>
-              <a:t>x </a:t>
-            </a:r>
-            <a:r>
-              <a:rPr lang="it-IT" dirty="0"/>
-              <a:t>&lt;- </a:t>
             </a:r>
             <a:r>
               <a:rPr lang="it-IT" dirty="0" err="1"/>
@@ -5404,6 +5178,52 @@
             </a:r>
             <a:r>
               <a:rPr lang="it-IT" dirty="0"/>
+              <a:t> of 8 </a:t>
+            </a:r>
+            <a:r>
+              <a:rPr lang="it-IT" dirty="0" err="1"/>
+              <a:t>rows</a:t>
+            </a:r>
+            <a:r>
+              <a:rPr lang="it-IT" dirty="0"/>
+              <a:t> by 5 </a:t>
+            </a:r>
+            <a:r>
+              <a:rPr lang="it-IT" dirty="0" err="1"/>
+              <a:t>columns</a:t>
+            </a:r>
+            <a:r>
+              <a:rPr lang="it-IT" dirty="0"/>
+              <a:t> </a:t>
+            </a:r>
+            <a:r>
+              <a:rPr lang="it-IT" dirty="0" err="1"/>
+              <a:t>as</a:t>
+            </a:r>
+            <a:r>
+              <a:rPr lang="it-IT" dirty="0"/>
+              <a:t> </a:t>
+            </a:r>
+            <a:r>
+              <a:rPr lang="it-IT" dirty="0" err="1"/>
+              <a:t>above</a:t>
+            </a:r>
+            <a:r>
+              <a:rPr lang="it-IT" dirty="0"/>
+              <a:t>:</a:t>
+            </a:r>
+          </a:p>
+          <a:p>
+            <a:r>
+              <a:rPr lang="it-IT" dirty="0"/>
+              <a:t>x &lt;- </a:t>
+            </a:r>
+            <a:r>
+              <a:rPr lang="it-IT" dirty="0" err="1"/>
+              <a:t>matrix</a:t>
+            </a:r>
+            <a:r>
+              <a:rPr lang="it-IT" dirty="0"/>
               <a:t>(</a:t>
             </a:r>
             <a:r>
@@ -5446,87 +5266,74 @@
               <a:rPr lang="it-IT" dirty="0"/>
               <a:t>=5)</a:t>
             </a:r>
-            <a:endParaRPr lang="it-IT" dirty="0" smtClean="0"/>
-          </a:p>
-          <a:p>
-            <a:endParaRPr lang="it-IT" dirty="0" smtClean="0"/>
-          </a:p>
-          <a:p>
-            <a:r>
-              <a:rPr lang="it-IT" dirty="0" smtClean="0"/>
+          </a:p>
+          <a:p>
+            <a:endParaRPr lang="it-IT" dirty="0"/>
+          </a:p>
+          <a:p>
+            <a:r>
+              <a:rPr lang="it-IT" dirty="0"/>
               <a:t># </a:t>
             </a:r>
             <a:r>
-              <a:rPr lang="it-IT" dirty="0" err="1" smtClean="0"/>
+              <a:rPr lang="it-IT" dirty="0" err="1"/>
               <a:t>Calculate</a:t>
             </a:r>
-            <a:r>
-              <a:rPr lang="it-IT" dirty="0" smtClean="0"/>
-              <a:t> </a:t>
-            </a:r>
-            <a:r>
-              <a:rPr lang="it-IT" dirty="0" err="1" smtClean="0"/>
-              <a:t>min</a:t>
-            </a:r>
-            <a:r>
-              <a:rPr lang="it-IT" dirty="0" smtClean="0"/>
-              <a:t> </a:t>
-            </a:r>
-            <a:r>
-              <a:rPr lang="it-IT" dirty="0" err="1" smtClean="0"/>
-              <a:t>value</a:t>
-            </a:r>
-            <a:r>
-              <a:rPr lang="it-IT" dirty="0" smtClean="0"/>
-              <a:t> for </a:t>
-            </a:r>
-            <a:r>
-              <a:rPr lang="it-IT" dirty="0" err="1" smtClean="0"/>
-              <a:t>each</a:t>
-            </a:r>
-            <a:r>
-              <a:rPr lang="it-IT" dirty="0" smtClean="0"/>
-              <a:t> </a:t>
-            </a:r>
-            <a:r>
-              <a:rPr lang="it-IT" dirty="0" err="1" smtClean="0"/>
-              <a:t>row</a:t>
-            </a:r>
-            <a:r>
-              <a:rPr lang="it-IT" dirty="0" smtClean="0"/>
-              <a:t> with a for </a:t>
-            </a:r>
-            <a:r>
-              <a:rPr lang="it-IT" dirty="0" err="1" smtClean="0"/>
-              <a:t>loop</a:t>
-            </a:r>
-            <a:endParaRPr lang="it-IT" dirty="0"/>
-          </a:p>
-          <a:p>
-            <a:r>
-              <a:rPr lang="it-IT" dirty="0" smtClean="0"/>
-              <a:t>for</a:t>
-            </a:r>
-            <a:r>
-              <a:rPr lang="it-IT" dirty="0"/>
-              <a:t>(i in 1:8)</a:t>
-            </a:r>
-            <a:r>
-              <a:rPr lang="it-IT" dirty="0" smtClean="0"/>
-              <a:t>{</a:t>
-            </a:r>
-          </a:p>
-          <a:p>
             <a:r>
               <a:rPr lang="it-IT" dirty="0"/>
               <a:t> </a:t>
             </a:r>
             <a:r>
-              <a:rPr lang="it-IT" dirty="0" smtClean="0"/>
-              <a:t>  </a:t>
-            </a:r>
-            <a:r>
-              <a:rPr lang="it-IT" dirty="0" err="1" smtClean="0"/>
+              <a:rPr lang="it-IT" dirty="0" err="1"/>
+              <a:t>min</a:t>
+            </a:r>
+            <a:r>
+              <a:rPr lang="it-IT" dirty="0"/>
+              <a:t> </a:t>
+            </a:r>
+            <a:r>
+              <a:rPr lang="it-IT" dirty="0" err="1"/>
+              <a:t>value</a:t>
+            </a:r>
+            <a:r>
+              <a:rPr lang="it-IT" dirty="0"/>
+              <a:t> for </a:t>
+            </a:r>
+            <a:r>
+              <a:rPr lang="it-IT" dirty="0" err="1"/>
+              <a:t>each</a:t>
+            </a:r>
+            <a:r>
+              <a:rPr lang="it-IT" dirty="0"/>
+              <a:t> </a:t>
+            </a:r>
+            <a:r>
+              <a:rPr lang="it-IT" dirty="0" err="1"/>
+              <a:t>row</a:t>
+            </a:r>
+            <a:r>
+              <a:rPr lang="it-IT" dirty="0"/>
+              <a:t> with a for </a:t>
+            </a:r>
+            <a:r>
+              <a:rPr lang="it-IT" dirty="0" err="1"/>
+              <a:t>loop</a:t>
+            </a:r>
+            <a:endParaRPr lang="it-IT" dirty="0"/>
+          </a:p>
+          <a:p>
+            <a:r>
+              <a:rPr lang="it-IT" dirty="0"/>
+              <a:t>for(i in 1:8){</a:t>
+            </a:r>
+          </a:p>
+          <a:p>
+            <a:r>
+              <a:rPr lang="it-IT" dirty="0"/>
+              <a:t>   </a:t>
+            </a:r>
+            <a:r>
+              <a:rPr lang="it-IT" dirty="0" err="1"/>
               <a:t>print</a:t>
             </a:r>
             <a:r>
@@ -5539,56 +5346,52 @@
             </a:r>
             <a:r>
               <a:rPr lang="it-IT" dirty="0"/>
-              <a:t>(x[i,])</a:t>
-            </a:r>
-            <a:r>
-              <a:rPr lang="it-IT" dirty="0" smtClean="0"/>
-              <a:t>)</a:t>
-            </a:r>
-          </a:p>
-          <a:p>
-            <a:r>
-              <a:rPr lang="it-IT" dirty="0" smtClean="0"/>
+              <a:t>(x[i,]))</a:t>
+            </a:r>
+          </a:p>
+          <a:p>
+            <a:r>
+              <a:rPr lang="it-IT" dirty="0"/>
               <a:t>}</a:t>
             </a:r>
           </a:p>
           <a:p>
-            <a:endParaRPr lang="it-IT" dirty="0" smtClean="0"/>
-          </a:p>
-          <a:p>
-            <a:r>
-              <a:rPr lang="it-IT" dirty="0" smtClean="0"/>
+            <a:endParaRPr lang="it-IT" dirty="0"/>
+          </a:p>
+          <a:p>
+            <a:r>
+              <a:rPr lang="it-IT" dirty="0"/>
               <a:t># use </a:t>
             </a:r>
             <a:r>
-              <a:rPr lang="it-IT" dirty="0" err="1" smtClean="0"/>
+              <a:rPr lang="it-IT" dirty="0" err="1"/>
               <a:t>apply</a:t>
             </a:r>
             <a:r>
-              <a:rPr lang="it-IT" dirty="0" smtClean="0"/>
+              <a:rPr lang="it-IT" dirty="0"/>
               <a:t> </a:t>
             </a:r>
             <a:r>
-              <a:rPr lang="it-IT" dirty="0" err="1" smtClean="0"/>
+              <a:rPr lang="it-IT" dirty="0" err="1"/>
               <a:t>function</a:t>
             </a:r>
             <a:r>
-              <a:rPr lang="it-IT" dirty="0" smtClean="0"/>
+              <a:rPr lang="it-IT" dirty="0"/>
               <a:t> to do </a:t>
             </a:r>
             <a:r>
-              <a:rPr lang="it-IT" dirty="0" err="1" smtClean="0"/>
+              <a:rPr lang="it-IT" dirty="0" err="1"/>
               <a:t>same</a:t>
             </a:r>
             <a:r>
-              <a:rPr lang="it-IT" dirty="0" smtClean="0"/>
+              <a:rPr lang="it-IT" dirty="0"/>
               <a:t> </a:t>
             </a:r>
             <a:r>
-              <a:rPr lang="it-IT" dirty="0" err="1" smtClean="0"/>
+              <a:rPr lang="it-IT" dirty="0" err="1"/>
               <a:t>thing</a:t>
             </a:r>
-            <a:endParaRPr lang="it-IT" dirty="0" smtClean="0"/>
+            <a:endParaRPr lang="it-IT" dirty="0"/>
           </a:p>
           <a:p>
             <a:r>
@@ -5659,10 +5462,9 @@
           <a:lstStyle/>
           <a:p>
             <a:r>
-              <a:rPr lang="en-US" dirty="0" smtClean="0"/>
+              <a:rPr lang="en-US" dirty="0"/>
               <a:t>Custom functions</a:t>
             </a:r>
-            <a:endParaRPr lang="en-US" dirty="0"/>
           </a:p>
         </p:txBody>
       </p:sp>
@@ -5682,76 +5484,67 @@
           <a:lstStyle/>
           <a:p>
             <a:r>
-              <a:rPr lang="en-US" dirty="0" smtClean="0"/>
+              <a:rPr lang="en-US" dirty="0"/>
               <a:t>Often necessary when an existing R function doesn’t quite do what you need.</a:t>
             </a:r>
           </a:p>
           <a:p>
             <a:r>
-              <a:rPr lang="en-US" dirty="0" smtClean="0"/>
+              <a:rPr lang="en-US" dirty="0"/>
               <a:t>Especially powerful in combination with apply() functions</a:t>
             </a:r>
           </a:p>
           <a:p>
-            <a:endParaRPr lang="en-US" dirty="0" smtClean="0"/>
-          </a:p>
-          <a:p>
-            <a:r>
-              <a:rPr lang="en-US" dirty="0" smtClean="0"/>
+            <a:endParaRPr lang="en-US" dirty="0"/>
+          </a:p>
+          <a:p>
+            <a:r>
+              <a:rPr lang="en-US" dirty="0"/>
               <a:t>Basic structure:</a:t>
             </a:r>
-            <a:endParaRPr lang="en-US" dirty="0"/>
           </a:p>
           <a:p>
             <a:pPr marL="0" indent="0">
               <a:buNone/>
             </a:pPr>
             <a:r>
-              <a:rPr lang="en-US" dirty="0" smtClean="0"/>
+              <a:rPr lang="en-US" dirty="0"/>
               <a:t>		</a:t>
             </a:r>
             <a:r>
-              <a:rPr lang="en-US" dirty="0" err="1" smtClean="0"/>
+              <a:rPr lang="en-US" dirty="0" err="1"/>
               <a:t>myfun</a:t>
             </a:r>
             <a:r>
-              <a:rPr lang="en-US" dirty="0" smtClean="0"/>
-              <a:t> </a:t>
-            </a:r>
-            <a:r>
-              <a:rPr lang="en-US" dirty="0"/>
-              <a:t>&lt;- function</a:t>
-            </a:r>
-            <a:r>
-              <a:rPr lang="en-US" dirty="0" smtClean="0"/>
+              <a:rPr lang="en-US" dirty="0"/>
+              <a:t> &lt;- function(input){</a:t>
+            </a:r>
+          </a:p>
+          <a:p>
+            <a:pPr marL="0" indent="0">
+              <a:buNone/>
+            </a:pPr>
+            <a:r>
+              <a:rPr lang="en-US" dirty="0"/>
+              <a:t>			output &lt;- </a:t>
+            </a:r>
+            <a:r>
+              <a:rPr lang="en-US" dirty="0" err="1"/>
+              <a:t>do_something</a:t>
+            </a:r>
+            <a:r>
+              <a:rPr lang="en-US" dirty="0"/>
               <a:t>(input)</a:t>
             </a:r>
-            <a:r>
-              <a:rPr lang="en-US" dirty="0"/>
-              <a:t>{</a:t>
-            </a:r>
           </a:p>
           <a:p>
             <a:pPr marL="0" indent="0">
               <a:buNone/>
             </a:pPr>
             <a:r>
-              <a:rPr lang="en-US" dirty="0" smtClean="0"/>
-              <a:t>			output </a:t>
-            </a:r>
-            <a:r>
-              <a:rPr lang="en-US" dirty="0"/>
-              <a:t>&lt;- </a:t>
-            </a:r>
-            <a:r>
-              <a:rPr lang="en-US" dirty="0" err="1" smtClean="0"/>
-              <a:t>do_something</a:t>
-            </a:r>
-            <a:r>
-              <a:rPr lang="en-US" dirty="0" smtClean="0"/>
-              <a:t>(input)</a:t>
-            </a:r>
-            <a:endParaRPr lang="en-US" dirty="0"/>
+              <a:rPr lang="en-US" dirty="0"/>
+              <a:t> 			return(output)</a:t>
+            </a:r>
           </a:p>
           <a:p>
             <a:pPr marL="0" indent="0">
@@ -5759,20 +5552,6 @@
             </a:pPr>
             <a:r>
               <a:rPr lang="en-US" dirty="0"/>
-              <a:t> </a:t>
-            </a:r>
-            <a:r>
-              <a:rPr lang="en-US" dirty="0" smtClean="0"/>
-              <a:t>			return(output)</a:t>
-            </a:r>
-            <a:endParaRPr lang="en-US" dirty="0"/>
-          </a:p>
-          <a:p>
-            <a:pPr marL="0" indent="0">
-              <a:buNone/>
-            </a:pPr>
-            <a:r>
-              <a:rPr lang="en-US" dirty="0" smtClean="0"/>
               <a:t>		}</a:t>
             </a:r>
           </a:p>
@@ -5787,26 +5566,25 @@
               <a:buNone/>
             </a:pPr>
             <a:r>
-              <a:rPr lang="en-US" dirty="0" smtClean="0"/>
+              <a:rPr lang="en-US" dirty="0"/>
               <a:t>		apply(</a:t>
             </a:r>
             <a:r>
-              <a:rPr lang="en-US" dirty="0" err="1" smtClean="0"/>
+              <a:rPr lang="en-US" dirty="0" err="1"/>
               <a:t>mydata</a:t>
             </a:r>
             <a:r>
-              <a:rPr lang="en-US" dirty="0" smtClean="0"/>
+              <a:rPr lang="en-US" dirty="0"/>
               <a:t>, 1, </a:t>
             </a:r>
             <a:r>
-              <a:rPr lang="en-US" dirty="0" err="1" smtClean="0"/>
+              <a:rPr lang="en-US" dirty="0" err="1"/>
               <a:t>myfun</a:t>
             </a:r>
             <a:r>
-              <a:rPr lang="en-US" dirty="0" smtClean="0"/>
+              <a:rPr lang="en-US" dirty="0"/>
               <a:t>)</a:t>
             </a:r>
-            <a:endParaRPr lang="en-US" dirty="0"/>
           </a:p>
         </p:txBody>
       </p:sp>
@@ -5856,16 +5634,8 @@
           <a:lstStyle/>
           <a:p>
             <a:r>
-              <a:rPr lang="en-US" dirty="0" smtClean="0"/>
-              <a:t>Assignment – the age </a:t>
-            </a:r>
-            <a:r>
-              <a:rPr lang="en-US" dirty="0"/>
-              <a:t>old “&lt;</a:t>
-            </a:r>
-            <a:r>
-              <a:rPr lang="en-US" dirty="0" smtClean="0"/>
-              <a:t>-” </a:t>
+              <a:rPr lang="en-US" dirty="0"/>
+              <a:t>Assignment – the age old “&lt;-” </a:t>
             </a:r>
             <a:r>
               <a:rPr lang="en-US" dirty="0" err="1"/>
@@ -5873,13 +5643,8 @@
             </a:r>
             <a:r>
               <a:rPr lang="en-US" dirty="0"/>
-              <a:t> </a:t>
-            </a:r>
-            <a:r>
-              <a:rPr lang="en-US" dirty="0" smtClean="0"/>
-              <a:t>“=” debate</a:t>
-            </a:r>
-            <a:endParaRPr lang="en-US" dirty="0"/>
+              <a:t> “=” debate</a:t>
+            </a:r>
           </a:p>
         </p:txBody>
       </p:sp>
@@ -5901,37 +5666,37 @@
           <a:lstStyle/>
           <a:p>
             <a:r>
-              <a:rPr lang="en-US" dirty="0" smtClean="0"/>
+              <a:rPr lang="en-US" dirty="0"/>
               <a:t>By convention in R, “&lt;-” is used to assign a value to a variable and “=” is used for setting arguments in a function. For R purists, this is the preferred method.</a:t>
             </a:r>
           </a:p>
           <a:p>
             <a:r>
-              <a:rPr lang="en-US" dirty="0" smtClean="0"/>
+              <a:rPr lang="en-US" dirty="0"/>
               <a:t>The “=” symbol will also generally work for assignment.</a:t>
             </a:r>
           </a:p>
           <a:p>
-            <a:endParaRPr lang="en-US" dirty="0" smtClean="0"/>
-          </a:p>
-          <a:p>
-            <a:r>
-              <a:rPr lang="en-US" dirty="0" smtClean="0"/>
-              <a:t>Old keyboards had a “&lt;-” key. Now its an extra key stroke.</a:t>
-            </a:r>
-          </a:p>
-          <a:p>
             <a:endParaRPr lang="en-US" dirty="0"/>
           </a:p>
           <a:p>
             <a:r>
-              <a:rPr lang="en-US" dirty="0" smtClean="0"/>
+              <a:rPr lang="en-US" dirty="0"/>
+              <a:t>Old keyboards had a “&lt;-” key. Now it is an extra key stroke.</a:t>
+            </a:r>
+          </a:p>
+          <a:p>
+            <a:endParaRPr lang="en-US" dirty="0"/>
+          </a:p>
+          <a:p>
+            <a:r>
+              <a:rPr lang="en-US" dirty="0"/>
               <a:t>There is a difference in “scope”. Generally you may want values assigned within functions to stay inside the function.</a:t>
             </a:r>
           </a:p>
           <a:p>
             <a:r>
-              <a:rPr lang="en-US" dirty="0" smtClean="0"/>
+              <a:rPr lang="en-US" dirty="0"/>
               <a:t>Let’s look at the simple ‘median’ function to illustrate</a:t>
             </a:r>
           </a:p>
@@ -5947,32 +5712,55 @@
             </a:r>
             <a:r>
               <a:rPr lang="en-US" dirty="0"/>
-              <a:t> = FALSE, ...</a:t>
-            </a:r>
-            <a:r>
-              <a:rPr lang="en-US" dirty="0" smtClean="0"/>
-              <a:t>)</a:t>
+              <a:t> = FALSE, ...)</a:t>
             </a:r>
           </a:p>
           <a:p>
             <a:pPr lvl="1"/>
-            <a:endParaRPr lang="en-US" dirty="0" smtClean="0"/>
+            <a:endParaRPr lang="en-US" dirty="0"/>
           </a:p>
           <a:p>
             <a:pPr marL="457200" lvl="1" indent="0">
               <a:buNone/>
             </a:pPr>
             <a:r>
-              <a:rPr lang="es-ES_tradnl" dirty="0" smtClean="0"/>
-              <a:t>	&gt; data</a:t>
-            </a:r>
-            <a:r>
               <a:rPr lang="es-ES_tradnl" dirty="0"/>
-              <a:t>=c(1:10,NA,NA,3:5</a:t>
-            </a:r>
-            <a:r>
-              <a:rPr lang="es-ES_tradnl" dirty="0" smtClean="0"/>
-              <a:t>)</a:t>
+              <a:t>	&gt; data=c(1:10,NA,NA,3:5)</a:t>
+            </a:r>
+          </a:p>
+          <a:p>
+            <a:pPr marL="457200" lvl="1" indent="0">
+              <a:buNone/>
+            </a:pPr>
+            <a:r>
+              <a:rPr lang="es-ES_tradnl" dirty="0"/>
+              <a:t>	&gt; median(x=data, </a:t>
+            </a:r>
+            <a:r>
+              <a:rPr lang="es-ES_tradnl" dirty="0" err="1"/>
+              <a:t>na.rm</a:t>
+            </a:r>
+            <a:r>
+              <a:rPr lang="es-ES_tradnl" dirty="0"/>
+              <a:t>=TRUE)</a:t>
+            </a:r>
+          </a:p>
+          <a:p>
+            <a:pPr marL="457200" lvl="1" indent="0">
+              <a:buNone/>
+            </a:pPr>
+            <a:r>
+              <a:rPr lang="es-ES_tradnl" dirty="0"/>
+              <a:t>	[1] 5</a:t>
+            </a:r>
+          </a:p>
+          <a:p>
+            <a:pPr marL="457200" lvl="1" indent="0">
+              <a:buNone/>
+            </a:pPr>
+            <a:r>
+              <a:rPr lang="es-ES_tradnl" dirty="0"/>
+              <a:t>	&gt; x</a:t>
             </a:r>
           </a:p>
           <a:p>
@@ -5984,61 +5772,6 @@
               <a:t>	</a:t>
             </a:r>
             <a:r>
-              <a:rPr lang="es-ES_tradnl" dirty="0" smtClean="0"/>
-              <a:t>&gt; median</a:t>
-            </a:r>
-            <a:r>
-              <a:rPr lang="es-ES_tradnl" dirty="0"/>
-              <a:t>(x=data, </a:t>
-            </a:r>
-            <a:r>
-              <a:rPr lang="es-ES_tradnl" dirty="0" err="1"/>
-              <a:t>na.rm</a:t>
-            </a:r>
-            <a:r>
-              <a:rPr lang="es-ES_tradnl" dirty="0"/>
-              <a:t>=TRUE</a:t>
-            </a:r>
-            <a:r>
-              <a:rPr lang="es-ES_tradnl" dirty="0" smtClean="0"/>
-              <a:t>)</a:t>
-            </a:r>
-          </a:p>
-          <a:p>
-            <a:pPr marL="457200" lvl="1" indent="0">
-              <a:buNone/>
-            </a:pPr>
-            <a:r>
-              <a:rPr lang="es-ES_tradnl" dirty="0"/>
-              <a:t>	</a:t>
-            </a:r>
-            <a:r>
-              <a:rPr lang="es-ES_tradnl" dirty="0" smtClean="0"/>
-              <a:t>[1] 5</a:t>
-            </a:r>
-          </a:p>
-          <a:p>
-            <a:pPr marL="457200" lvl="1" indent="0">
-              <a:buNone/>
-            </a:pPr>
-            <a:r>
-              <a:rPr lang="es-ES_tradnl" dirty="0"/>
-              <a:t>	</a:t>
-            </a:r>
-            <a:r>
-              <a:rPr lang="es-ES_tradnl" dirty="0" smtClean="0"/>
-              <a:t>&gt; x</a:t>
-            </a:r>
-          </a:p>
-          <a:p>
-            <a:pPr marL="457200" lvl="1" indent="0">
-              <a:buNone/>
-            </a:pPr>
-            <a:r>
-              <a:rPr lang="es-ES_tradnl" dirty="0"/>
-              <a:t>	</a:t>
-            </a:r>
-            <a:r>
               <a:rPr lang="de-DE" dirty="0"/>
               <a:t>Error: </a:t>
             </a:r>
@@ -6060,19 +5793,15 @@
             <a:pPr marL="457200" lvl="1" indent="0">
               <a:buNone/>
             </a:pPr>
-            <a:endParaRPr lang="de-DE" dirty="0" smtClean="0"/>
+            <a:endParaRPr lang="de-DE" dirty="0"/>
           </a:p>
           <a:p>
             <a:pPr marL="457200" lvl="1" indent="0">
               <a:buNone/>
             </a:pPr>
             <a:r>
-              <a:rPr lang="de-DE" dirty="0" smtClean="0"/>
-              <a:t>	&gt; </a:t>
-            </a:r>
-            <a:r>
               <a:rPr lang="de-DE" dirty="0"/>
-              <a:t>median(x &lt;- </a:t>
+              <a:t>	&gt; median(x &lt;- </a:t>
             </a:r>
             <a:r>
               <a:rPr lang="de-DE" dirty="0" err="1"/>
@@ -6096,12 +5825,8 @@
               <a:buNone/>
             </a:pPr>
             <a:r>
-              <a:rPr lang="de-DE" dirty="0" smtClean="0"/>
-              <a:t>	[</a:t>
-            </a:r>
-            <a:r>
               <a:rPr lang="de-DE" dirty="0"/>
-              <a:t>1] 5</a:t>
+              <a:t>	[1] 5</a:t>
             </a:r>
           </a:p>
           <a:p>
@@ -6109,12 +5834,8 @@
               <a:buNone/>
             </a:pPr>
             <a:r>
-              <a:rPr lang="de-DE" dirty="0" smtClean="0"/>
-              <a:t>	&gt; </a:t>
-            </a:r>
-            <a:r>
               <a:rPr lang="de-DE" dirty="0"/>
-              <a:t>x</a:t>
+              <a:t>	&gt; x</a:t>
             </a:r>
           </a:p>
           <a:p>
@@ -6123,15 +5844,7 @@
             </a:pPr>
             <a:r>
               <a:rPr lang="de-DE" dirty="0"/>
-              <a:t> </a:t>
-            </a:r>
-            <a:r>
-              <a:rPr lang="de-DE" dirty="0" smtClean="0"/>
-              <a:t>	[</a:t>
-            </a:r>
-            <a:r>
-              <a:rPr lang="de-DE" dirty="0"/>
-              <a:t>1]  1  2  3  4  5  6  7  8  9 10 NA NA  3  4  5</a:t>
+              <a:t> 	[1]  1  2  3  4  5  6  7  8  9 10 NA NA  3  4  5</a:t>
             </a:r>
             <a:endParaRPr lang="en-US" dirty="0"/>
           </a:p>
@@ -6139,7 +5852,7 @@
             <a:endParaRPr lang="en-US" dirty="0"/>
           </a:p>
           <a:p>
-            <a:endParaRPr lang="en-US" dirty="0" smtClean="0"/>
+            <a:endParaRPr lang="en-US" dirty="0"/>
           </a:p>
           <a:p>
             <a:endParaRPr lang="en-US" dirty="0"/>
@@ -6193,11 +5906,7 @@
           <a:p>
             <a:r>
               <a:rPr lang="en-US" dirty="0"/>
-              <a:t>Assignment – the age old “&lt;</a:t>
-            </a:r>
-            <a:r>
-              <a:rPr lang="en-US" dirty="0" smtClean="0"/>
-              <a:t>-” </a:t>
+              <a:t>Assignment – the age old “&lt;-” </a:t>
             </a:r>
             <a:r>
               <a:rPr lang="en-US" dirty="0" err="1"/>
@@ -6205,13 +5914,8 @@
             </a:r>
             <a:r>
               <a:rPr lang="en-US" dirty="0"/>
-              <a:t> </a:t>
-            </a:r>
-            <a:r>
-              <a:rPr lang="en-US" dirty="0" smtClean="0"/>
-              <a:t>“=” debate</a:t>
-            </a:r>
-            <a:endParaRPr lang="en-US" dirty="0"/>
+              <a:t> “=” debate</a:t>
+            </a:r>
           </a:p>
         </p:txBody>
       </p:sp>
@@ -6233,7 +5937,7 @@
           <a:lstStyle/>
           <a:p>
             <a:r>
-              <a:rPr lang="en-US" dirty="0" smtClean="0"/>
+              <a:rPr lang="en-US" dirty="0"/>
               <a:t>With “&lt;-” spacing matters. This drives some programmers crazy who think spacing should be a style matter and not change the way a program works</a:t>
             </a:r>
           </a:p>
@@ -6241,64 +5945,16 @@
             <a:pPr marL="0" indent="0">
               <a:buNone/>
             </a:pPr>
-            <a:endParaRPr lang="en-US" dirty="0" smtClean="0"/>
+            <a:endParaRPr lang="en-US" dirty="0"/>
           </a:p>
           <a:p>
             <a:pPr marL="457200" lvl="1" indent="0">
               <a:buNone/>
             </a:pPr>
             <a:r>
-              <a:rPr lang="en-US" dirty="0" smtClean="0"/>
-              <a:t>&gt; x</a:t>
-            </a:r>
-            <a:r>
-              <a:rPr lang="en-US" dirty="0"/>
-              <a:t>&lt;-</a:t>
-            </a:r>
-            <a:r>
-              <a:rPr lang="en-US" dirty="0" smtClean="0"/>
-              <a:t>3</a:t>
-            </a:r>
-          </a:p>
-          <a:p>
-            <a:pPr marL="457200" lvl="1" indent="0">
-              <a:buNone/>
-            </a:pPr>
-            <a:r>
-              <a:rPr lang="en-US" dirty="0" smtClean="0"/>
-              <a:t>&gt; x</a:t>
-            </a:r>
-            <a:br>
-              <a:rPr lang="en-US" dirty="0" smtClean="0"/>
-            </a:br>
-            <a:r>
-              <a:rPr lang="pt-BR" dirty="0"/>
-              <a:t>[1] </a:t>
-            </a:r>
-            <a:r>
-              <a:rPr lang="pt-BR" dirty="0" smtClean="0"/>
-              <a:t>3</a:t>
-            </a:r>
-          </a:p>
-          <a:p>
-            <a:pPr marL="457200" lvl="1" indent="0">
-              <a:buNone/>
-            </a:pPr>
-            <a:endParaRPr lang="en-US" dirty="0" smtClean="0"/>
-          </a:p>
-          <a:p>
-            <a:pPr marL="457200" lvl="1" indent="0">
-              <a:buNone/>
-            </a:pPr>
-            <a:r>
-              <a:rPr lang="en-US" dirty="0"/>
-              <a:t>&gt; </a:t>
-            </a:r>
-            <a:r>
-              <a:rPr lang="en-US" dirty="0" smtClean="0"/>
-              <a:t>x &lt;- 3</a:t>
-            </a:r>
-            <a:endParaRPr lang="en-US" dirty="0"/>
+              <a:rPr lang="en-US" dirty="0"/>
+              <a:t>&gt; x&lt;-3</a:t>
+            </a:r>
           </a:p>
           <a:p>
             <a:pPr marL="457200" lvl="1" indent="0">
@@ -6320,7 +5976,7 @@
             <a:pPr marL="457200" lvl="1" indent="0">
               <a:buNone/>
             </a:pPr>
-            <a:endParaRPr lang="en-US" dirty="0" smtClean="0"/>
+            <a:endParaRPr lang="en-US" dirty="0"/>
           </a:p>
           <a:p>
             <a:pPr marL="457200" lvl="1" indent="0">
@@ -6328,15 +5984,7 @@
             </a:pPr>
             <a:r>
               <a:rPr lang="en-US" dirty="0"/>
-              <a:t>&gt; </a:t>
-            </a:r>
-            <a:r>
-              <a:rPr lang="en-US" dirty="0" smtClean="0"/>
-              <a:t>x &lt; -</a:t>
-            </a:r>
-            <a:r>
-              <a:rPr lang="en-US" dirty="0"/>
-              <a:t>3</a:t>
+              <a:t>&gt; x &lt;- 3</a:t>
             </a:r>
           </a:p>
           <a:p>
@@ -6344,21 +5992,47 @@
               <a:buNone/>
             </a:pPr>
             <a:r>
-              <a:rPr lang="en-US" dirty="0" smtClean="0"/>
+              <a:rPr lang="en-US" dirty="0"/>
               <a:t>&gt; x</a:t>
             </a:r>
-            <a:r>
-              <a:rPr lang="en-US" dirty="0"/>
-              <a:t/>
-            </a:r>
             <a:br>
               <a:rPr lang="en-US" dirty="0"/>
             </a:br>
             <a:r>
-              <a:rPr lang="pt-BR" dirty="0" smtClean="0"/>
+              <a:rPr lang="pt-BR" dirty="0"/>
+              <a:t>[1] 3</a:t>
+            </a:r>
+          </a:p>
+          <a:p>
+            <a:pPr marL="457200" lvl="1" indent="0">
+              <a:buNone/>
+            </a:pPr>
+            <a:endParaRPr lang="en-US" dirty="0"/>
+          </a:p>
+          <a:p>
+            <a:pPr marL="457200" lvl="1" indent="0">
+              <a:buNone/>
+            </a:pPr>
+            <a:r>
+              <a:rPr lang="en-US" dirty="0"/>
+              <a:t>&gt; x &lt; -3</a:t>
+            </a:r>
+          </a:p>
+          <a:p>
+            <a:pPr marL="457200" lvl="1" indent="0">
+              <a:buNone/>
+            </a:pPr>
+            <a:r>
+              <a:rPr lang="en-US" dirty="0"/>
+              <a:t>&gt; x</a:t>
+            </a:r>
+            <a:br>
+              <a:rPr lang="en-US" dirty="0"/>
+            </a:br>
+            <a:r>
+              <a:rPr lang="pt-BR" dirty="0"/>
               <a:t>FALSE</a:t>
             </a:r>
-            <a:endParaRPr lang="pt-BR" dirty="0"/>
           </a:p>
         </p:txBody>
       </p:sp>
@@ -6479,13 +6153,6 @@
   <p:clrMapOvr>
     <a:masterClrMapping/>
   </p:clrMapOvr>
-  <p:timing>
-    <p:tnLst>
-      <p:par>
-        <p:cTn xmlns:p14="http://schemas.microsoft.com/office/powerpoint/2010/main" id="1" dur="indefinite" restart="never" nodeType="tmRoot"/>
-      </p:par>
-    </p:tnLst>
-  </p:timing>
 </p:sld>
 </file>
 
@@ -6523,11 +6190,7 @@
           <a:p>
             <a:r>
               <a:rPr lang="en-US" dirty="0"/>
-              <a:t>Assignment – the age old “&lt;</a:t>
-            </a:r>
-            <a:r>
-              <a:rPr lang="en-US" dirty="0" smtClean="0"/>
-              <a:t>-” </a:t>
+              <a:t>Assignment – the age old “&lt;-” </a:t>
             </a:r>
             <a:r>
               <a:rPr lang="en-US" dirty="0" err="1"/>
@@ -6535,13 +6198,8 @@
             </a:r>
             <a:r>
               <a:rPr lang="en-US" dirty="0"/>
-              <a:t> </a:t>
-            </a:r>
-            <a:r>
-              <a:rPr lang="en-US" dirty="0" smtClean="0"/>
-              <a:t>“=” debate</a:t>
-            </a:r>
-            <a:endParaRPr lang="en-US" dirty="0"/>
+              <a:t> “=” debate</a:t>
+            </a:r>
           </a:p>
         </p:txBody>
       </p:sp>
@@ -6563,7 +6221,7 @@
           <a:lstStyle/>
           <a:p>
             <a:r>
-              <a:rPr lang="en-US" dirty="0" smtClean="0"/>
+              <a:rPr lang="en-US" dirty="0"/>
               <a:t>More weirdness having to do with order of interpretation by R</a:t>
             </a:r>
           </a:p>
@@ -6571,7 +6229,7 @@
             <a:pPr marL="0" indent="0">
               <a:buNone/>
             </a:pPr>
-            <a:endParaRPr lang="en-US" dirty="0" smtClean="0"/>
+            <a:endParaRPr lang="en-US" dirty="0"/>
           </a:p>
           <a:p>
             <a:pPr marL="457200" lvl="1" indent="0">
@@ -6579,129 +6237,80 @@
             </a:pPr>
             <a:r>
               <a:rPr lang="en-US" dirty="0"/>
-              <a:t>x &lt;- y &lt;- </a:t>
-            </a:r>
-            <a:r>
-              <a:rPr lang="en-US" dirty="0" smtClean="0"/>
-              <a:t>5   # x and y equal 5</a:t>
-            </a:r>
+              <a:t>x &lt;- y &lt;- 5   # x and y equal 5</a:t>
+            </a:r>
+          </a:p>
+          <a:p>
+            <a:pPr marL="457200" lvl="1" indent="0">
+              <a:buNone/>
+            </a:pPr>
+            <a:r>
+              <a:rPr lang="en-US" dirty="0"/>
+              <a:t>x = y = 5   # x and y equal 5</a:t>
+            </a:r>
+          </a:p>
+          <a:p>
+            <a:pPr marL="457200" lvl="1" indent="0">
+              <a:buNone/>
+            </a:pPr>
+            <a:r>
+              <a:rPr lang="en-US" dirty="0"/>
+              <a:t>x = y &lt;- 5   # x and y equal 5</a:t>
+            </a:r>
+          </a:p>
+          <a:p>
+            <a:pPr marL="457200" lvl="1" indent="0">
+              <a:buNone/>
+            </a:pPr>
+            <a:r>
+              <a:rPr lang="en-US" dirty="0"/>
+              <a:t>x &lt;- y = 5   # errors!</a:t>
+            </a:r>
+          </a:p>
+          <a:p>
+            <a:pPr marL="457200" lvl="1" indent="0">
+              <a:buNone/>
+            </a:pPr>
+            <a:r>
+              <a:rPr lang="en-US" dirty="0"/>
+              <a:t># Error in (x &lt;- y) = 5 : could not find function "&lt;-&lt;-”</a:t>
+            </a:r>
+          </a:p>
+          <a:p>
             <a:endParaRPr lang="en-US" dirty="0"/>
           </a:p>
           <a:p>
-            <a:pPr marL="457200" lvl="1" indent="0">
-              <a:buNone/>
-            </a:pPr>
-            <a:r>
-              <a:rPr lang="en-US" dirty="0"/>
-              <a:t>x = y = </a:t>
-            </a:r>
-            <a:r>
-              <a:rPr lang="en-US" dirty="0" smtClean="0"/>
-              <a:t>5   </a:t>
-            </a:r>
-            <a:r>
-              <a:rPr lang="en-US" dirty="0"/>
-              <a:t># x and y equal </a:t>
-            </a:r>
-            <a:r>
-              <a:rPr lang="en-US" dirty="0" smtClean="0"/>
-              <a:t>5</a:t>
+            <a:r>
+              <a:rPr lang="en-US" dirty="0"/>
+              <a:t>We could keep going </a:t>
+            </a:r>
+            <a:r>
+              <a:rPr lang="is-IS" dirty="0"/>
+              <a:t>…</a:t>
             </a:r>
             <a:endParaRPr lang="en-US" dirty="0"/>
           </a:p>
           <a:p>
-            <a:pPr marL="457200" lvl="1" indent="0">
-              <a:buNone/>
-            </a:pPr>
-            <a:r>
-              <a:rPr lang="en-US" dirty="0"/>
-              <a:t>x = y &lt;- </a:t>
-            </a:r>
-            <a:r>
-              <a:rPr lang="en-US" dirty="0" smtClean="0"/>
-              <a:t>5   </a:t>
-            </a:r>
-            <a:r>
-              <a:rPr lang="en-US" dirty="0"/>
-              <a:t># x and y equal </a:t>
-            </a:r>
-            <a:r>
-              <a:rPr lang="en-US" dirty="0" smtClean="0"/>
-              <a:t>5</a:t>
-            </a:r>
-            <a:endParaRPr lang="en-US" dirty="0"/>
-          </a:p>
-          <a:p>
-            <a:pPr marL="457200" lvl="1" indent="0">
-              <a:buNone/>
-            </a:pPr>
-            <a:r>
-              <a:rPr lang="en-US" dirty="0"/>
-              <a:t>x &lt;- y = </a:t>
-            </a:r>
-            <a:r>
-              <a:rPr lang="en-US" dirty="0" smtClean="0"/>
-              <a:t>5   </a:t>
-            </a:r>
-            <a:r>
-              <a:rPr lang="en-US" dirty="0"/>
-              <a:t># </a:t>
-            </a:r>
-            <a:r>
-              <a:rPr lang="en-US" dirty="0" smtClean="0"/>
-              <a:t>errors!</a:t>
-            </a:r>
-            <a:endParaRPr lang="en-US" dirty="0"/>
-          </a:p>
-          <a:p>
-            <a:pPr marL="457200" lvl="1" indent="0">
-              <a:buNone/>
-            </a:pPr>
-            <a:r>
-              <a:rPr lang="en-US" dirty="0"/>
-              <a:t># Error in (x &lt;- y) = 5 : could not find function "&lt;-&lt;</a:t>
-            </a:r>
-            <a:r>
-              <a:rPr lang="en-US" dirty="0" smtClean="0"/>
-              <a:t>-”</a:t>
-            </a:r>
-          </a:p>
-          <a:p>
-            <a:endParaRPr lang="en-US" dirty="0" smtClean="0"/>
-          </a:p>
-          <a:p>
-            <a:r>
-              <a:rPr lang="en-US" dirty="0" smtClean="0"/>
-              <a:t>We could keep going </a:t>
-            </a:r>
-            <a:r>
-              <a:rPr lang="is-IS" dirty="0" smtClean="0"/>
-              <a:t>…</a:t>
-            </a:r>
-            <a:endParaRPr lang="en-US" dirty="0" smtClean="0"/>
-          </a:p>
-          <a:p>
-            <a:r>
-              <a:rPr lang="en-US" dirty="0" smtClean="0"/>
+            <a:r>
+              <a:rPr lang="en-US" dirty="0"/>
               <a:t>Use “&lt;-” if you want to be a l33t R geek.</a:t>
             </a:r>
           </a:p>
           <a:p>
             <a:r>
-              <a:rPr lang="en-US" dirty="0" smtClean="0"/>
+              <a:rPr lang="en-US" dirty="0"/>
               <a:t>I’ve been writing code for 15 years and use “=” for assignment. Never had a problem. </a:t>
             </a:r>
           </a:p>
           <a:p>
             <a:r>
-              <a:rPr lang="en-US" dirty="0" err="1" smtClean="0"/>
+              <a:rPr lang="en-US" dirty="0" err="1"/>
               <a:t>formatR</a:t>
             </a:r>
             <a:r>
-              <a:rPr lang="en-US" dirty="0" smtClean="0"/>
+              <a:rPr lang="en-US" dirty="0"/>
               <a:t> package (tidy_* functions) can be used to clean your code for publication</a:t>
             </a:r>
-            <a:endParaRPr lang="en-US" dirty="0"/>
           </a:p>
         </p:txBody>
       </p:sp>
@@ -6751,10 +6360,9 @@
           <a:lstStyle/>
           <a:p>
             <a:r>
-              <a:rPr lang="en-US" dirty="0" smtClean="0"/>
+              <a:rPr lang="en-US" dirty="0"/>
               <a:t>Graphics options in R</a:t>
             </a:r>
-            <a:endParaRPr lang="en-US" dirty="0"/>
           </a:p>
         </p:txBody>
       </p:sp>
@@ -6774,49 +6382,49 @@
           <a:lstStyle/>
           <a:p>
             <a:r>
-              <a:rPr lang="en-US" dirty="0" smtClean="0"/>
+              <a:rPr lang="en-US" dirty="0"/>
               <a:t>At least 3 primary graphics options in R</a:t>
             </a:r>
           </a:p>
           <a:p>
             <a:pPr lvl="1"/>
             <a:r>
-              <a:rPr lang="en-US" dirty="0" smtClean="0"/>
+              <a:rPr lang="en-US" dirty="0"/>
               <a:t>base R graphics</a:t>
             </a:r>
           </a:p>
           <a:p>
             <a:pPr lvl="2"/>
             <a:r>
-              <a:rPr lang="en-US" dirty="0" smtClean="0"/>
+              <a:rPr lang="en-US" dirty="0"/>
               <a:t>plot(), par(), </a:t>
             </a:r>
             <a:r>
-              <a:rPr lang="en-US" dirty="0" err="1" smtClean="0"/>
+              <a:rPr lang="en-US" dirty="0" err="1"/>
               <a:t>etc</a:t>
             </a:r>
-            <a:endParaRPr lang="en-US" dirty="0" smtClean="0"/>
+            <a:endParaRPr lang="en-US" dirty="0"/>
           </a:p>
           <a:p>
             <a:pPr lvl="1"/>
             <a:r>
-              <a:rPr lang="en-US" dirty="0" smtClean="0"/>
+              <a:rPr lang="en-US" dirty="0"/>
               <a:t>lattice</a:t>
             </a:r>
           </a:p>
           <a:p>
             <a:pPr lvl="1"/>
             <a:r>
-              <a:rPr lang="en-US" b="1" dirty="0" smtClean="0"/>
+              <a:rPr lang="en-US" b="1" dirty="0"/>
               <a:t>ggplot2</a:t>
             </a:r>
           </a:p>
           <a:p>
-            <a:endParaRPr lang="en-US" dirty="0" smtClean="0"/>
-          </a:p>
-          <a:p>
-            <a:r>
-              <a:rPr lang="en-US" dirty="0" smtClean="0"/>
+            <a:endParaRPr lang="en-US" dirty="0"/>
+          </a:p>
+          <a:p>
+            <a:r>
+              <a:rPr lang="en-US" dirty="0"/>
               <a:t>ggplot2 consistently one of the top two most popular of all R packages</a:t>
             </a:r>
           </a:p>
@@ -6870,10 +6478,9 @@
           <a:lstStyle/>
           <a:p>
             <a:r>
-              <a:rPr lang="en-US" sz="2400" dirty="0" smtClean="0"/>
+              <a:rPr lang="en-US" sz="2400" dirty="0"/>
               <a:t>Why use ggplot2? – “prettier” graphics in less lines of code</a:t>
             </a:r>
-            <a:endParaRPr lang="en-US" sz="2400" dirty="0"/>
           </a:p>
         </p:txBody>
       </p:sp>
@@ -6953,10 +6560,9 @@
           <a:lstStyle/>
           <a:p>
             <a:r>
-              <a:rPr lang="en-US" dirty="0" smtClean="0"/>
+              <a:rPr lang="en-US" dirty="0"/>
               <a:t>ggplot2 syntax</a:t>
             </a:r>
-            <a:endParaRPr lang="en-US" dirty="0"/>
           </a:p>
         </p:txBody>
       </p:sp>
@@ -7056,21 +6662,16 @@
             <a:pPr algn="ctr"/>
             <a:r>
               <a:rPr lang="en-US" dirty="0"/>
-              <a:t>Aesthetic mappings describe how variables in the data are mapped to visual properties (aesthetics) of </a:t>
-            </a:r>
-            <a:r>
-              <a:rPr lang="en-US" dirty="0" smtClean="0"/>
-              <a:t>geometric objects (</a:t>
-            </a:r>
-            <a:r>
-              <a:rPr lang="en-US" dirty="0" err="1" smtClean="0"/>
+              <a:t>Aesthetic mappings describe how variables in the data are mapped to visual properties (aesthetics) of geometric objects (</a:t>
+            </a:r>
+            <a:r>
+              <a:rPr lang="en-US" dirty="0" err="1"/>
               <a:t>geoms</a:t>
             </a:r>
             <a:r>
-              <a:rPr lang="en-US" dirty="0" smtClean="0"/>
+              <a:rPr lang="en-US" dirty="0"/>
               <a:t>)</a:t>
             </a:r>
-            <a:endParaRPr lang="en-US" dirty="0"/>
           </a:p>
         </p:txBody>
       </p:sp>
@@ -7223,14 +6824,13 @@
           <a:p>
             <a:pPr algn="ctr"/>
             <a:r>
-              <a:rPr lang="en-US" dirty="0" err="1" smtClean="0"/>
+              <a:rPr lang="en-US" dirty="0" err="1"/>
               <a:t>dataframe</a:t>
             </a:r>
             <a:r>
-              <a:rPr lang="en-US" dirty="0" smtClean="0"/>
+              <a:rPr lang="en-US" dirty="0"/>
               <a:t> with data to be plotted</a:t>
             </a:r>
-            <a:endParaRPr lang="en-US" dirty="0"/>
           </a:p>
         </p:txBody>
       </p:sp>
@@ -7323,10 +6923,9 @@
           <a:p>
             <a:pPr algn="ctr"/>
             <a:r>
-              <a:rPr lang="en-US" dirty="0" smtClean="0"/>
+              <a:rPr lang="en-US" dirty="0"/>
               <a:t>geometric objects specify how data should be plotted</a:t>
             </a:r>
-            <a:endParaRPr lang="en-US" dirty="0"/>
           </a:p>
         </p:txBody>
       </p:sp>
@@ -7406,10 +7005,9 @@
           <a:lstStyle/>
           <a:p>
             <a:r>
-              <a:rPr lang="en-US" dirty="0" smtClean="0"/>
+              <a:rPr lang="en-US" dirty="0"/>
               <a:t>Faceting allows multiple plots in a single page</a:t>
             </a:r>
-            <a:endParaRPr lang="en-US" dirty="0"/>
           </a:p>
         </p:txBody>
       </p:sp>
@@ -7478,10 +7076,9 @@
           <a:lstStyle/>
           <a:p>
             <a:r>
-              <a:rPr lang="en-US" dirty="0" smtClean="0"/>
+              <a:rPr lang="en-US" dirty="0"/>
               <a:t>Themes allow stylistic improvements</a:t>
             </a:r>
-            <a:endParaRPr lang="en-US" dirty="0"/>
           </a:p>
         </p:txBody>
       </p:sp>
@@ -7550,18 +7147,17 @@
           <a:lstStyle/>
           <a:p>
             <a:r>
-              <a:rPr lang="en-US" dirty="0" smtClean="0"/>
+              <a:rPr lang="en-US" dirty="0"/>
               <a:t>Wide </a:t>
             </a:r>
             <a:r>
-              <a:rPr lang="en-US" dirty="0" err="1" smtClean="0"/>
+              <a:rPr lang="en-US" dirty="0" err="1"/>
               <a:t>vs</a:t>
             </a:r>
             <a:r>
-              <a:rPr lang="en-US" dirty="0" smtClean="0"/>
+              <a:rPr lang="en-US" dirty="0"/>
               <a:t> long format</a:t>
             </a:r>
-            <a:endParaRPr lang="en-US" dirty="0"/>
           </a:p>
         </p:txBody>
       </p:sp>
@@ -7637,14 +7233,13 @@
           <a:lstStyle/>
           <a:p>
             <a:r>
-              <a:rPr lang="en-US" sz="2000" dirty="0" err="1" smtClean="0"/>
+              <a:rPr lang="en-US" sz="2000" dirty="0" err="1"/>
               <a:t>Rmarkdown</a:t>
             </a:r>
             <a:r>
-              <a:rPr lang="en-US" sz="2000" dirty="0" smtClean="0"/>
+              <a:rPr lang="en-US" sz="2000" dirty="0"/>
               <a:t> can be used to create publication ready documents presenting all code (analysis), comments, and results</a:t>
             </a:r>
-            <a:endParaRPr lang="en-US" sz="2000" dirty="0"/>
           </a:p>
         </p:txBody>
       </p:sp>
@@ -7914,13 +7509,8 @@
             </a:pPr>
             <a:r>
               <a:rPr lang="en-US" dirty="0"/>
-              <a:t>``</a:t>
-            </a:r>
-            <a:r>
-              <a:rPr lang="en-US" dirty="0" smtClean="0"/>
-              <a:t>`</a:t>
-            </a:r>
-            <a:endParaRPr lang="en-US" dirty="0"/>
+              <a:t>```</a:t>
+            </a:r>
           </a:p>
         </p:txBody>
       </p:sp>
@@ -7977,7 +7567,7 @@
           <a:lstStyle/>
           <a:p>
             <a:r>
-              <a:rPr lang="en-US" dirty="0" err="1" smtClean="0"/>
+              <a:rPr lang="en-US" dirty="0" err="1"/>
               <a:t>myRprogram.Rmd</a:t>
             </a:r>
             <a:endParaRPr lang="en-US" dirty="0"/>
@@ -8045,7 +7635,7 @@
           <a:lstStyle/>
           <a:p>
             <a:r>
-              <a:rPr lang="en-US" dirty="0" err="1" smtClean="0"/>
+              <a:rPr lang="en-US" dirty="0" err="1"/>
               <a:t>knitr</a:t>
             </a:r>
             <a:endParaRPr lang="en-US" dirty="0"/>
@@ -8113,7 +7703,7 @@
           <a:lstStyle/>
           <a:p>
             <a:r>
-              <a:rPr lang="en-US" dirty="0" err="1" smtClean="0"/>
+              <a:rPr lang="en-US" dirty="0" err="1"/>
               <a:t>result.html</a:t>
             </a:r>
             <a:endParaRPr lang="en-US" dirty="0"/>
@@ -8166,10 +7756,9 @@
           <a:lstStyle/>
           <a:p>
             <a:r>
-              <a:rPr lang="en-US" dirty="0" smtClean="0"/>
+              <a:rPr lang="en-US" dirty="0"/>
               <a:t>Interactive graphics with R shiny</a:t>
             </a:r>
-            <a:endParaRPr lang="en-US" dirty="0"/>
           </a:p>
         </p:txBody>
       </p:sp>
@@ -8191,28 +7780,27 @@
           <a:lstStyle/>
           <a:p>
             <a:r>
-              <a:rPr lang="en-US" sz="2800" dirty="0" smtClean="0"/>
+              <a:rPr lang="en-US" sz="2800" dirty="0"/>
               <a:t>Optimizing a graphic often requires multiple iterative alterations</a:t>
             </a:r>
           </a:p>
           <a:p>
             <a:r>
-              <a:rPr lang="en-US" sz="2800" dirty="0" smtClean="0"/>
+              <a:rPr lang="en-US" sz="2800" dirty="0"/>
               <a:t>Analysis and interpretation often benefits from active filtering, variable selection, and parameterization</a:t>
             </a:r>
           </a:p>
           <a:p>
             <a:r>
-              <a:rPr lang="en-US" sz="2800" dirty="0" smtClean="0"/>
+              <a:rPr lang="en-US" sz="2800" dirty="0"/>
               <a:t>Interactive graphics allow end-users, especially non-experts, to more effectively explore data</a:t>
             </a:r>
           </a:p>
           <a:p>
             <a:r>
-              <a:rPr lang="en-US" sz="2800" dirty="0" smtClean="0"/>
+              <a:rPr lang="en-US" sz="2800" dirty="0"/>
               <a:t>The R shiny package allows you to quickly and easily create sophisticated web-accessible interactive graphics</a:t>
             </a:r>
-            <a:endParaRPr lang="en-US" sz="2800" dirty="0"/>
           </a:p>
         </p:txBody>
       </p:sp>
@@ -8262,10 +7850,9 @@
           <a:lstStyle/>
           <a:p>
             <a:r>
-              <a:rPr lang="en-US" dirty="0" smtClean="0"/>
+              <a:rPr lang="en-US" dirty="0"/>
               <a:t>Basic organization of a shiny application</a:t>
             </a:r>
-            <a:endParaRPr lang="en-US" dirty="0"/>
           </a:p>
         </p:txBody>
       </p:sp>
@@ -8293,15 +7880,15 @@
           <a:p>
             <a:pPr algn="ctr"/>
             <a:r>
-              <a:rPr lang="en-US" sz="2400" dirty="0" err="1" smtClean="0"/>
+              <a:rPr lang="en-US" sz="2400" dirty="0" err="1"/>
               <a:t>shinyUI</a:t>
             </a:r>
-            <a:endParaRPr lang="en-US" sz="2400" dirty="0" smtClean="0"/>
+            <a:endParaRPr lang="en-US" sz="2400" dirty="0"/>
           </a:p>
           <a:p>
             <a:pPr algn="ctr"/>
             <a:r>
-              <a:rPr lang="en-US" sz="2400" dirty="0" err="1" smtClean="0"/>
+              <a:rPr lang="en-US" sz="2400" dirty="0" err="1"/>
               <a:t>ui.R</a:t>
             </a:r>
             <a:endParaRPr lang="en-US" sz="2400" dirty="0"/>
@@ -8332,15 +7919,15 @@
           <a:p>
             <a:pPr algn="ctr"/>
             <a:r>
-              <a:rPr lang="en-US" sz="2400" dirty="0" err="1" smtClean="0"/>
+              <a:rPr lang="en-US" sz="2400" dirty="0" err="1"/>
               <a:t>shinyServer</a:t>
             </a:r>
-            <a:endParaRPr lang="en-US" sz="2400" dirty="0" smtClean="0"/>
+            <a:endParaRPr lang="en-US" sz="2400" dirty="0"/>
           </a:p>
           <a:p>
             <a:pPr algn="ctr"/>
             <a:r>
-              <a:rPr lang="en-US" sz="2400" dirty="0" err="1" smtClean="0"/>
+              <a:rPr lang="en-US" sz="2400" dirty="0" err="1"/>
               <a:t>server.R</a:t>
             </a:r>
             <a:endParaRPr lang="en-US" sz="2400" dirty="0"/>
@@ -8483,10 +8070,9 @@
           <a:p>
             <a:pPr algn="ctr"/>
             <a:r>
-              <a:rPr lang="en-US" sz="2800" dirty="0" smtClean="0"/>
+              <a:rPr lang="en-US" sz="2800" dirty="0"/>
               <a:t>User input</a:t>
             </a:r>
-            <a:endParaRPr lang="en-US" sz="2800" dirty="0"/>
           </a:p>
         </p:txBody>
       </p:sp>
@@ -8514,10 +8100,9 @@
           <a:p>
             <a:pPr algn="ctr"/>
             <a:r>
-              <a:rPr lang="en-US" sz="2800" dirty="0" smtClean="0"/>
+              <a:rPr lang="en-US" sz="2800" dirty="0"/>
               <a:t>R output</a:t>
             </a:r>
-            <a:endParaRPr lang="en-US" sz="2800" dirty="0"/>
           </a:p>
         </p:txBody>
       </p:sp>
@@ -8544,10 +8129,9 @@
           <a:lstStyle/>
           <a:p>
             <a:r>
-              <a:rPr lang="en-US" sz="2800" dirty="0" smtClean="0"/>
+              <a:rPr lang="en-US" sz="2800" dirty="0"/>
               <a:t>Interactive User Interface (UI) = website</a:t>
             </a:r>
-            <a:endParaRPr lang="en-US" sz="2800" dirty="0"/>
           </a:p>
         </p:txBody>
       </p:sp>
@@ -8597,10 +8181,9 @@
           <a:lstStyle/>
           <a:p>
             <a:r>
-              <a:rPr lang="en-US" dirty="0" smtClean="0"/>
+              <a:rPr lang="en-US" dirty="0"/>
               <a:t>Learning objectives of the course</a:t>
             </a:r>
-            <a:endParaRPr lang="en-US" dirty="0"/>
           </a:p>
         </p:txBody>
       </p:sp>
@@ -8622,74 +8205,43 @@
           <a:lstStyle/>
           <a:p>
             <a:r>
-              <a:rPr lang="en-US" dirty="0" smtClean="0"/>
-              <a:t>Module 1: </a:t>
-            </a:r>
-            <a:r>
-              <a:rPr lang="en-US" dirty="0"/>
-              <a:t>Introduction to genomic data visualization and interpretation</a:t>
-            </a:r>
-            <a:endParaRPr lang="en-US" dirty="0" smtClean="0"/>
-          </a:p>
-          <a:p>
-            <a:r>
-              <a:rPr lang="en-US" b="1" dirty="0" smtClean="0"/>
-              <a:t>Module 2</a:t>
-            </a:r>
+              <a:rPr lang="en-US" dirty="0"/>
+              <a:t>Module 1: Introduction to genomic data visualization and interpretation</a:t>
+            </a:r>
+          </a:p>
+          <a:p>
             <a:r>
               <a:rPr lang="en-US" b="1" dirty="0"/>
-              <a:t>: Using R for genomic data visualization and </a:t>
-            </a:r>
-            <a:r>
-              <a:rPr lang="en-US" b="1" dirty="0" smtClean="0"/>
-              <a:t>interpretation</a:t>
-            </a:r>
-          </a:p>
-          <a:p>
-            <a:r>
-              <a:rPr lang="en-US" dirty="0" smtClean="0"/>
-              <a:t>Module 3: </a:t>
-            </a:r>
-            <a:r>
-              <a:rPr lang="en-US" dirty="0"/>
-              <a:t>Introduction to </a:t>
-            </a:r>
-            <a:r>
-              <a:rPr lang="en-US" dirty="0" err="1" smtClean="0"/>
+              <a:t>Module 2: Using R for genomic data visualization and interpretation</a:t>
+            </a:r>
+          </a:p>
+          <a:p>
+            <a:r>
+              <a:rPr lang="en-US" dirty="0"/>
+              <a:t>Module 3: Introduction to </a:t>
+            </a:r>
+            <a:r>
+              <a:rPr lang="en-US" dirty="0" err="1"/>
               <a:t>GenVisR</a:t>
             </a:r>
-            <a:endParaRPr lang="en-US" dirty="0" smtClean="0"/>
+            <a:endParaRPr lang="en-US" dirty="0"/>
           </a:p>
           <a:p>
             <a:r>
               <a:rPr lang="en-US" dirty="0"/>
               <a:t>Module 4: Expression profiling, visualization, and interpretation</a:t>
             </a:r>
-            <a:endParaRPr lang="en-US" dirty="0" smtClean="0"/>
-          </a:p>
-          <a:p>
-            <a:r>
-              <a:rPr lang="en-US" dirty="0" smtClean="0"/>
-              <a:t>Module 5</a:t>
-            </a:r>
-            <a:r>
-              <a:rPr lang="en-US" dirty="0"/>
-              <a:t>: Variant annotation and interpretation</a:t>
-            </a:r>
-            <a:endParaRPr lang="en-US" dirty="0" smtClean="0"/>
-          </a:p>
-          <a:p>
-            <a:r>
-              <a:rPr lang="en-US" dirty="0" smtClean="0"/>
-              <a:t>Module 6</a:t>
-            </a:r>
-            <a:r>
-              <a:rPr lang="en-US" dirty="0"/>
-              <a:t>: Q &amp; A, discussion, integrated assignments, and working with your own </a:t>
-            </a:r>
-            <a:r>
-              <a:rPr lang="en-US" dirty="0" smtClean="0"/>
-              <a:t>data</a:t>
+          </a:p>
+          <a:p>
+            <a:r>
+              <a:rPr lang="en-US" dirty="0"/>
+              <a:t>Module 5: Variant annotation and interpretation</a:t>
+            </a:r>
+          </a:p>
+          <a:p>
+            <a:r>
+              <a:rPr lang="en-US" dirty="0"/>
+              <a:t>Module 6: Q &amp; A, discussion, integrated assignments, and working with your own data</a:t>
             </a:r>
           </a:p>
           <a:p>
@@ -8697,24 +8249,23 @@
           </a:p>
           <a:p>
             <a:r>
-              <a:rPr lang="en-US" dirty="0" smtClean="0"/>
+              <a:rPr lang="en-US" dirty="0"/>
               <a:t>Tutorials</a:t>
             </a:r>
           </a:p>
           <a:p>
             <a:pPr lvl="1"/>
             <a:r>
-              <a:rPr lang="en-US" dirty="0" smtClean="0"/>
+              <a:rPr lang="en-US" dirty="0"/>
               <a:t>Provide working examples of data visualization and interpretation</a:t>
             </a:r>
           </a:p>
           <a:p>
             <a:pPr lvl="1"/>
             <a:r>
-              <a:rPr lang="en-US" dirty="0" smtClean="0"/>
+              <a:rPr lang="en-US" dirty="0"/>
               <a:t>Self contained, self explanatory, portable </a:t>
             </a:r>
-            <a:endParaRPr lang="en-US" dirty="0"/>
           </a:p>
         </p:txBody>
       </p:sp>
@@ -8728,13 +8279,6 @@
   <p:clrMapOvr>
     <a:masterClrMapping/>
   </p:clrMapOvr>
-  <p:timing>
-    <p:tnLst>
-      <p:par>
-        <p:cTn xmlns:p14="http://schemas.microsoft.com/office/powerpoint/2010/main" id="1" dur="indefinite" restart="never" nodeType="tmRoot"/>
-      </p:par>
-    </p:tnLst>
-  </p:timing>
 </p:sld>
 </file>
 
@@ -8771,10 +8315,9 @@
           <a:lstStyle/>
           <a:p>
             <a:r>
-              <a:rPr lang="en-US" dirty="0" smtClean="0"/>
+              <a:rPr lang="en-US" dirty="0"/>
               <a:t>Demo of shiny gallery genomics example</a:t>
             </a:r>
-            <a:endParaRPr lang="en-US" dirty="0"/>
           </a:p>
         </p:txBody>
       </p:sp>
@@ -8828,19 +8371,12 @@
               <a:rPr lang="en-US" sz="2400" dirty="0">
                 <a:hlinkClick r:id="rId3"/>
               </a:rPr>
-              <a:t>https://shiny.rstudio.com/gallery</a:t>
-            </a:r>
-            <a:r>
-              <a:rPr lang="en-US" sz="2400" dirty="0" smtClean="0">
-                <a:hlinkClick r:id="rId3"/>
-              </a:rPr>
-              <a:t>/</a:t>
-            </a:r>
-            <a:r>
-              <a:rPr lang="en-US" sz="2400" dirty="0" smtClean="0"/>
+              <a:t>https://shiny.rstudio.com/gallery/</a:t>
+            </a:r>
+            <a:r>
+              <a:rPr lang="en-US" sz="2400" dirty="0"/>
               <a:t> </a:t>
             </a:r>
-            <a:endParaRPr lang="en-US" sz="2400" dirty="0"/>
           </a:p>
         </p:txBody>
       </p:sp>
@@ -8900,10 +8436,9 @@
               <a:buNone/>
             </a:pPr>
             <a:r>
-              <a:rPr lang="en-US" sz="4000" dirty="0" smtClean="0"/>
+              <a:rPr lang="en-US" sz="4000" dirty="0"/>
               <a:t>Questions?</a:t>
             </a:r>
-            <a:endParaRPr lang="en-US" sz="4000" dirty="0"/>
           </a:p>
         </p:txBody>
       </p:sp>
@@ -8953,10 +8488,9 @@
           <a:lstStyle/>
           <a:p>
             <a:r>
-              <a:rPr lang="en-US" dirty="0" smtClean="0"/>
+              <a:rPr lang="en-US" dirty="0"/>
               <a:t>Learning objectives of module 2</a:t>
             </a:r>
-            <a:endParaRPr lang="en-US" dirty="0"/>
           </a:p>
         </p:txBody>
       </p:sp>
@@ -8976,38 +8510,26 @@
           <a:lstStyle/>
           <a:p>
             <a:r>
-              <a:rPr lang="en-US" dirty="0" smtClean="0"/>
+              <a:rPr lang="en-US" dirty="0"/>
               <a:t>Review basic R usage</a:t>
             </a:r>
           </a:p>
           <a:p>
             <a:r>
-              <a:rPr lang="en-US" dirty="0" smtClean="0"/>
-              <a:t>Learn </a:t>
-            </a:r>
-            <a:r>
-              <a:rPr lang="en-US" dirty="0"/>
-              <a:t>to use R for basic data manipulation</a:t>
-            </a:r>
-          </a:p>
-          <a:p>
-            <a:r>
-              <a:rPr lang="en-US" dirty="0" smtClean="0"/>
-              <a:t>Learn </a:t>
-            </a:r>
-            <a:r>
-              <a:rPr lang="en-US" dirty="0"/>
-              <a:t>to create publication quality graphs to display data</a:t>
-            </a:r>
-          </a:p>
-          <a:p>
-            <a:r>
-              <a:rPr lang="en-US" dirty="0" smtClean="0"/>
-              <a:t>Learn </a:t>
-            </a:r>
-            <a:r>
-              <a:rPr lang="en-US" dirty="0"/>
-              <a:t>to create interactive graphics</a:t>
+              <a:rPr lang="en-US" dirty="0"/>
+              <a:t>Learn to use R for basic data manipulation</a:t>
+            </a:r>
+          </a:p>
+          <a:p>
+            <a:r>
+              <a:rPr lang="en-US" dirty="0"/>
+              <a:t>Learn to create publication quality graphs to display data</a:t>
+            </a:r>
+          </a:p>
+          <a:p>
+            <a:r>
+              <a:rPr lang="en-US" dirty="0"/>
+              <a:t>Learn to create interactive graphics</a:t>
             </a:r>
           </a:p>
         </p:txBody>
@@ -9022,13 +8544,6 @@
   <p:clrMapOvr>
     <a:masterClrMapping/>
   </p:clrMapOvr>
-  <p:timing>
-    <p:tnLst>
-      <p:par>
-        <p:cTn xmlns:p14="http://schemas.microsoft.com/office/powerpoint/2010/main" id="1" dur="indefinite" restart="never" nodeType="tmRoot"/>
-      </p:par>
-    </p:tnLst>
-  </p:timing>
 </p:sld>
 </file>
 
@@ -9065,10 +8580,9 @@
           <a:lstStyle/>
           <a:p>
             <a:r>
-              <a:rPr lang="en-US" dirty="0" smtClean="0"/>
+              <a:rPr lang="en-US" dirty="0"/>
               <a:t>A brief history of R</a:t>
             </a:r>
-            <a:endParaRPr lang="en-US" dirty="0"/>
           </a:p>
         </p:txBody>
       </p:sp>
@@ -9091,41 +8605,20 @@
           <a:p>
             <a:r>
               <a:rPr lang="en-US" dirty="0"/>
-              <a:t>R is an implementation of the S programming language combined with lexical scoping semantics inspired by Scheme</a:t>
-            </a:r>
-            <a:r>
-              <a:rPr lang="en-US" dirty="0" smtClean="0"/>
-              <a:t>.</a:t>
-            </a:r>
-          </a:p>
-          <a:p>
-            <a:r>
-              <a:rPr lang="en-US" dirty="0" smtClean="0"/>
-              <a:t>S </a:t>
-            </a:r>
-            <a:r>
-              <a:rPr lang="en-US" dirty="0"/>
-              <a:t>was created by John Chambers while at Bell </a:t>
-            </a:r>
-            <a:r>
-              <a:rPr lang="en-US" dirty="0" smtClean="0"/>
-              <a:t>Labs</a:t>
-            </a:r>
-          </a:p>
-          <a:p>
-            <a:r>
-              <a:rPr lang="en-US" dirty="0" smtClean="0"/>
-              <a:t>There </a:t>
-            </a:r>
-            <a:r>
-              <a:rPr lang="en-US" dirty="0"/>
-              <a:t>are some important differences, but much of the code written for S runs unaltered</a:t>
-            </a:r>
-            <a:r>
-              <a:rPr lang="en-US" dirty="0" smtClean="0"/>
-              <a:t>.</a:t>
-            </a:r>
-            <a:endParaRPr lang="en-US" dirty="0"/>
+              <a:t>R is an implementation of the S programming language combined with lexical scoping semantics inspired by Scheme.</a:t>
+            </a:r>
+          </a:p>
+          <a:p>
+            <a:r>
+              <a:rPr lang="en-US" dirty="0"/>
+              <a:t>S was created by John Chambers while at Bell Labs</a:t>
+            </a:r>
+          </a:p>
+          <a:p>
+            <a:r>
+              <a:rPr lang="en-US" dirty="0"/>
+              <a:t>There are some important differences, but much of the code written for S runs unaltered.</a:t>
+            </a:r>
           </a:p>
           <a:p>
             <a:r>
@@ -9138,49 +8631,20 @@
             </a:r>
             <a:r>
               <a:rPr lang="en-US" dirty="0"/>
-              <a:t> and Robert </a:t>
-            </a:r>
-            <a:r>
-              <a:rPr lang="en-US" dirty="0" smtClean="0"/>
-              <a:t>Gentleman at </a:t>
-            </a:r>
-            <a:r>
-              <a:rPr lang="en-US" dirty="0"/>
-              <a:t>the University of Auckland, New </a:t>
-            </a:r>
-            <a:r>
-              <a:rPr lang="en-US" dirty="0" smtClean="0"/>
-              <a:t>Zealand</a:t>
-            </a:r>
-          </a:p>
-          <a:p>
-            <a:r>
-              <a:rPr lang="en-US" dirty="0" smtClean="0"/>
-              <a:t>Currently </a:t>
-            </a:r>
-            <a:r>
-              <a:rPr lang="en-US" dirty="0"/>
-              <a:t>developed by the R Development Core Team, of which Chambers is a member</a:t>
-            </a:r>
-            <a:r>
-              <a:rPr lang="en-US" dirty="0" smtClean="0"/>
-              <a:t>.</a:t>
-            </a:r>
-          </a:p>
-          <a:p>
-            <a:r>
-              <a:rPr lang="en-US" dirty="0" smtClean="0"/>
-              <a:t>The R project </a:t>
-            </a:r>
-            <a:r>
-              <a:rPr lang="en-US" dirty="0"/>
-              <a:t>was conceived in 1992, with an initial version released in 1995 and a stable beta version in </a:t>
-            </a:r>
-            <a:r>
-              <a:rPr lang="en-US" dirty="0" smtClean="0"/>
-              <a:t>2000</a:t>
-            </a:r>
-            <a:endParaRPr lang="en-US" dirty="0"/>
+              <a:t> and Robert Gentleman at the University of Auckland, New Zealand</a:t>
+            </a:r>
+          </a:p>
+          <a:p>
+            <a:r>
+              <a:rPr lang="en-US" dirty="0"/>
+              <a:t>Currently developed by the R Development Core Team, of which Chambers is a member.</a:t>
+            </a:r>
+          </a:p>
+          <a:p>
+            <a:r>
+              <a:rPr lang="en-US" dirty="0"/>
+              <a:t>The R project was conceived in 1992, with an initial version released in 1995 and a stable beta version in 2000</a:t>
+            </a:r>
           </a:p>
         </p:txBody>
       </p:sp>
@@ -9212,10 +8676,9 @@
               <a:t>https://en.wikipedia.org/wiki/R_(programming_language</a:t>
             </a:r>
             <a:r>
-              <a:rPr lang="en-US" dirty="0" smtClean="0"/>
+              <a:rPr lang="en-US" dirty="0"/>
               <a:t>) </a:t>
             </a:r>
-            <a:endParaRPr lang="en-US" dirty="0"/>
           </a:p>
         </p:txBody>
       </p:sp>
@@ -9267,10 +8730,9 @@
           <a:lstStyle/>
           <a:p>
             <a:r>
-              <a:rPr lang="en-US" dirty="0" smtClean="0"/>
+              <a:rPr lang="en-US" dirty="0"/>
               <a:t>R is available via command-line or a number of integrated development environments (IDE)</a:t>
             </a:r>
-            <a:endParaRPr lang="en-US" dirty="0"/>
           </a:p>
         </p:txBody>
       </p:sp>
@@ -9404,16 +8866,15 @@
           <a:lstStyle/>
           <a:p>
             <a:r>
-              <a:rPr lang="en-US" sz="2400" dirty="0" smtClean="0">
+              <a:rPr lang="en-US" sz="2400" dirty="0">
                 <a:hlinkClick r:id="rId6"/>
               </a:rPr>
               <a:t>https://cran.r-project.org/</a:t>
             </a:r>
             <a:r>
-              <a:rPr lang="en-US" sz="2400" dirty="0" smtClean="0"/>
+              <a:rPr lang="en-US" sz="2400" dirty="0"/>
               <a:t> </a:t>
             </a:r>
-            <a:endParaRPr lang="en-US" sz="2400" dirty="0"/>
           </a:p>
         </p:txBody>
       </p:sp>
@@ -9442,19 +8903,12 @@
               <a:rPr lang="en-US" sz="2400" dirty="0">
                 <a:hlinkClick r:id="rId7"/>
               </a:rPr>
-              <a:t>https://www.rstudio.com</a:t>
-            </a:r>
-            <a:r>
-              <a:rPr lang="en-US" sz="2400" dirty="0" smtClean="0">
-                <a:hlinkClick r:id="rId7"/>
-              </a:rPr>
-              <a:t>/</a:t>
-            </a:r>
-            <a:r>
-              <a:rPr lang="en-US" sz="2400" dirty="0" smtClean="0"/>
+              <a:t>https://www.rstudio.com/</a:t>
+            </a:r>
+            <a:r>
+              <a:rPr lang="en-US" sz="2400" dirty="0"/>
               <a:t> </a:t>
             </a:r>
-            <a:endParaRPr lang="en-US" sz="2400" dirty="0"/>
           </a:p>
         </p:txBody>
       </p:sp>
@@ -9481,7 +8935,7 @@
           <a:lstStyle/>
           <a:p>
             <a:r>
-              <a:rPr lang="en-US" sz="2800" dirty="0" err="1" smtClean="0"/>
+              <a:rPr lang="en-US" sz="2800" dirty="0" err="1"/>
               <a:t>Rstudio</a:t>
             </a:r>
             <a:endParaRPr lang="en-US" sz="2800" dirty="0"/>
@@ -9511,10 +8965,9 @@
           <a:lstStyle/>
           <a:p>
             <a:r>
-              <a:rPr lang="en-US" sz="2800" dirty="0" smtClean="0"/>
+              <a:rPr lang="en-US" sz="2800" dirty="0"/>
               <a:t>R Project</a:t>
             </a:r>
-            <a:endParaRPr lang="en-US" sz="2800" dirty="0"/>
           </a:p>
         </p:txBody>
       </p:sp>
@@ -9541,10 +8994,9 @@
           <a:lstStyle/>
           <a:p>
             <a:r>
-              <a:rPr lang="en-US" dirty="0" smtClean="0"/>
+              <a:rPr lang="en-US" dirty="0"/>
               <a:t>Open-source, non-profit</a:t>
             </a:r>
-            <a:endParaRPr lang="en-US" dirty="0"/>
           </a:p>
         </p:txBody>
       </p:sp>
@@ -9571,10 +9023,9 @@
           <a:lstStyle/>
           <a:p>
             <a:r>
-              <a:rPr lang="en-US" dirty="0" smtClean="0"/>
+              <a:rPr lang="en-US" dirty="0"/>
               <a:t>Open-source, free + commercial</a:t>
             </a:r>
-            <a:endParaRPr lang="en-US" dirty="0"/>
           </a:p>
         </p:txBody>
       </p:sp>
@@ -9624,10 +9075,9 @@
           <a:lstStyle/>
           <a:p>
             <a:r>
-              <a:rPr lang="en-US" dirty="0" smtClean="0"/>
+              <a:rPr lang="en-US" dirty="0"/>
               <a:t>Installation and versions</a:t>
             </a:r>
-            <a:endParaRPr lang="en-US" dirty="0"/>
           </a:p>
         </p:txBody>
       </p:sp>
@@ -9647,23 +9097,23 @@
           <a:lstStyle/>
           <a:p>
             <a:r>
-              <a:rPr lang="en-US" dirty="0" err="1" smtClean="0"/>
+              <a:rPr lang="en-US" dirty="0" err="1"/>
               <a:t>Rstudio</a:t>
             </a:r>
             <a:r>
-              <a:rPr lang="en-US" dirty="0" smtClean="0"/>
+              <a:rPr lang="en-US" dirty="0"/>
               <a:t> installation is very simple</a:t>
             </a:r>
           </a:p>
           <a:p>
             <a:r>
-              <a:rPr lang="en-US" dirty="0" smtClean="0"/>
+              <a:rPr lang="en-US" dirty="0"/>
               <a:t>R installation generally only a little more complicated	</a:t>
             </a:r>
           </a:p>
           <a:p>
             <a:r>
-              <a:rPr lang="en-US" dirty="0" smtClean="0"/>
+              <a:rPr lang="en-US" dirty="0"/>
               <a:t>Pre-compiled binaries exist for most operating systems</a:t>
             </a:r>
           </a:p>
@@ -9672,66 +9122,65 @@
           </a:p>
           <a:p>
             <a:r>
-              <a:rPr lang="en-US" dirty="0" smtClean="0"/>
+              <a:rPr lang="en-US" dirty="0"/>
               <a:t>Be aware of R versions</a:t>
             </a:r>
           </a:p>
           <a:p>
             <a:pPr lvl="1"/>
             <a:r>
-              <a:rPr lang="en-US" dirty="0" smtClean="0"/>
+              <a:rPr lang="en-US" dirty="0"/>
               <a:t>Occasionally some packages may be version dependent or interdependent</a:t>
             </a:r>
           </a:p>
           <a:p>
             <a:pPr lvl="1"/>
             <a:r>
-              <a:rPr lang="en-US" dirty="0" smtClean="0"/>
+              <a:rPr lang="en-US" dirty="0"/>
               <a:t>Less of an issue these days</a:t>
             </a:r>
           </a:p>
           <a:p>
             <a:pPr lvl="1"/>
             <a:r>
-              <a:rPr lang="en-US" dirty="0" smtClean="0"/>
+              <a:rPr lang="en-US" dirty="0"/>
               <a:t>Simplest to keep R, </a:t>
             </a:r>
             <a:r>
-              <a:rPr lang="en-US" dirty="0" err="1" smtClean="0"/>
+              <a:rPr lang="en-US" dirty="0" err="1"/>
               <a:t>Rstudio</a:t>
             </a:r>
             <a:r>
-              <a:rPr lang="en-US" dirty="0" smtClean="0"/>
+              <a:rPr lang="en-US" dirty="0"/>
               <a:t> and </a:t>
             </a:r>
             <a:r>
-              <a:rPr lang="en-US" dirty="0" err="1" smtClean="0"/>
+              <a:rPr lang="en-US" dirty="0" err="1"/>
               <a:t>BioConductor</a:t>
             </a:r>
             <a:r>
-              <a:rPr lang="en-US" dirty="0" smtClean="0"/>
+              <a:rPr lang="en-US" dirty="0"/>
               <a:t> updated to current/latest version</a:t>
             </a:r>
           </a:p>
           <a:p>
             <a:pPr lvl="1"/>
             <a:r>
-              <a:rPr lang="en-US" dirty="0" err="1" smtClean="0"/>
+              <a:rPr lang="en-US" dirty="0" err="1"/>
               <a:t>Rswitch</a:t>
             </a:r>
             <a:r>
-              <a:rPr lang="en-US" dirty="0" smtClean="0"/>
+              <a:rPr lang="en-US" dirty="0"/>
               <a:t> – allows multiple versions of R/</a:t>
             </a:r>
             <a:r>
-              <a:rPr lang="en-US" dirty="0" err="1" smtClean="0"/>
+              <a:rPr lang="en-US" dirty="0" err="1"/>
               <a:t>Rstudio</a:t>
             </a:r>
             <a:r>
-              <a:rPr lang="en-US" dirty="0" smtClean="0"/>
+              <a:rPr lang="en-US" dirty="0"/>
               <a:t> to be maintained simultaneously</a:t>
             </a:r>
-            <a:endParaRPr lang="en-US" dirty="0"/>
           </a:p>
         </p:txBody>
       </p:sp>
@@ -9781,11 +9230,11 @@
           <a:lstStyle/>
           <a:p>
             <a:r>
-              <a:rPr lang="en-US" dirty="0" smtClean="0"/>
+              <a:rPr lang="en-US" dirty="0"/>
               <a:t>CRAN and </a:t>
             </a:r>
             <a:r>
-              <a:rPr lang="en-US" dirty="0" err="1" smtClean="0"/>
+              <a:rPr lang="en-US" dirty="0" err="1"/>
               <a:t>BioConductor</a:t>
             </a:r>
             <a:endParaRPr lang="en-US" dirty="0"/>
@@ -9813,44 +9262,8 @@
           <a:lstStyle/>
           <a:p>
             <a:r>
-              <a:rPr lang="en-US" dirty="0" smtClean="0"/>
-              <a:t>11,411 </a:t>
-            </a:r>
-            <a:r>
-              <a:rPr lang="en-US" dirty="0"/>
-              <a:t>available packages</a:t>
-            </a:r>
-            <a:endParaRPr lang="en-US" dirty="0" smtClean="0">
-              <a:hlinkClick r:id="rId2"/>
-            </a:endParaRPr>
-          </a:p>
-          <a:p>
-            <a:r>
-              <a:rPr lang="en-US" dirty="0" smtClean="0"/>
-              <a:t>All applications</a:t>
-            </a:r>
-          </a:p>
-          <a:p>
-            <a:pPr lvl="1"/>
-            <a:r>
-              <a:rPr lang="en-US" dirty="0" smtClean="0"/>
-              <a:t>ggplot2, cluster, dplyr, reshape2, </a:t>
-            </a:r>
-            <a:r>
-              <a:rPr lang="en-US" dirty="0" err="1" smtClean="0"/>
-              <a:t>randomForest</a:t>
-            </a:r>
-            <a:r>
-              <a:rPr lang="en-US" dirty="0" smtClean="0"/>
-              <a:t>, </a:t>
-            </a:r>
-            <a:r>
-              <a:rPr lang="en-US" dirty="0" err="1" smtClean="0"/>
-              <a:t>RColorBrewer</a:t>
-            </a:r>
-            <a:r>
-              <a:rPr lang="en-US" dirty="0" smtClean="0"/>
-              <a:t> </a:t>
+              <a:rPr lang="en-US" dirty="0"/>
+              <a:t>11,411 available packages</a:t>
             </a:r>
             <a:endParaRPr lang="en-US" dirty="0">
               <a:hlinkClick r:id="rId2"/>
@@ -9858,27 +9271,47 @@
           </a:p>
           <a:p>
             <a:r>
-              <a:rPr lang="en-US" dirty="0" smtClean="0">
-                <a:hlinkClick r:id="rId2"/>
-              </a:rPr>
-              <a:t>https</a:t>
-            </a:r>
+              <a:rPr lang="en-US" dirty="0"/>
+              <a:t>All applications</a:t>
+            </a:r>
+          </a:p>
+          <a:p>
+            <a:pPr lvl="1"/>
+            <a:r>
+              <a:rPr lang="en-US" dirty="0"/>
+              <a:t>ggplot2, cluster, dplyr, reshape2, </a:t>
+            </a:r>
+            <a:r>
+              <a:rPr lang="en-US" dirty="0" err="1"/>
+              <a:t>randomForest</a:t>
+            </a:r>
+            <a:r>
+              <a:rPr lang="en-US" dirty="0"/>
+              <a:t>, </a:t>
+            </a:r>
+            <a:r>
+              <a:rPr lang="en-US" dirty="0" err="1"/>
+              <a:t>RColorBrewer</a:t>
+            </a:r>
+            <a:r>
+              <a:rPr lang="en-US" dirty="0"/>
+              <a:t> </a:t>
+            </a:r>
+            <a:endParaRPr lang="en-US" dirty="0">
+              <a:hlinkClick r:id="rId2"/>
+            </a:endParaRPr>
+          </a:p>
+          <a:p>
             <a:r>
               <a:rPr lang="en-US" dirty="0">
                 <a:hlinkClick r:id="rId2"/>
               </a:rPr>
-              <a:t>://cran.r-project.org</a:t>
-            </a:r>
-            <a:r>
-              <a:rPr lang="en-US" dirty="0" smtClean="0">
-                <a:hlinkClick r:id="rId2"/>
-              </a:rPr>
-              <a:t>/</a:t>
-            </a:r>
-            <a:endParaRPr lang="en-US" dirty="0" smtClean="0"/>
-          </a:p>
-          <a:p>
-            <a:endParaRPr lang="en-US" dirty="0" smtClean="0"/>
+              <a:t>https://cran.r-project.org/</a:t>
+            </a:r>
+            <a:endParaRPr lang="en-US" dirty="0"/>
+          </a:p>
+          <a:p>
+            <a:endParaRPr lang="en-US" dirty="0"/>
           </a:p>
           <a:p>
             <a:pPr marL="0" indent="0">
@@ -9886,17 +9319,12 @@
             </a:pPr>
             <a:r>
               <a:rPr lang="en-US" sz="2000" dirty="0" err="1"/>
-              <a:t>i</a:t>
-            </a:r>
-            <a:r>
-              <a:rPr lang="en-US" sz="2000" dirty="0" err="1" smtClean="0"/>
-              <a:t>nstall.packages</a:t>
-            </a:r>
-            <a:r>
-              <a:rPr lang="en-US" sz="2000" dirty="0" smtClean="0"/>
+              <a:t>install.packages</a:t>
+            </a:r>
+            <a:r>
+              <a:rPr lang="en-US" sz="2000" dirty="0"/>
               <a:t>()</a:t>
             </a:r>
-            <a:endParaRPr lang="en-US" sz="2000" dirty="0"/>
           </a:p>
         </p:txBody>
       </p:sp>
@@ -9921,60 +9349,60 @@
           <a:lstStyle/>
           <a:p>
             <a:r>
-              <a:rPr lang="en-US" dirty="0" smtClean="0"/>
+              <a:rPr lang="en-US" dirty="0"/>
               <a:t>1,381 available packages</a:t>
             </a:r>
           </a:p>
           <a:p>
             <a:r>
-              <a:rPr lang="en-US" dirty="0" smtClean="0"/>
+              <a:rPr lang="en-US" dirty="0"/>
               <a:t>Genomic applications</a:t>
             </a:r>
           </a:p>
           <a:p>
             <a:pPr lvl="1"/>
             <a:r>
-              <a:rPr lang="en-US" dirty="0" err="1" smtClean="0"/>
+              <a:rPr lang="en-US" dirty="0" err="1"/>
               <a:t>AnnotationDBI</a:t>
             </a:r>
             <a:r>
-              <a:rPr lang="en-US" dirty="0" smtClean="0"/>
+              <a:rPr lang="en-US" dirty="0"/>
               <a:t>, </a:t>
             </a:r>
             <a:r>
-              <a:rPr lang="en-US" dirty="0" err="1" smtClean="0"/>
+              <a:rPr lang="en-US" dirty="0" err="1"/>
               <a:t>GenomicRanges</a:t>
             </a:r>
             <a:r>
-              <a:rPr lang="en-US" dirty="0" smtClean="0"/>
+              <a:rPr lang="en-US" dirty="0"/>
               <a:t>, </a:t>
             </a:r>
             <a:r>
-              <a:rPr lang="en-US" dirty="0" err="1" smtClean="0"/>
+              <a:rPr lang="en-US" dirty="0" err="1"/>
               <a:t>limma</a:t>
             </a:r>
             <a:r>
-              <a:rPr lang="en-US" dirty="0" smtClean="0"/>
+              <a:rPr lang="en-US" dirty="0"/>
               <a:t>, </a:t>
             </a:r>
             <a:r>
-              <a:rPr lang="en-US" dirty="0" err="1" smtClean="0"/>
+              <a:rPr lang="en-US" dirty="0" err="1"/>
               <a:t>biomaRt</a:t>
             </a:r>
             <a:r>
-              <a:rPr lang="en-US" dirty="0" smtClean="0"/>
+              <a:rPr lang="en-US" dirty="0"/>
               <a:t>, </a:t>
             </a:r>
             <a:r>
-              <a:rPr lang="en-US" dirty="0" err="1" smtClean="0"/>
+              <a:rPr lang="en-US" dirty="0" err="1"/>
               <a:t>affy</a:t>
             </a:r>
             <a:r>
-              <a:rPr lang="en-US" dirty="0" smtClean="0"/>
+              <a:rPr lang="en-US" dirty="0"/>
               <a:t>, </a:t>
             </a:r>
             <a:r>
-              <a:rPr lang="en-US" dirty="0" err="1" smtClean="0"/>
+              <a:rPr lang="en-US" dirty="0" err="1"/>
               <a:t>GEOquery</a:t>
             </a:r>
             <a:endParaRPr lang="en-US" dirty="0"/>
@@ -9984,15 +9412,9 @@
               <a:rPr lang="en-US" dirty="0">
                 <a:hlinkClick r:id="rId3"/>
               </a:rPr>
-              <a:t>https://bioconductor.org</a:t>
-            </a:r>
-            <a:r>
-              <a:rPr lang="en-US" dirty="0" smtClean="0">
-                <a:hlinkClick r:id="rId3"/>
-              </a:rPr>
-              <a:t>/</a:t>
-            </a:r>
-            <a:endParaRPr lang="en-US" dirty="0" smtClean="0"/>
+              <a:t>https://bioconductor.org/</a:t>
+            </a:r>
+            <a:endParaRPr lang="en-US" dirty="0"/>
           </a:p>
           <a:p>
             <a:endParaRPr lang="en-US" sz="2000" dirty="0"/>
@@ -10034,7 +9456,6 @@
               <a:rPr lang="en-US" sz="2000" dirty="0"/>
               <a:t>()</a:t>
             </a:r>
-            <a:endParaRPr lang="en-US" sz="2000" dirty="0" smtClean="0"/>
           </a:p>
           <a:p>
             <a:endParaRPr lang="en-US" dirty="0"/>
@@ -10087,10 +9508,9 @@
           <a:lstStyle/>
           <a:p>
             <a:r>
-              <a:rPr lang="en-US" dirty="0" smtClean="0"/>
+              <a:rPr lang="en-US" dirty="0"/>
               <a:t>Getting help: ?, vignette(), and data()</a:t>
             </a:r>
-            <a:endParaRPr lang="en-US" dirty="0"/>
           </a:p>
         </p:txBody>
       </p:sp>
@@ -10110,24 +9530,24 @@
           <a:lstStyle/>
           <a:p>
             <a:r>
-              <a:rPr lang="en-US" dirty="0" smtClean="0"/>
+              <a:rPr lang="en-US" dirty="0"/>
               <a:t>Type ‘?’ before any function to get a manual style help page in R or </a:t>
             </a:r>
             <a:r>
-              <a:rPr lang="en-US" dirty="0" err="1" smtClean="0"/>
+              <a:rPr lang="en-US" dirty="0" err="1"/>
               <a:t>Rstudio</a:t>
             </a:r>
-            <a:endParaRPr lang="en-US" dirty="0" smtClean="0"/>
-          </a:p>
-          <a:p>
-            <a:r>
-              <a:rPr lang="en-US" dirty="0" smtClean="0"/>
+            <a:endParaRPr lang="en-US" dirty="0"/>
+          </a:p>
+          <a:p>
+            <a:r>
+              <a:rPr lang="en-US" dirty="0"/>
               <a:t>Similarly use vignette() together with a function/package name to get detailed usage vignettes</a:t>
             </a:r>
           </a:p>
           <a:p>
             <a:r>
-              <a:rPr lang="en-US" dirty="0" smtClean="0"/>
+              <a:rPr lang="en-US" dirty="0"/>
               <a:t>Type data() to return a list of available demonstration datasets.</a:t>
             </a:r>
           </a:p>
@@ -10190,10 +9610,9 @@
           <a:lstStyle/>
           <a:p>
             <a:r>
-              <a:rPr lang="en-US" sz="3200" dirty="0" smtClean="0"/>
+              <a:rPr lang="en-US" sz="3200" dirty="0"/>
               <a:t>&gt; ?apply</a:t>
             </a:r>
-            <a:endParaRPr lang="en-US" sz="3200" dirty="0"/>
           </a:p>
         </p:txBody>
       </p:sp>
@@ -10509,7 +9928,7 @@
   <a:extraClrSchemeLst/>
   <a:extLst>
     <a:ext uri="{05A4C25C-085E-4340-85A3-A5531E510DB2}">
-      <thm15:themeFamily xmlns:thm15="http://schemas.microsoft.com/office/thememl/2012/main" xmlns="" name="MGI_4-3_ratio_v1a" id="{9A0171FA-20F4-F840-B1C8-29D686AB0540}" vid="{60506783-C923-7847-B1CA-7C860CC95497}"/>
+      <thm15:themeFamily xmlns:thm15="http://schemas.microsoft.com/office/thememl/2012/main" name="MGI_4-3_ratio_v1a" id="{9A0171FA-20F4-F840-B1C8-29D686AB0540}" vid="{60506783-C923-7847-B1CA-7C860CC95497}"/>
     </a:ext>
   </a:extLst>
 </a:theme>

</xml_diff>